<commit_message>
Adding some slides for Haven
</commit_message>
<xml_diff>
--- a/CE_presentation.pptx
+++ b/CE_presentation.pptx
@@ -5,13 +5,17 @@
     <p:sldMasterId id="2147483648" r:id="rId1"/>
   </p:sldMasterIdLst>
   <p:notesMasterIdLst>
-    <p:notesMasterId r:id="rId6"/>
+    <p:notesMasterId r:id="rId10"/>
   </p:notesMasterIdLst>
   <p:sldIdLst>
     <p:sldId id="256" r:id="rId2"/>
     <p:sldId id="257" r:id="rId3"/>
     <p:sldId id="259" r:id="rId4"/>
     <p:sldId id="260" r:id="rId5"/>
+    <p:sldId id="261" r:id="rId6"/>
+    <p:sldId id="262" r:id="rId7"/>
+    <p:sldId id="263" r:id="rId8"/>
+    <p:sldId id="264" r:id="rId9"/>
   </p:sldIdLst>
   <p:sldSz cx="12192000" cy="6858000"/>
   <p:notesSz cx="6858000" cy="9144000"/>
@@ -110,6 +114,11 @@
       </a:defRPr>
     </a:lvl9pPr>
   </p:defaultTextStyle>
+  <p:extLst>
+    <p:ext uri="{EFAFB233-063F-42B5-8137-9DF3F51BA10A}">
+      <p15:sldGuideLst xmlns:p15="http://schemas.microsoft.com/office/powerpoint/2012/main"/>
+    </p:ext>
+  </p:extLst>
 </p:presentation>
 </file>
 
@@ -195,7 +204,7 @@
           <a:p>
             <a:fld id="{79C7D925-ACBC-A942-AEA8-AF2DA2D0E5F6}" type="datetimeFigureOut">
               <a:rPr lang="en-US" smtClean="0"/>
-              <a:t>6/16/17</a:t>
+              <a:t>6/19/17</a:t>
             </a:fld>
             <a:endParaRPr lang="en-US"/>
           </a:p>
@@ -665,7 +674,36 @@
                 <a:ea typeface="+mn-ea"/>
                 <a:cs typeface="+mn-cs"/>
               </a:rPr>
-              <a:t>Put lots of things at the very end.</a:t>
+              <a:t>Put lots of things at the very end</a:t>
+            </a:r>
+            <a:r>
+              <a:rPr lang="en-US" sz="1200" b="0" i="0" kern="1200" baseline="0" dirty="0" smtClean="0">
+                <a:solidFill>
+                  <a:schemeClr val="tx1"/>
+                </a:solidFill>
+                <a:effectLst/>
+                <a:latin typeface="+mn-lt"/>
+                <a:ea typeface="+mn-ea"/>
+                <a:cs typeface="+mn-cs"/>
+              </a:rPr>
+              <a:t>.</a:t>
+            </a:r>
+          </a:p>
+          <a:p>
+            <a:pPr marL="228600" indent="-228600">
+              <a:buAutoNum type="arabicPeriod"/>
+            </a:pPr>
+            <a:r>
+              <a:rPr lang="en-US" sz="1200" b="0" i="0" kern="1200" baseline="0" dirty="0" smtClean="0">
+                <a:solidFill>
+                  <a:schemeClr val="tx1"/>
+                </a:solidFill>
+                <a:effectLst/>
+                <a:latin typeface="+mn-lt"/>
+                <a:ea typeface="+mn-ea"/>
+                <a:cs typeface="+mn-cs"/>
+              </a:rPr>
+              <a:t>Say number of devices that appear, number of things connected to the internet.</a:t>
             </a:r>
             <a:endParaRPr lang="en-US" dirty="0"/>
           </a:p>
@@ -838,7 +876,7 @@
           <a:p>
             <a:fld id="{C474F784-3F61-9E4C-93C7-1B314C5504FC}" type="datetimeFigureOut">
               <a:rPr lang="en-US" smtClean="0"/>
-              <a:t>6/16/17</a:t>
+              <a:t>6/19/17</a:t>
             </a:fld>
             <a:endParaRPr lang="en-US"/>
           </a:p>
@@ -1008,7 +1046,7 @@
           <a:p>
             <a:fld id="{C474F784-3F61-9E4C-93C7-1B314C5504FC}" type="datetimeFigureOut">
               <a:rPr lang="en-US" smtClean="0"/>
-              <a:t>6/16/17</a:t>
+              <a:t>6/19/17</a:t>
             </a:fld>
             <a:endParaRPr lang="en-US"/>
           </a:p>
@@ -1188,7 +1226,7 @@
           <a:p>
             <a:fld id="{C474F784-3F61-9E4C-93C7-1B314C5504FC}" type="datetimeFigureOut">
               <a:rPr lang="en-US" smtClean="0"/>
-              <a:t>6/16/17</a:t>
+              <a:t>6/19/17</a:t>
             </a:fld>
             <a:endParaRPr lang="en-US"/>
           </a:p>
@@ -1363,7 +1401,7 @@
           <a:p>
             <a:fld id="{C474F784-3F61-9E4C-93C7-1B314C5504FC}" type="datetimeFigureOut">
               <a:rPr lang="en-US" smtClean="0"/>
-              <a:t>6/16/17</a:t>
+              <a:t>6/19/17</a:t>
             </a:fld>
             <a:endParaRPr lang="en-US"/>
           </a:p>
@@ -1609,7 +1647,7 @@
           <a:p>
             <a:fld id="{C474F784-3F61-9E4C-93C7-1B314C5504FC}" type="datetimeFigureOut">
               <a:rPr lang="en-US" smtClean="0"/>
-              <a:t>6/16/17</a:t>
+              <a:t>6/19/17</a:t>
             </a:fld>
             <a:endParaRPr lang="en-US"/>
           </a:p>
@@ -1841,7 +1879,7 @@
           <a:p>
             <a:fld id="{C474F784-3F61-9E4C-93C7-1B314C5504FC}" type="datetimeFigureOut">
               <a:rPr lang="en-US" smtClean="0"/>
-              <a:t>6/16/17</a:t>
+              <a:t>6/19/17</a:t>
             </a:fld>
             <a:endParaRPr lang="en-US"/>
           </a:p>
@@ -2208,7 +2246,7 @@
           <a:p>
             <a:fld id="{C474F784-3F61-9E4C-93C7-1B314C5504FC}" type="datetimeFigureOut">
               <a:rPr lang="en-US" smtClean="0"/>
-              <a:t>6/16/17</a:t>
+              <a:t>6/19/17</a:t>
             </a:fld>
             <a:endParaRPr lang="en-US"/>
           </a:p>
@@ -2326,7 +2364,7 @@
           <a:p>
             <a:fld id="{C474F784-3F61-9E4C-93C7-1B314C5504FC}" type="datetimeFigureOut">
               <a:rPr lang="en-US" smtClean="0"/>
-              <a:t>6/16/17</a:t>
+              <a:t>6/19/17</a:t>
             </a:fld>
             <a:endParaRPr lang="en-US"/>
           </a:p>
@@ -2421,7 +2459,7 @@
           <a:p>
             <a:fld id="{C474F784-3F61-9E4C-93C7-1B314C5504FC}" type="datetimeFigureOut">
               <a:rPr lang="en-US" smtClean="0"/>
-              <a:t>6/16/17</a:t>
+              <a:t>6/19/17</a:t>
             </a:fld>
             <a:endParaRPr lang="en-US"/>
           </a:p>
@@ -2698,7 +2736,7 @@
           <a:p>
             <a:fld id="{C474F784-3F61-9E4C-93C7-1B314C5504FC}" type="datetimeFigureOut">
               <a:rPr lang="en-US" smtClean="0"/>
-              <a:t>6/16/17</a:t>
+              <a:t>6/19/17</a:t>
             </a:fld>
             <a:endParaRPr lang="en-US"/>
           </a:p>
@@ -2951,7 +2989,7 @@
           <a:p>
             <a:fld id="{C474F784-3F61-9E4C-93C7-1B314C5504FC}" type="datetimeFigureOut">
               <a:rPr lang="en-US" smtClean="0"/>
-              <a:t>6/16/17</a:t>
+              <a:t>6/19/17</a:t>
             </a:fld>
             <a:endParaRPr lang="en-US"/>
           </a:p>
@@ -3170,7 +3208,7 @@
           <a:p>
             <a:fld id="{C474F784-3F61-9E4C-93C7-1B314C5504FC}" type="datetimeFigureOut">
               <a:rPr lang="en-US" smtClean="0"/>
-              <a:t>6/16/17</a:t>
+              <a:t>6/19/17</a:t>
             </a:fld>
             <a:endParaRPr lang="en-US"/>
           </a:p>
@@ -3649,6 +3687,13 @@
   <p:clrMapOvr>
     <a:masterClrMapping/>
   </p:clrMapOvr>
+  <p:timing>
+    <p:tnLst>
+      <p:par>
+        <p:cTn id="1" dur="indefinite" restart="never" nodeType="tmRoot"/>
+      </p:par>
+    </p:tnLst>
+  </p:timing>
 </p:sld>
 </file>
 
@@ -6262,7 +6307,15 @@
           <a:p>
             <a:r>
               <a:rPr lang="en-US" dirty="0" smtClean="0"/>
-              <a:t>	Apps &amp; Kernels: a divorce</a:t>
+              <a:t>	Apps &amp; Kernels: </a:t>
+            </a:r>
+            <a:r>
+              <a:rPr lang="en-US" dirty="0" smtClean="0"/>
+              <a:t>A </a:t>
+            </a:r>
+            <a:r>
+              <a:rPr lang="en-US" dirty="0" smtClean="0"/>
+              <a:t>divorce</a:t>
             </a:r>
             <a:endParaRPr lang="en-US" dirty="0"/>
           </a:p>
@@ -6305,10 +6358,9 @@
           <a:p>
             <a:pPr lvl="1"/>
             <a:r>
-              <a:rPr lang="en-US" smtClean="0"/>
+              <a:rPr lang="en-US" dirty="0" smtClean="0"/>
               <a:t>User-level (re-)implementations</a:t>
             </a:r>
-            <a:endParaRPr lang="en-US" dirty="0" smtClean="0"/>
           </a:p>
           <a:p>
             <a:pPr lvl="1"/>
@@ -6340,22 +6392,48 @@
           <a:p>
             <a:pPr lvl="1"/>
             <a:r>
+              <a:rPr lang="en-US" i="1" dirty="0"/>
+              <a:t>“Pirates are back</a:t>
+            </a:r>
+            <a:r>
               <a:rPr lang="en-US" i="1" dirty="0" smtClean="0"/>
-              <a:t>“Don’t trust the Cloud!”</a:t>
-            </a:r>
+              <a:t>!”</a:t>
+            </a:r>
+            <a:endParaRPr lang="en-US" i="1" dirty="0" smtClean="0"/>
           </a:p>
           <a:p>
             <a:pPr lvl="1"/>
             <a:r>
               <a:rPr lang="en-US" i="1" dirty="0" smtClean="0"/>
-              <a:t>“Pirates are back!”</a:t>
-            </a:r>
+              <a:t>“</a:t>
+            </a:r>
+            <a:r>
+              <a:rPr lang="en-US" i="1" dirty="0" smtClean="0"/>
+              <a:t>Don’t trust the </a:t>
+            </a:r>
+            <a:r>
+              <a:rPr lang="en-US" i="1" dirty="0" smtClean="0"/>
+              <a:t>Cloud</a:t>
+            </a:r>
+            <a:r>
+              <a:rPr lang="mr-IN" i="1" dirty="0" smtClean="0"/>
+              <a:t>…</a:t>
+            </a:r>
+            <a:r>
+              <a:rPr lang="fr-CH" i="1" dirty="0" smtClean="0"/>
+              <a:t> or ANYTHING</a:t>
+            </a:r>
+            <a:r>
+              <a:rPr lang="en-US" i="1" dirty="0" smtClean="0"/>
+              <a:t>!”</a:t>
+            </a:r>
+            <a:endParaRPr lang="en-US" i="1" dirty="0" smtClean="0"/>
           </a:p>
           <a:p>
             <a:pPr lvl="1"/>
             <a:r>
               <a:rPr lang="en-US" i="1" dirty="0" smtClean="0"/>
-              <a:t>“Data is better than oil.”</a:t>
+              <a:t>“You’re worth less than the data you produce.”</a:t>
             </a:r>
             <a:endParaRPr lang="en-US" i="1" dirty="0"/>
           </a:p>
@@ -6395,6 +6473,1122 @@
     <p:extLst>
       <p:ext uri="{BB962C8B-B14F-4D97-AF65-F5344CB8AC3E}">
         <p14:creationId xmlns:p14="http://schemas.microsoft.com/office/powerpoint/2010/main" val="1513984936"/>
+      </p:ext>
+    </p:extLst>
+  </p:cSld>
+  <p:clrMapOvr>
+    <a:masterClrMapping/>
+  </p:clrMapOvr>
+  <p:timing>
+    <p:tnLst>
+      <p:par>
+        <p:cTn id="1" dur="indefinite" restart="never" nodeType="tmRoot"/>
+      </p:par>
+    </p:tnLst>
+  </p:timing>
+</p:sld>
+</file>
+
+<file path=ppt/slides/slide5.xml><?xml version="1.0" encoding="utf-8"?>
+<p:sld xmlns:a="http://schemas.openxmlformats.org/drawingml/2006/main" xmlns:r="http://schemas.openxmlformats.org/officeDocument/2006/relationships" xmlns:p="http://schemas.openxmlformats.org/presentationml/2006/main">
+  <p:cSld>
+    <p:spTree>
+      <p:nvGrpSpPr>
+        <p:cNvPr id="1" name=""/>
+        <p:cNvGrpSpPr/>
+        <p:nvPr/>
+      </p:nvGrpSpPr>
+      <p:grpSpPr>
+        <a:xfrm>
+          <a:off x="0" y="0"/>
+          <a:ext cx="0" cy="0"/>
+          <a:chOff x="0" y="0"/>
+          <a:chExt cx="0" cy="0"/>
+        </a:xfrm>
+      </p:grpSpPr>
+      <p:sp>
+        <p:nvSpPr>
+          <p:cNvPr id="2" name="Title 1"/>
+          <p:cNvSpPr>
+            <a:spLocks noGrp="1"/>
+          </p:cNvSpPr>
+          <p:nvPr>
+            <p:ph type="title"/>
+          </p:nvPr>
+        </p:nvSpPr>
+        <p:spPr/>
+        <p:txBody>
+          <a:bodyPr/>
+          <a:lstStyle/>
+          <a:p>
+            <a:r>
+              <a:rPr lang="en-US" dirty="0" smtClean="0"/>
+              <a:t>	Desired Features</a:t>
+            </a:r>
+            <a:endParaRPr lang="en-US" dirty="0"/>
+          </a:p>
+        </p:txBody>
+      </p:sp>
+      <p:sp>
+        <p:nvSpPr>
+          <p:cNvPr id="3" name="Content Placeholder 2"/>
+          <p:cNvSpPr>
+            <a:spLocks noGrp="1"/>
+          </p:cNvSpPr>
+          <p:nvPr>
+            <p:ph idx="1"/>
+          </p:nvPr>
+        </p:nvSpPr>
+        <p:spPr/>
+        <p:txBody>
+          <a:bodyPr/>
+          <a:lstStyle/>
+          <a:p>
+            <a:pPr>
+              <a:lnSpc>
+                <a:spcPct val="100000"/>
+              </a:lnSpc>
+              <a:spcBef>
+                <a:spcPts val="0"/>
+              </a:spcBef>
+            </a:pPr>
+            <a:r>
+              <a:rPr lang="en-US" dirty="0" smtClean="0"/>
+              <a:t>Performance</a:t>
+            </a:r>
+          </a:p>
+          <a:p>
+            <a:pPr lvl="1">
+              <a:lnSpc>
+                <a:spcPct val="100000"/>
+              </a:lnSpc>
+              <a:spcBef>
+                <a:spcPts val="0"/>
+              </a:spcBef>
+            </a:pPr>
+            <a:r>
+              <a:rPr lang="en-US" dirty="0" smtClean="0"/>
+              <a:t>For heterogeneous application requirements.</a:t>
+            </a:r>
+          </a:p>
+          <a:p>
+            <a:pPr lvl="1">
+              <a:lnSpc>
+                <a:spcPct val="100000"/>
+              </a:lnSpc>
+              <a:spcBef>
+                <a:spcPts val="0"/>
+              </a:spcBef>
+            </a:pPr>
+            <a:r>
+              <a:rPr lang="en-US" dirty="0" smtClean="0"/>
+              <a:t>For large number of external devices.</a:t>
+            </a:r>
+          </a:p>
+          <a:p>
+            <a:pPr lvl="1">
+              <a:lnSpc>
+                <a:spcPct val="100000"/>
+              </a:lnSpc>
+              <a:spcBef>
+                <a:spcPts val="0"/>
+              </a:spcBef>
+            </a:pPr>
+            <a:endParaRPr lang="en-US" dirty="0"/>
+          </a:p>
+          <a:p>
+            <a:pPr>
+              <a:lnSpc>
+                <a:spcPct val="100000"/>
+              </a:lnSpc>
+              <a:spcBef>
+                <a:spcPts val="0"/>
+              </a:spcBef>
+            </a:pPr>
+            <a:r>
+              <a:rPr lang="en-US" dirty="0" smtClean="0"/>
+              <a:t>Security</a:t>
+            </a:r>
+          </a:p>
+          <a:p>
+            <a:pPr lvl="1">
+              <a:lnSpc>
+                <a:spcPct val="100000"/>
+              </a:lnSpc>
+              <a:spcBef>
+                <a:spcPts val="0"/>
+              </a:spcBef>
+            </a:pPr>
+            <a:r>
+              <a:rPr lang="en-US" dirty="0" smtClean="0"/>
+              <a:t>Confidentiality and Integrity.</a:t>
+            </a:r>
+          </a:p>
+          <a:p>
+            <a:pPr lvl="1">
+              <a:lnSpc>
+                <a:spcPct val="100000"/>
+              </a:lnSpc>
+              <a:spcBef>
+                <a:spcPts val="0"/>
+              </a:spcBef>
+            </a:pPr>
+            <a:r>
+              <a:rPr lang="en-US" dirty="0" smtClean="0"/>
+              <a:t>Bi-directional mistrust between host/guest.</a:t>
+            </a:r>
+          </a:p>
+          <a:p>
+            <a:pPr lvl="1">
+              <a:lnSpc>
+                <a:spcPct val="100000"/>
+              </a:lnSpc>
+              <a:spcBef>
+                <a:spcPts val="0"/>
+              </a:spcBef>
+            </a:pPr>
+            <a:endParaRPr lang="en-US" dirty="0"/>
+          </a:p>
+          <a:p>
+            <a:pPr marL="0" indent="0">
+              <a:lnSpc>
+                <a:spcPct val="100000"/>
+              </a:lnSpc>
+              <a:spcBef>
+                <a:spcPts val="0"/>
+              </a:spcBef>
+              <a:buNone/>
+            </a:pPr>
+            <a:r>
+              <a:rPr lang="en-US" i="1" dirty="0" smtClean="0"/>
+              <a:t>Re-define respective roles of kernels and applications.</a:t>
+            </a:r>
+          </a:p>
+        </p:txBody>
+      </p:sp>
+    </p:spTree>
+    <p:extLst>
+      <p:ext uri="{BB962C8B-B14F-4D97-AF65-F5344CB8AC3E}">
+        <p14:creationId xmlns:p14="http://schemas.microsoft.com/office/powerpoint/2010/main" val="1963956225"/>
+      </p:ext>
+    </p:extLst>
+  </p:cSld>
+  <p:clrMapOvr>
+    <a:masterClrMapping/>
+  </p:clrMapOvr>
+  <p:timing>
+    <p:tnLst>
+      <p:par>
+        <p:cTn id="1" dur="indefinite" restart="never" nodeType="tmRoot"/>
+      </p:par>
+    </p:tnLst>
+  </p:timing>
+</p:sld>
+</file>
+
+<file path=ppt/slides/slide6.xml><?xml version="1.0" encoding="utf-8"?>
+<p:sld xmlns:a="http://schemas.openxmlformats.org/drawingml/2006/main" xmlns:r="http://schemas.openxmlformats.org/officeDocument/2006/relationships" xmlns:p="http://schemas.openxmlformats.org/presentationml/2006/main">
+  <p:cSld>
+    <p:spTree>
+      <p:nvGrpSpPr>
+        <p:cNvPr id="1" name=""/>
+        <p:cNvGrpSpPr/>
+        <p:nvPr/>
+      </p:nvGrpSpPr>
+      <p:grpSpPr>
+        <a:xfrm>
+          <a:off x="0" y="0"/>
+          <a:ext cx="0" cy="0"/>
+          <a:chOff x="0" y="0"/>
+          <a:chExt cx="0" cy="0"/>
+        </a:xfrm>
+      </p:grpSpPr>
+      <p:sp>
+        <p:nvSpPr>
+          <p:cNvPr id="2" name="Title 1"/>
+          <p:cNvSpPr>
+            <a:spLocks noGrp="1"/>
+          </p:cNvSpPr>
+          <p:nvPr>
+            <p:ph type="title"/>
+          </p:nvPr>
+        </p:nvSpPr>
+        <p:spPr/>
+        <p:txBody>
+          <a:bodyPr/>
+          <a:lstStyle/>
+          <a:p>
+            <a:r>
+              <a:rPr lang="en-US" dirty="0" smtClean="0"/>
+              <a:t>	Haven &amp; Intel SGX</a:t>
+            </a:r>
+            <a:endParaRPr lang="en-US" dirty="0"/>
+          </a:p>
+        </p:txBody>
+      </p:sp>
+      <p:sp>
+        <p:nvSpPr>
+          <p:cNvPr id="3" name="Content Placeholder 2"/>
+          <p:cNvSpPr>
+            <a:spLocks noGrp="1"/>
+          </p:cNvSpPr>
+          <p:nvPr>
+            <p:ph idx="1"/>
+          </p:nvPr>
+        </p:nvSpPr>
+        <p:spPr>
+          <a:xfrm>
+            <a:off x="838200" y="1654175"/>
+            <a:ext cx="10515600" cy="4351338"/>
+          </a:xfrm>
+        </p:spPr>
+        <p:txBody>
+          <a:bodyPr/>
+          <a:lstStyle/>
+          <a:p>
+            <a:pPr marL="0" marR="0" lvl="0" indent="0" defTabSz="914400" eaLnBrk="1" fontAlgn="auto" latinLnBrk="0" hangingPunct="1">
+              <a:lnSpc>
+                <a:spcPct val="100000"/>
+              </a:lnSpc>
+              <a:spcBef>
+                <a:spcPts val="0"/>
+              </a:spcBef>
+              <a:spcAft>
+                <a:spcPts val="0"/>
+              </a:spcAft>
+              <a:buClrTx/>
+              <a:buSzTx/>
+              <a:buFontTx/>
+              <a:buNone/>
+              <a:tabLst/>
+              <a:defRPr/>
+            </a:pPr>
+            <a:r>
+              <a:rPr lang="en-US" i="1" dirty="0" smtClean="0"/>
+              <a:t>Why do people use Cloud services: IaaS, SaaS, PaaS, </a:t>
+            </a:r>
+            <a:r>
+              <a:rPr lang="en-US" i="1" dirty="0" err="1" smtClean="0"/>
+              <a:t>WaaS</a:t>
+            </a:r>
+            <a:r>
+              <a:rPr lang="en-US" i="1" dirty="0" smtClean="0"/>
+              <a:t> </a:t>
+            </a:r>
+            <a:r>
+              <a:rPr lang="en-US" i="1" dirty="0" err="1" smtClean="0"/>
+              <a:t>AaaP</a:t>
+            </a:r>
+            <a:r>
+              <a:rPr lang="en-US" i="1" dirty="0" smtClean="0"/>
+              <a:t>*?</a:t>
+            </a:r>
+            <a:endParaRPr lang="en-US" dirty="0" smtClean="0"/>
+          </a:p>
+          <a:p>
+            <a:pPr>
+              <a:lnSpc>
+                <a:spcPct val="100000"/>
+              </a:lnSpc>
+              <a:spcBef>
+                <a:spcPts val="0"/>
+              </a:spcBef>
+            </a:pPr>
+            <a:endParaRPr lang="en-US" dirty="0" smtClean="0"/>
+          </a:p>
+          <a:p>
+            <a:pPr>
+              <a:lnSpc>
+                <a:spcPct val="100000"/>
+              </a:lnSpc>
+              <a:spcBef>
+                <a:spcPts val="0"/>
+              </a:spcBef>
+            </a:pPr>
+            <a:r>
+              <a:rPr lang="en-US" dirty="0" smtClean="0"/>
+              <a:t>Fast deployment</a:t>
+            </a:r>
+          </a:p>
+          <a:p>
+            <a:pPr>
+              <a:lnSpc>
+                <a:spcPct val="100000"/>
+              </a:lnSpc>
+              <a:spcBef>
+                <a:spcPts val="0"/>
+              </a:spcBef>
+            </a:pPr>
+            <a:r>
+              <a:rPr lang="en-US" dirty="0" smtClean="0"/>
+              <a:t>Low start-up cost</a:t>
+            </a:r>
+          </a:p>
+          <a:p>
+            <a:pPr>
+              <a:lnSpc>
+                <a:spcPct val="100000"/>
+              </a:lnSpc>
+              <a:spcBef>
+                <a:spcPts val="0"/>
+              </a:spcBef>
+            </a:pPr>
+            <a:r>
+              <a:rPr lang="en-US" dirty="0" smtClean="0"/>
+              <a:t>Pay-per-use</a:t>
+            </a:r>
+          </a:p>
+          <a:p>
+            <a:pPr>
+              <a:lnSpc>
+                <a:spcPct val="100000"/>
+              </a:lnSpc>
+              <a:spcBef>
+                <a:spcPts val="0"/>
+              </a:spcBef>
+            </a:pPr>
+            <a:r>
+              <a:rPr lang="en-US" dirty="0" smtClean="0"/>
+              <a:t>Adapt resources to load</a:t>
+            </a:r>
+          </a:p>
+          <a:p>
+            <a:pPr>
+              <a:lnSpc>
+                <a:spcPct val="100000"/>
+              </a:lnSpc>
+              <a:spcBef>
+                <a:spcPts val="0"/>
+              </a:spcBef>
+            </a:pPr>
+            <a:r>
+              <a:rPr lang="en-US" dirty="0" smtClean="0"/>
+              <a:t>Sounds fancy (like Big data, Machine learning, </a:t>
+            </a:r>
+            <a:r>
+              <a:rPr lang="en-US" dirty="0" err="1" smtClean="0"/>
+              <a:t>IoT</a:t>
+            </a:r>
+            <a:r>
+              <a:rPr lang="en-US" dirty="0" smtClean="0"/>
+              <a:t>, etc.)</a:t>
+            </a:r>
+            <a:endParaRPr lang="en-US" dirty="0"/>
+          </a:p>
+        </p:txBody>
+      </p:sp>
+      <p:sp>
+        <p:nvSpPr>
+          <p:cNvPr id="4" name="TextBox 3"/>
+          <p:cNvSpPr txBox="1"/>
+          <p:nvPr/>
+        </p:nvSpPr>
+        <p:spPr>
+          <a:xfrm>
+            <a:off x="857250" y="6355080"/>
+            <a:ext cx="2240280" cy="369332"/>
+          </a:xfrm>
+          <a:prstGeom prst="rect">
+            <a:avLst/>
+          </a:prstGeom>
+          <a:noFill/>
+        </p:spPr>
+        <p:txBody>
+          <a:bodyPr wrap="square" rtlCol="0">
+            <a:spAutoFit/>
+          </a:bodyPr>
+          <a:lstStyle/>
+          <a:p>
+            <a:r>
+              <a:rPr lang="en-US" dirty="0" smtClean="0"/>
+              <a:t>*This one is made up.</a:t>
+            </a:r>
+            <a:endParaRPr lang="en-US" dirty="0"/>
+          </a:p>
+        </p:txBody>
+      </p:sp>
+    </p:spTree>
+    <p:extLst>
+      <p:ext uri="{BB962C8B-B14F-4D97-AF65-F5344CB8AC3E}">
+        <p14:creationId xmlns:p14="http://schemas.microsoft.com/office/powerpoint/2010/main" val="1676130107"/>
+      </p:ext>
+    </p:extLst>
+  </p:cSld>
+  <p:clrMapOvr>
+    <a:masterClrMapping/>
+  </p:clrMapOvr>
+  <p:timing>
+    <p:tnLst>
+      <p:par>
+        <p:cTn id="1" dur="indefinite" restart="never" nodeType="tmRoot"/>
+      </p:par>
+    </p:tnLst>
+  </p:timing>
+</p:sld>
+</file>
+
+<file path=ppt/slides/slide7.xml><?xml version="1.0" encoding="utf-8"?>
+<p:sld xmlns:a="http://schemas.openxmlformats.org/drawingml/2006/main" xmlns:r="http://schemas.openxmlformats.org/officeDocument/2006/relationships" xmlns:p="http://schemas.openxmlformats.org/presentationml/2006/main">
+  <p:cSld>
+    <p:spTree>
+      <p:nvGrpSpPr>
+        <p:cNvPr id="1" name=""/>
+        <p:cNvGrpSpPr/>
+        <p:nvPr/>
+      </p:nvGrpSpPr>
+      <p:grpSpPr>
+        <a:xfrm>
+          <a:off x="0" y="0"/>
+          <a:ext cx="0" cy="0"/>
+          <a:chOff x="0" y="0"/>
+          <a:chExt cx="0" cy="0"/>
+        </a:xfrm>
+      </p:grpSpPr>
+      <p:sp>
+        <p:nvSpPr>
+          <p:cNvPr id="2" name="Title 1"/>
+          <p:cNvSpPr>
+            <a:spLocks noGrp="1"/>
+          </p:cNvSpPr>
+          <p:nvPr>
+            <p:ph type="title"/>
+          </p:nvPr>
+        </p:nvSpPr>
+        <p:spPr/>
+        <p:txBody>
+          <a:bodyPr/>
+          <a:lstStyle/>
+          <a:p>
+            <a:r>
+              <a:rPr lang="en-US" dirty="0" smtClean="0"/>
+              <a:t>	How it works</a:t>
+            </a:r>
+            <a:endParaRPr lang="en-US" dirty="0"/>
+          </a:p>
+        </p:txBody>
+      </p:sp>
+      <p:sp>
+        <p:nvSpPr>
+          <p:cNvPr id="3" name="Content Placeholder 2"/>
+          <p:cNvSpPr>
+            <a:spLocks noGrp="1"/>
+          </p:cNvSpPr>
+          <p:nvPr>
+            <p:ph sz="half" idx="1"/>
+          </p:nvPr>
+        </p:nvSpPr>
+        <p:spPr/>
+        <p:txBody>
+          <a:bodyPr/>
+          <a:lstStyle/>
+          <a:p>
+            <a:r>
+              <a:rPr lang="en-US" i="1" dirty="0" smtClean="0"/>
+              <a:t>“You have to share!”</a:t>
+            </a:r>
+          </a:p>
+          <a:p>
+            <a:pPr lvl="1"/>
+            <a:r>
+              <a:rPr lang="en-US" dirty="0" smtClean="0"/>
+              <a:t>Co-locating Apps.</a:t>
+            </a:r>
+          </a:p>
+          <a:p>
+            <a:pPr lvl="1"/>
+            <a:endParaRPr lang="en-US" dirty="0"/>
+          </a:p>
+          <a:p>
+            <a:r>
+              <a:rPr lang="en-US" dirty="0" smtClean="0"/>
+              <a:t>“</a:t>
+            </a:r>
+            <a:r>
+              <a:rPr lang="en-US" i="1" dirty="0" smtClean="0"/>
+              <a:t>Wrap it!</a:t>
+            </a:r>
+            <a:r>
+              <a:rPr lang="en-US" dirty="0" smtClean="0"/>
+              <a:t>”</a:t>
+            </a:r>
+          </a:p>
+          <a:p>
+            <a:pPr lvl="1"/>
+            <a:r>
+              <a:rPr lang="en-US" dirty="0" smtClean="0"/>
+              <a:t>Containers, VMs, etc.</a:t>
+            </a:r>
+          </a:p>
+          <a:p>
+            <a:pPr lvl="1"/>
+            <a:endParaRPr lang="en-US" dirty="0"/>
+          </a:p>
+          <a:p>
+            <a:r>
+              <a:rPr lang="en-US" dirty="0" smtClean="0"/>
+              <a:t>“</a:t>
+            </a:r>
+            <a:r>
+              <a:rPr lang="en-US" i="1" dirty="0"/>
+              <a:t>I won’t look</a:t>
+            </a:r>
+            <a:r>
+              <a:rPr lang="mr-IN" i="1" dirty="0"/>
+              <a:t>…</a:t>
+            </a:r>
+            <a:r>
+              <a:rPr lang="fr-CH" i="1" dirty="0"/>
+              <a:t> I </a:t>
+            </a:r>
+            <a:r>
+              <a:rPr lang="fr-CH" i="1" dirty="0" smtClean="0"/>
+              <a:t>promise</a:t>
+            </a:r>
+            <a:r>
+              <a:rPr lang="en-US" dirty="0" smtClean="0"/>
+              <a:t>”</a:t>
+            </a:r>
+          </a:p>
+          <a:p>
+            <a:pPr lvl="1"/>
+            <a:r>
+              <a:rPr lang="en-US" dirty="0" smtClean="0"/>
+              <a:t>CSP is privileged</a:t>
+            </a:r>
+            <a:endParaRPr lang="en-US" dirty="0"/>
+          </a:p>
+        </p:txBody>
+      </p:sp>
+      <p:sp>
+        <p:nvSpPr>
+          <p:cNvPr id="4" name="Content Placeholder 3"/>
+          <p:cNvSpPr>
+            <a:spLocks noGrp="1"/>
+          </p:cNvSpPr>
+          <p:nvPr>
+            <p:ph sz="half" idx="2"/>
+          </p:nvPr>
+        </p:nvSpPr>
+        <p:spPr/>
+        <p:txBody>
+          <a:bodyPr/>
+          <a:lstStyle/>
+          <a:p>
+            <a:r>
+              <a:rPr lang="en-US" dirty="0" smtClean="0">
+                <a:solidFill>
+                  <a:schemeClr val="accent2"/>
+                </a:solidFill>
+              </a:rPr>
+              <a:t>Corrupted/malevolent host</a:t>
+            </a:r>
+          </a:p>
+          <a:p>
+            <a:endParaRPr lang="en-US" dirty="0"/>
+          </a:p>
+          <a:p>
+            <a:r>
+              <a:rPr lang="en-US" i="1" dirty="0" smtClean="0">
+                <a:solidFill>
+                  <a:schemeClr val="accent2"/>
+                </a:solidFill>
+              </a:rPr>
+              <a:t>“Solve the rebus”</a:t>
+            </a:r>
+            <a:endParaRPr lang="en-US" i="1" dirty="0">
+              <a:solidFill>
+                <a:schemeClr val="accent2"/>
+              </a:solidFill>
+            </a:endParaRPr>
+          </a:p>
+        </p:txBody>
+      </p:sp>
+      <p:pic>
+        <p:nvPicPr>
+          <p:cNvPr id="8" name="Picture 7"/>
+          <p:cNvPicPr>
+            <a:picLocks noChangeAspect="1"/>
+          </p:cNvPicPr>
+          <p:nvPr/>
+        </p:nvPicPr>
+        <p:blipFill>
+          <a:blip r:embed="rId2">
+            <a:extLst>
+              <a:ext uri="{28A0092B-C50C-407E-A947-70E740481C1C}">
+                <a14:useLocalDpi xmlns:a14="http://schemas.microsoft.com/office/drawing/2010/main" val="0"/>
+              </a:ext>
+            </a:extLst>
+          </a:blip>
+          <a:stretch>
+            <a:fillRect/>
+          </a:stretch>
+        </p:blipFill>
+        <p:spPr>
+          <a:xfrm>
+            <a:off x="6172200" y="3863340"/>
+            <a:ext cx="1319472" cy="1319472"/>
+          </a:xfrm>
+          <a:prstGeom prst="rect">
+            <a:avLst/>
+          </a:prstGeom>
+        </p:spPr>
+      </p:pic>
+      <p:pic>
+        <p:nvPicPr>
+          <p:cNvPr id="9" name="Picture 8"/>
+          <p:cNvPicPr>
+            <a:picLocks noChangeAspect="1"/>
+          </p:cNvPicPr>
+          <p:nvPr/>
+        </p:nvPicPr>
+        <p:blipFill>
+          <a:blip r:embed="rId3">
+            <a:extLst>
+              <a:ext uri="{28A0092B-C50C-407E-A947-70E740481C1C}">
+                <a14:useLocalDpi xmlns:a14="http://schemas.microsoft.com/office/drawing/2010/main" val="0"/>
+              </a:ext>
+            </a:extLst>
+          </a:blip>
+          <a:stretch>
+            <a:fillRect/>
+          </a:stretch>
+        </p:blipFill>
+        <p:spPr>
+          <a:xfrm>
+            <a:off x="7491672" y="3998090"/>
+            <a:ext cx="1111388" cy="1111388"/>
+          </a:xfrm>
+          <a:prstGeom prst="rect">
+            <a:avLst/>
+          </a:prstGeom>
+        </p:spPr>
+      </p:pic>
+      <p:pic>
+        <p:nvPicPr>
+          <p:cNvPr id="10" name="Picture 9"/>
+          <p:cNvPicPr>
+            <a:picLocks noChangeAspect="1"/>
+          </p:cNvPicPr>
+          <p:nvPr/>
+        </p:nvPicPr>
+        <p:blipFill>
+          <a:blip r:embed="rId4">
+            <a:extLst>
+              <a:ext uri="{28A0092B-C50C-407E-A947-70E740481C1C}">
+                <a14:useLocalDpi xmlns:a14="http://schemas.microsoft.com/office/drawing/2010/main" val="0"/>
+              </a:ext>
+            </a:extLst>
+          </a:blip>
+          <a:stretch>
+            <a:fillRect/>
+          </a:stretch>
+        </p:blipFill>
+        <p:spPr>
+          <a:xfrm>
+            <a:off x="8603060" y="4069190"/>
+            <a:ext cx="994767" cy="907772"/>
+          </a:xfrm>
+          <a:prstGeom prst="rect">
+            <a:avLst/>
+          </a:prstGeom>
+        </p:spPr>
+      </p:pic>
+    </p:spTree>
+    <p:extLst>
+      <p:ext uri="{BB962C8B-B14F-4D97-AF65-F5344CB8AC3E}">
+        <p14:creationId xmlns:p14="http://schemas.microsoft.com/office/powerpoint/2010/main" val="744257271"/>
+      </p:ext>
+    </p:extLst>
+  </p:cSld>
+  <p:clrMapOvr>
+    <a:masterClrMapping/>
+  </p:clrMapOvr>
+  <p:timing>
+    <p:tnLst>
+      <p:par>
+        <p:cTn id="1" dur="indefinite" restart="never" nodeType="tmRoot">
+          <p:childTnLst>
+            <p:seq concurrent="1" nextAc="seek">
+              <p:cTn id="2" dur="indefinite" nodeType="mainSeq">
+                <p:childTnLst>
+                  <p:par>
+                    <p:cTn id="3" fill="hold">
+                      <p:stCondLst>
+                        <p:cond delay="indefinite"/>
+                      </p:stCondLst>
+                      <p:childTnLst>
+                        <p:par>
+                          <p:cTn id="4" fill="hold">
+                            <p:stCondLst>
+                              <p:cond delay="0"/>
+                            </p:stCondLst>
+                            <p:childTnLst>
+                              <p:par>
+                                <p:cTn id="5" presetID="1" presetClass="entr" presetSubtype="0" fill="hold" grpId="0" nodeType="clickEffect">
+                                  <p:stCondLst>
+                                    <p:cond delay="0"/>
+                                  </p:stCondLst>
+                                  <p:childTnLst>
+                                    <p:set>
+                                      <p:cBhvr>
+                                        <p:cTn id="6" dur="1" fill="hold">
+                                          <p:stCondLst>
+                                            <p:cond delay="0"/>
+                                          </p:stCondLst>
+                                        </p:cTn>
+                                        <p:tgtEl>
+                                          <p:spTgt spid="4">
+                                            <p:txEl>
+                                              <p:pRg st="0" end="0"/>
+                                            </p:txEl>
+                                          </p:spTgt>
+                                        </p:tgtEl>
+                                        <p:attrNameLst>
+                                          <p:attrName>style.visibility</p:attrName>
+                                        </p:attrNameLst>
+                                      </p:cBhvr>
+                                      <p:to>
+                                        <p:strVal val="visible"/>
+                                      </p:to>
+                                    </p:set>
+                                  </p:childTnLst>
+                                </p:cTn>
+                              </p:par>
+                            </p:childTnLst>
+                          </p:cTn>
+                        </p:par>
+                      </p:childTnLst>
+                    </p:cTn>
+                  </p:par>
+                  <p:par>
+                    <p:cTn id="7" fill="hold">
+                      <p:stCondLst>
+                        <p:cond delay="indefinite"/>
+                      </p:stCondLst>
+                      <p:childTnLst>
+                        <p:par>
+                          <p:cTn id="8" fill="hold">
+                            <p:stCondLst>
+                              <p:cond delay="0"/>
+                            </p:stCondLst>
+                            <p:childTnLst>
+                              <p:par>
+                                <p:cTn id="9" presetID="1" presetClass="entr" presetSubtype="0" fill="hold" grpId="0" nodeType="clickEffect">
+                                  <p:stCondLst>
+                                    <p:cond delay="0"/>
+                                  </p:stCondLst>
+                                  <p:childTnLst>
+                                    <p:set>
+                                      <p:cBhvr>
+                                        <p:cTn id="10" dur="1" fill="hold">
+                                          <p:stCondLst>
+                                            <p:cond delay="0"/>
+                                          </p:stCondLst>
+                                        </p:cTn>
+                                        <p:tgtEl>
+                                          <p:spTgt spid="4">
+                                            <p:txEl>
+                                              <p:pRg st="2" end="2"/>
+                                            </p:txEl>
+                                          </p:spTgt>
+                                        </p:tgtEl>
+                                        <p:attrNameLst>
+                                          <p:attrName>style.visibility</p:attrName>
+                                        </p:attrNameLst>
+                                      </p:cBhvr>
+                                      <p:to>
+                                        <p:strVal val="visible"/>
+                                      </p:to>
+                                    </p:set>
+                                  </p:childTnLst>
+                                </p:cTn>
+                              </p:par>
+                              <p:par>
+                                <p:cTn id="11" presetID="1" presetClass="entr" presetSubtype="0" fill="hold" nodeType="withEffect">
+                                  <p:stCondLst>
+                                    <p:cond delay="0"/>
+                                  </p:stCondLst>
+                                  <p:childTnLst>
+                                    <p:set>
+                                      <p:cBhvr>
+                                        <p:cTn id="12" dur="1" fill="hold">
+                                          <p:stCondLst>
+                                            <p:cond delay="0"/>
+                                          </p:stCondLst>
+                                        </p:cTn>
+                                        <p:tgtEl>
+                                          <p:spTgt spid="8"/>
+                                        </p:tgtEl>
+                                        <p:attrNameLst>
+                                          <p:attrName>style.visibility</p:attrName>
+                                        </p:attrNameLst>
+                                      </p:cBhvr>
+                                      <p:to>
+                                        <p:strVal val="visible"/>
+                                      </p:to>
+                                    </p:set>
+                                  </p:childTnLst>
+                                </p:cTn>
+                              </p:par>
+                              <p:par>
+                                <p:cTn id="13" presetID="1" presetClass="entr" presetSubtype="0" fill="hold" nodeType="withEffect">
+                                  <p:stCondLst>
+                                    <p:cond delay="0"/>
+                                  </p:stCondLst>
+                                  <p:childTnLst>
+                                    <p:set>
+                                      <p:cBhvr>
+                                        <p:cTn id="14" dur="1" fill="hold">
+                                          <p:stCondLst>
+                                            <p:cond delay="0"/>
+                                          </p:stCondLst>
+                                        </p:cTn>
+                                        <p:tgtEl>
+                                          <p:spTgt spid="9"/>
+                                        </p:tgtEl>
+                                        <p:attrNameLst>
+                                          <p:attrName>style.visibility</p:attrName>
+                                        </p:attrNameLst>
+                                      </p:cBhvr>
+                                      <p:to>
+                                        <p:strVal val="visible"/>
+                                      </p:to>
+                                    </p:set>
+                                  </p:childTnLst>
+                                </p:cTn>
+                              </p:par>
+                              <p:par>
+                                <p:cTn id="15" presetID="1" presetClass="entr" presetSubtype="0" fill="hold" nodeType="withEffect">
+                                  <p:stCondLst>
+                                    <p:cond delay="0"/>
+                                  </p:stCondLst>
+                                  <p:childTnLst>
+                                    <p:set>
+                                      <p:cBhvr>
+                                        <p:cTn id="16" dur="1" fill="hold">
+                                          <p:stCondLst>
+                                            <p:cond delay="0"/>
+                                          </p:stCondLst>
+                                        </p:cTn>
+                                        <p:tgtEl>
+                                          <p:spTgt spid="10"/>
+                                        </p:tgtEl>
+                                        <p:attrNameLst>
+                                          <p:attrName>style.visibility</p:attrName>
+                                        </p:attrNameLst>
+                                      </p:cBhvr>
+                                      <p:to>
+                                        <p:strVal val="visible"/>
+                                      </p:to>
+                                    </p:set>
+                                  </p:childTnLst>
+                                </p:cTn>
+                              </p:par>
+                            </p:childTnLst>
+                          </p:cTn>
+                        </p:par>
+                      </p:childTnLst>
+                    </p:cTn>
+                  </p:par>
+                </p:childTnLst>
+              </p:cTn>
+              <p:prevCondLst>
+                <p:cond evt="onPrev" delay="0">
+                  <p:tgtEl>
+                    <p:sldTgt/>
+                  </p:tgtEl>
+                </p:cond>
+              </p:prevCondLst>
+              <p:nextCondLst>
+                <p:cond evt="onNext" delay="0">
+                  <p:tgtEl>
+                    <p:sldTgt/>
+                  </p:tgtEl>
+                </p:cond>
+              </p:nextCondLst>
+            </p:seq>
+          </p:childTnLst>
+        </p:cTn>
+      </p:par>
+    </p:tnLst>
+    <p:bldLst>
+      <p:bldP spid="4" grpId="0" build="p"/>
+    </p:bldLst>
+  </p:timing>
+</p:sld>
+</file>
+
+<file path=ppt/slides/slide8.xml><?xml version="1.0" encoding="utf-8"?>
+<p:sld xmlns:a="http://schemas.openxmlformats.org/drawingml/2006/main" xmlns:r="http://schemas.openxmlformats.org/officeDocument/2006/relationships" xmlns:p="http://schemas.openxmlformats.org/presentationml/2006/main">
+  <p:cSld>
+    <p:spTree>
+      <p:nvGrpSpPr>
+        <p:cNvPr id="1" name=""/>
+        <p:cNvGrpSpPr/>
+        <p:nvPr/>
+      </p:nvGrpSpPr>
+      <p:grpSpPr>
+        <a:xfrm>
+          <a:off x="0" y="0"/>
+          <a:ext cx="0" cy="0"/>
+          <a:chOff x="0" y="0"/>
+          <a:chExt cx="0" cy="0"/>
+        </a:xfrm>
+      </p:grpSpPr>
+      <p:sp>
+        <p:nvSpPr>
+          <p:cNvPr id="2" name="Title 1"/>
+          <p:cNvSpPr>
+            <a:spLocks noGrp="1"/>
+          </p:cNvSpPr>
+          <p:nvPr>
+            <p:ph type="title"/>
+          </p:nvPr>
+        </p:nvSpPr>
+        <p:spPr/>
+        <p:txBody>
+          <a:bodyPr/>
+          <a:lstStyle/>
+          <a:p>
+            <a:r>
+              <a:rPr lang="en-US" dirty="0" smtClean="0"/>
+              <a:t>	Haven </a:t>
+            </a:r>
+            <a:r>
+              <a:rPr lang="en-US" sz="2400" dirty="0" smtClean="0"/>
+              <a:t>- Thanks Microsoft.</a:t>
+            </a:r>
+            <a:endParaRPr lang="en-US" dirty="0"/>
+          </a:p>
+        </p:txBody>
+      </p:sp>
+      <p:sp>
+        <p:nvSpPr>
+          <p:cNvPr id="3" name="Content Placeholder 2"/>
+          <p:cNvSpPr>
+            <a:spLocks noGrp="1"/>
+          </p:cNvSpPr>
+          <p:nvPr>
+            <p:ph idx="1"/>
+          </p:nvPr>
+        </p:nvSpPr>
+        <p:spPr/>
+        <p:txBody>
+          <a:bodyPr/>
+          <a:lstStyle/>
+          <a:p>
+            <a:r>
+              <a:rPr lang="en-US" dirty="0" smtClean="0"/>
+              <a:t>Unmodified legacy applications</a:t>
+            </a:r>
+          </a:p>
+          <a:p>
+            <a:endParaRPr lang="en-US" dirty="0"/>
+          </a:p>
+          <a:p>
+            <a:r>
+              <a:rPr lang="en-US" dirty="0" smtClean="0"/>
+              <a:t>Shielded execution</a:t>
+            </a:r>
+          </a:p>
+          <a:p>
+            <a:pPr lvl="1"/>
+            <a:r>
+              <a:rPr lang="en-US" dirty="0" smtClean="0"/>
+              <a:t>Confidentiality</a:t>
+            </a:r>
+          </a:p>
+          <a:p>
+            <a:pPr lvl="1"/>
+            <a:r>
+              <a:rPr lang="en-US" dirty="0" smtClean="0"/>
+              <a:t>Integrity</a:t>
+            </a:r>
+          </a:p>
+          <a:p>
+            <a:pPr lvl="1"/>
+            <a:endParaRPr lang="en-US" dirty="0"/>
+          </a:p>
+          <a:p>
+            <a:r>
+              <a:rPr lang="en-US" dirty="0" smtClean="0"/>
+              <a:t>Leverages Intel SGX</a:t>
+            </a:r>
+          </a:p>
+          <a:p>
+            <a:pPr lvl="1"/>
+            <a:r>
+              <a:rPr lang="en-US" dirty="0" smtClean="0"/>
+              <a:t>Provides feedback.</a:t>
+            </a:r>
+            <a:endParaRPr lang="en-US" dirty="0"/>
+          </a:p>
+        </p:txBody>
+      </p:sp>
+      <p:pic>
+        <p:nvPicPr>
+          <p:cNvPr id="4" name="Picture 3"/>
+          <p:cNvPicPr>
+            <a:picLocks noChangeAspect="1"/>
+          </p:cNvPicPr>
+          <p:nvPr/>
+        </p:nvPicPr>
+        <p:blipFill>
+          <a:blip r:embed="rId2">
+            <a:extLst>
+              <a:ext uri="{28A0092B-C50C-407E-A947-70E740481C1C}">
+                <a14:useLocalDpi xmlns:a14="http://schemas.microsoft.com/office/drawing/2010/main" val="0"/>
+              </a:ext>
+            </a:extLst>
+          </a:blip>
+          <a:stretch>
+            <a:fillRect/>
+          </a:stretch>
+        </p:blipFill>
+        <p:spPr>
+          <a:xfrm>
+            <a:off x="6625039" y="1342800"/>
+            <a:ext cx="5254395" cy="5254395"/>
+          </a:xfrm>
+          <a:prstGeom prst="rect">
+            <a:avLst/>
+          </a:prstGeom>
+        </p:spPr>
+      </p:pic>
+      <p:pic>
+        <p:nvPicPr>
+          <p:cNvPr id="5" name="Picture 4"/>
+          <p:cNvPicPr>
+            <a:picLocks noChangeAspect="1"/>
+          </p:cNvPicPr>
+          <p:nvPr/>
+        </p:nvPicPr>
+        <p:blipFill>
+          <a:blip r:embed="rId3">
+            <a:extLst>
+              <a:ext uri="{28A0092B-C50C-407E-A947-70E740481C1C}">
+                <a14:useLocalDpi xmlns:a14="http://schemas.microsoft.com/office/drawing/2010/main" val="0"/>
+              </a:ext>
+            </a:extLst>
+          </a:blip>
+          <a:stretch>
+            <a:fillRect/>
+          </a:stretch>
+        </p:blipFill>
+        <p:spPr>
+          <a:xfrm>
+            <a:off x="7663819" y="2797797"/>
+            <a:ext cx="3176833" cy="1172200"/>
+          </a:xfrm>
+          <a:prstGeom prst="rect">
+            <a:avLst/>
+          </a:prstGeom>
+        </p:spPr>
+      </p:pic>
+    </p:spTree>
+    <p:extLst>
+      <p:ext uri="{BB962C8B-B14F-4D97-AF65-F5344CB8AC3E}">
+        <p14:creationId xmlns:p14="http://schemas.microsoft.com/office/powerpoint/2010/main" val="2087482652"/>
       </p:ext>
     </p:extLst>
   </p:cSld>

</xml_diff>

<commit_message>
Working on Exokernel part
</commit_message>
<xml_diff>
--- a/CE_presentation.pptx
+++ b/CE_presentation.pptx
@@ -5,7 +5,7 @@
     <p:sldMasterId id="2147483648" r:id="rId1"/>
   </p:sldMasterIdLst>
   <p:notesMasterIdLst>
-    <p:notesMasterId r:id="rId10"/>
+    <p:notesMasterId r:id="rId18"/>
   </p:notesMasterIdLst>
   <p:sldIdLst>
     <p:sldId id="256" r:id="rId2"/>
@@ -13,9 +13,17 @@
     <p:sldId id="259" r:id="rId4"/>
     <p:sldId id="260" r:id="rId5"/>
     <p:sldId id="261" r:id="rId6"/>
-    <p:sldId id="262" r:id="rId7"/>
-    <p:sldId id="263" r:id="rId8"/>
-    <p:sldId id="264" r:id="rId9"/>
+    <p:sldId id="266" r:id="rId7"/>
+    <p:sldId id="267" r:id="rId8"/>
+    <p:sldId id="268" r:id="rId9"/>
+    <p:sldId id="272" r:id="rId10"/>
+    <p:sldId id="269" r:id="rId11"/>
+    <p:sldId id="270" r:id="rId12"/>
+    <p:sldId id="271" r:id="rId13"/>
+    <p:sldId id="262" r:id="rId14"/>
+    <p:sldId id="263" r:id="rId15"/>
+    <p:sldId id="264" r:id="rId16"/>
+    <p:sldId id="265" r:id="rId17"/>
   </p:sldIdLst>
   <p:sldSz cx="12192000" cy="6858000"/>
   <p:notesSz cx="6858000" cy="9144000"/>
@@ -204,7 +212,7 @@
           <a:p>
             <a:fld id="{79C7D925-ACBC-A942-AEA8-AF2DA2D0E5F6}" type="datetimeFigureOut">
               <a:rPr lang="en-US" smtClean="0"/>
-              <a:t>6/19/17</a:t>
+              <a:t>6/21/17</a:t>
             </a:fld>
             <a:endParaRPr lang="en-US"/>
           </a:p>
@@ -674,19 +682,7 @@
                 <a:ea typeface="+mn-ea"/>
                 <a:cs typeface="+mn-cs"/>
               </a:rPr>
-              <a:t>Put lots of things at the very end</a:t>
-            </a:r>
-            <a:r>
-              <a:rPr lang="en-US" sz="1200" b="0" i="0" kern="1200" baseline="0" dirty="0" smtClean="0">
-                <a:solidFill>
-                  <a:schemeClr val="tx1"/>
-                </a:solidFill>
-                <a:effectLst/>
-                <a:latin typeface="+mn-lt"/>
-                <a:ea typeface="+mn-ea"/>
-                <a:cs typeface="+mn-cs"/>
-              </a:rPr>
-              <a:t>.</a:t>
+              <a:t>Put lots of things at the very end.</a:t>
             </a:r>
           </a:p>
           <a:p>
@@ -876,7 +872,7 @@
           <a:p>
             <a:fld id="{C474F784-3F61-9E4C-93C7-1B314C5504FC}" type="datetimeFigureOut">
               <a:rPr lang="en-US" smtClean="0"/>
-              <a:t>6/19/17</a:t>
+              <a:t>6/21/17</a:t>
             </a:fld>
             <a:endParaRPr lang="en-US"/>
           </a:p>
@@ -1046,7 +1042,7 @@
           <a:p>
             <a:fld id="{C474F784-3F61-9E4C-93C7-1B314C5504FC}" type="datetimeFigureOut">
               <a:rPr lang="en-US" smtClean="0"/>
-              <a:t>6/19/17</a:t>
+              <a:t>6/21/17</a:t>
             </a:fld>
             <a:endParaRPr lang="en-US"/>
           </a:p>
@@ -1226,7 +1222,7 @@
           <a:p>
             <a:fld id="{C474F784-3F61-9E4C-93C7-1B314C5504FC}" type="datetimeFigureOut">
               <a:rPr lang="en-US" smtClean="0"/>
-              <a:t>6/19/17</a:t>
+              <a:t>6/21/17</a:t>
             </a:fld>
             <a:endParaRPr lang="en-US"/>
           </a:p>
@@ -1401,7 +1397,7 @@
           <a:p>
             <a:fld id="{C474F784-3F61-9E4C-93C7-1B314C5504FC}" type="datetimeFigureOut">
               <a:rPr lang="en-US" smtClean="0"/>
-              <a:t>6/19/17</a:t>
+              <a:t>6/21/17</a:t>
             </a:fld>
             <a:endParaRPr lang="en-US"/>
           </a:p>
@@ -1647,7 +1643,7 @@
           <a:p>
             <a:fld id="{C474F784-3F61-9E4C-93C7-1B314C5504FC}" type="datetimeFigureOut">
               <a:rPr lang="en-US" smtClean="0"/>
-              <a:t>6/19/17</a:t>
+              <a:t>6/21/17</a:t>
             </a:fld>
             <a:endParaRPr lang="en-US"/>
           </a:p>
@@ -1879,7 +1875,7 @@
           <a:p>
             <a:fld id="{C474F784-3F61-9E4C-93C7-1B314C5504FC}" type="datetimeFigureOut">
               <a:rPr lang="en-US" smtClean="0"/>
-              <a:t>6/19/17</a:t>
+              <a:t>6/21/17</a:t>
             </a:fld>
             <a:endParaRPr lang="en-US"/>
           </a:p>
@@ -2246,7 +2242,7 @@
           <a:p>
             <a:fld id="{C474F784-3F61-9E4C-93C7-1B314C5504FC}" type="datetimeFigureOut">
               <a:rPr lang="en-US" smtClean="0"/>
-              <a:t>6/19/17</a:t>
+              <a:t>6/21/17</a:t>
             </a:fld>
             <a:endParaRPr lang="en-US"/>
           </a:p>
@@ -2364,7 +2360,7 @@
           <a:p>
             <a:fld id="{C474F784-3F61-9E4C-93C7-1B314C5504FC}" type="datetimeFigureOut">
               <a:rPr lang="en-US" smtClean="0"/>
-              <a:t>6/19/17</a:t>
+              <a:t>6/21/17</a:t>
             </a:fld>
             <a:endParaRPr lang="en-US"/>
           </a:p>
@@ -2459,7 +2455,7 @@
           <a:p>
             <a:fld id="{C474F784-3F61-9E4C-93C7-1B314C5504FC}" type="datetimeFigureOut">
               <a:rPr lang="en-US" smtClean="0"/>
-              <a:t>6/19/17</a:t>
+              <a:t>6/21/17</a:t>
             </a:fld>
             <a:endParaRPr lang="en-US"/>
           </a:p>
@@ -2736,7 +2732,7 @@
           <a:p>
             <a:fld id="{C474F784-3F61-9E4C-93C7-1B314C5504FC}" type="datetimeFigureOut">
               <a:rPr lang="en-US" smtClean="0"/>
-              <a:t>6/19/17</a:t>
+              <a:t>6/21/17</a:t>
             </a:fld>
             <a:endParaRPr lang="en-US"/>
           </a:p>
@@ -2989,7 +2985,7 @@
           <a:p>
             <a:fld id="{C474F784-3F61-9E4C-93C7-1B314C5504FC}" type="datetimeFigureOut">
               <a:rPr lang="en-US" smtClean="0"/>
-              <a:t>6/19/17</a:t>
+              <a:t>6/21/17</a:t>
             </a:fld>
             <a:endParaRPr lang="en-US"/>
           </a:p>
@@ -3208,7 +3204,7 @@
           <a:p>
             <a:fld id="{C474F784-3F61-9E4C-93C7-1B314C5504FC}" type="datetimeFigureOut">
               <a:rPr lang="en-US" smtClean="0"/>
-              <a:t>6/19/17</a:t>
+              <a:t>6/21/17</a:t>
             </a:fld>
             <a:endParaRPr lang="en-US"/>
           </a:p>
@@ -3640,7 +3636,7 @@
           <a:p>
             <a:r>
               <a:rPr lang="en-US" dirty="0" smtClean="0"/>
-              <a:t>Modern Kernel Design</a:t>
+              <a:t>OS Design When the OS Cannot Be Trusted</a:t>
             </a:r>
             <a:endParaRPr lang="en-US" dirty="0"/>
           </a:p>
@@ -3673,10 +3669,46 @@
               <a:rPr lang="en-US" dirty="0" smtClean="0"/>
               <a:t> Candidacy Exam</a:t>
             </a:r>
+          </a:p>
+          <a:p>
+            <a:r>
+              <a:rPr lang="en-US" dirty="0" smtClean="0"/>
+              <a:t>29.06.2017</a:t>
+            </a:r>
             <a:endParaRPr lang="en-US" dirty="0"/>
           </a:p>
         </p:txBody>
       </p:sp>
+      <p:pic>
+        <p:nvPicPr>
+          <p:cNvPr id="4" name="Picture 3"/>
+          <p:cNvPicPr>
+            <a:picLocks noChangeAspect="1"/>
+          </p:cNvPicPr>
+          <p:nvPr/>
+        </p:nvPicPr>
+        <p:blipFill>
+          <a:blip r:embed="rId2">
+            <a:extLst>
+              <a:ext uri="{28A0092B-C50C-407E-A947-70E740481C1C}">
+                <a14:useLocalDpi xmlns:a14="http://schemas.microsoft.com/office/drawing/2010/main" val="0"/>
+              </a:ext>
+            </a:extLst>
+          </a:blip>
+          <a:stretch>
+            <a:fillRect/>
+          </a:stretch>
+        </p:blipFill>
+        <p:spPr>
+          <a:xfrm>
+            <a:off x="5055870" y="4644390"/>
+            <a:ext cx="2080260" cy="998525"/>
+          </a:xfrm>
+          <a:prstGeom prst="rect">
+            <a:avLst/>
+          </a:prstGeom>
+        </p:spPr>
+      </p:pic>
     </p:spTree>
     <p:extLst>
       <p:ext uri="{BB962C8B-B14F-4D97-AF65-F5344CB8AC3E}">
@@ -3693,6 +3725,1847 @@
         <p:cTn id="1" dur="indefinite" restart="never" nodeType="tmRoot"/>
       </p:par>
     </p:tnLst>
+  </p:timing>
+</p:sld>
+</file>
+
+<file path=ppt/slides/slide10.xml><?xml version="1.0" encoding="utf-8"?>
+<p:sld xmlns:a="http://schemas.openxmlformats.org/drawingml/2006/main" xmlns:r="http://schemas.openxmlformats.org/officeDocument/2006/relationships" xmlns:p="http://schemas.openxmlformats.org/presentationml/2006/main">
+  <p:cSld>
+    <p:spTree>
+      <p:nvGrpSpPr>
+        <p:cNvPr id="1" name=""/>
+        <p:cNvGrpSpPr/>
+        <p:nvPr/>
+      </p:nvGrpSpPr>
+      <p:grpSpPr>
+        <a:xfrm>
+          <a:off x="0" y="0"/>
+          <a:ext cx="0" cy="0"/>
+          <a:chOff x="0" y="0"/>
+          <a:chExt cx="0" cy="0"/>
+        </a:xfrm>
+      </p:grpSpPr>
+      <p:sp>
+        <p:nvSpPr>
+          <p:cNvPr id="2" name="Title 1"/>
+          <p:cNvSpPr>
+            <a:spLocks noGrp="1"/>
+          </p:cNvSpPr>
+          <p:nvPr>
+            <p:ph type="title"/>
+          </p:nvPr>
+        </p:nvSpPr>
+        <p:spPr/>
+        <p:txBody>
+          <a:bodyPr/>
+          <a:lstStyle/>
+          <a:p>
+            <a:r>
+              <a:rPr lang="en-US" dirty="0" smtClean="0"/>
+              <a:t>	</a:t>
+            </a:r>
+            <a:r>
+              <a:rPr lang="en-US" dirty="0" err="1" smtClean="0"/>
+              <a:t>Exokernel</a:t>
+            </a:r>
+            <a:r>
+              <a:rPr lang="en-US" dirty="0" smtClean="0"/>
+              <a:t> Design</a:t>
+            </a:r>
+            <a:endParaRPr lang="en-US" dirty="0"/>
+          </a:p>
+        </p:txBody>
+      </p:sp>
+      <p:sp>
+        <p:nvSpPr>
+          <p:cNvPr id="3" name="Text Placeholder 2"/>
+          <p:cNvSpPr>
+            <a:spLocks noGrp="1"/>
+          </p:cNvSpPr>
+          <p:nvPr>
+            <p:ph type="body" idx="1"/>
+          </p:nvPr>
+        </p:nvSpPr>
+        <p:spPr>
+          <a:xfrm>
+            <a:off x="839788" y="1349693"/>
+            <a:ext cx="5157787" cy="823912"/>
+          </a:xfrm>
+        </p:spPr>
+        <p:txBody>
+          <a:bodyPr/>
+          <a:lstStyle/>
+          <a:p>
+            <a:r>
+              <a:rPr lang="en-US" dirty="0" smtClean="0"/>
+              <a:t>Principle</a:t>
+            </a:r>
+            <a:endParaRPr lang="en-US" dirty="0"/>
+          </a:p>
+        </p:txBody>
+      </p:sp>
+      <p:sp>
+        <p:nvSpPr>
+          <p:cNvPr id="4" name="Content Placeholder 3"/>
+          <p:cNvSpPr>
+            <a:spLocks noGrp="1"/>
+          </p:cNvSpPr>
+          <p:nvPr>
+            <p:ph sz="half" idx="2"/>
+          </p:nvPr>
+        </p:nvSpPr>
+        <p:spPr>
+          <a:xfrm>
+            <a:off x="839788" y="2173605"/>
+            <a:ext cx="5157787" cy="3895725"/>
+          </a:xfrm>
+        </p:spPr>
+        <p:txBody>
+          <a:bodyPr>
+            <a:normAutofit/>
+          </a:bodyPr>
+          <a:lstStyle/>
+          <a:p>
+            <a:r>
+              <a:rPr lang="en-US" dirty="0" smtClean="0"/>
+              <a:t>End-to-End</a:t>
+            </a:r>
+          </a:p>
+          <a:p>
+            <a:endParaRPr lang="en-US" dirty="0" smtClean="0"/>
+          </a:p>
+          <a:p>
+            <a:r>
+              <a:rPr lang="en-US" dirty="0" smtClean="0"/>
+              <a:t>Sep. protection &amp; mechanisms</a:t>
+            </a:r>
+          </a:p>
+          <a:p>
+            <a:endParaRPr lang="en-US" dirty="0"/>
+          </a:p>
+          <a:p>
+            <a:r>
+              <a:rPr lang="en-US" dirty="0" smtClean="0"/>
+              <a:t>Avoid management</a:t>
+            </a:r>
+            <a:endParaRPr lang="en-US" dirty="0"/>
+          </a:p>
+        </p:txBody>
+      </p:sp>
+      <p:sp>
+        <p:nvSpPr>
+          <p:cNvPr id="5" name="Text Placeholder 4"/>
+          <p:cNvSpPr>
+            <a:spLocks noGrp="1"/>
+          </p:cNvSpPr>
+          <p:nvPr>
+            <p:ph type="body" sz="quarter" idx="3"/>
+          </p:nvPr>
+        </p:nvSpPr>
+        <p:spPr>
+          <a:xfrm>
+            <a:off x="6172200" y="1349693"/>
+            <a:ext cx="5183188" cy="823912"/>
+          </a:xfrm>
+        </p:spPr>
+        <p:txBody>
+          <a:bodyPr/>
+          <a:lstStyle/>
+          <a:p>
+            <a:r>
+              <a:rPr lang="en-US" dirty="0" smtClean="0"/>
+              <a:t>Translates to</a:t>
+            </a:r>
+            <a:r>
+              <a:rPr lang="mr-IN" dirty="0" smtClean="0"/>
+              <a:t>…</a:t>
+            </a:r>
+            <a:endParaRPr lang="en-US" dirty="0"/>
+          </a:p>
+        </p:txBody>
+      </p:sp>
+      <p:sp>
+        <p:nvSpPr>
+          <p:cNvPr id="6" name="Content Placeholder 5"/>
+          <p:cNvSpPr>
+            <a:spLocks noGrp="1"/>
+          </p:cNvSpPr>
+          <p:nvPr>
+            <p:ph sz="quarter" idx="4"/>
+          </p:nvPr>
+        </p:nvSpPr>
+        <p:spPr>
+          <a:xfrm>
+            <a:off x="6172200" y="2173605"/>
+            <a:ext cx="5852160" cy="3632835"/>
+          </a:xfrm>
+        </p:spPr>
+        <p:txBody>
+          <a:bodyPr/>
+          <a:lstStyle/>
+          <a:p>
+            <a:r>
+              <a:rPr lang="en-US" dirty="0" smtClean="0"/>
+              <a:t>App-level physical resource </a:t>
+            </a:r>
+            <a:r>
+              <a:rPr lang="en-US" dirty="0" err="1" smtClean="0"/>
+              <a:t>mgmt</a:t>
+            </a:r>
+            <a:endParaRPr lang="en-US" dirty="0" smtClean="0"/>
+          </a:p>
+          <a:p>
+            <a:endParaRPr lang="en-US" dirty="0" smtClean="0"/>
+          </a:p>
+          <a:p>
+            <a:r>
+              <a:rPr lang="en-US" dirty="0" smtClean="0"/>
+              <a:t>Securely expose all hardware</a:t>
+            </a:r>
+          </a:p>
+          <a:p>
+            <a:endParaRPr lang="en-US" dirty="0" smtClean="0"/>
+          </a:p>
+          <a:p>
+            <a:r>
+              <a:rPr lang="en-US" dirty="0" smtClean="0"/>
+              <a:t>Use physical names</a:t>
+            </a:r>
+            <a:endParaRPr lang="en-US" dirty="0"/>
+          </a:p>
+        </p:txBody>
+      </p:sp>
+    </p:spTree>
+    <p:extLst>
+      <p:ext uri="{BB962C8B-B14F-4D97-AF65-F5344CB8AC3E}">
+        <p14:creationId xmlns:p14="http://schemas.microsoft.com/office/powerpoint/2010/main" val="621910512"/>
+      </p:ext>
+    </p:extLst>
+  </p:cSld>
+  <p:clrMapOvr>
+    <a:masterClrMapping/>
+  </p:clrMapOvr>
+  <p:timing>
+    <p:tnLst>
+      <p:par>
+        <p:cTn id="1" dur="indefinite" restart="never" nodeType="tmRoot"/>
+      </p:par>
+    </p:tnLst>
+  </p:timing>
+</p:sld>
+</file>
+
+<file path=ppt/slides/slide11.xml><?xml version="1.0" encoding="utf-8"?>
+<p:sld xmlns:a="http://schemas.openxmlformats.org/drawingml/2006/main" xmlns:r="http://schemas.openxmlformats.org/officeDocument/2006/relationships" xmlns:p="http://schemas.openxmlformats.org/presentationml/2006/main">
+  <p:cSld>
+    <p:spTree>
+      <p:nvGrpSpPr>
+        <p:cNvPr id="1" name=""/>
+        <p:cNvGrpSpPr/>
+        <p:nvPr/>
+      </p:nvGrpSpPr>
+      <p:grpSpPr>
+        <a:xfrm>
+          <a:off x="0" y="0"/>
+          <a:ext cx="0" cy="0"/>
+          <a:chOff x="0" y="0"/>
+          <a:chExt cx="0" cy="0"/>
+        </a:xfrm>
+      </p:grpSpPr>
+      <p:sp>
+        <p:nvSpPr>
+          <p:cNvPr id="2" name="Title 1"/>
+          <p:cNvSpPr>
+            <a:spLocks noGrp="1"/>
+          </p:cNvSpPr>
+          <p:nvPr>
+            <p:ph type="title"/>
+          </p:nvPr>
+        </p:nvSpPr>
+        <p:spPr/>
+        <p:txBody>
+          <a:bodyPr/>
+          <a:lstStyle/>
+          <a:p>
+            <a:r>
+              <a:rPr lang="en-US" dirty="0" smtClean="0"/>
+              <a:t>	</a:t>
+            </a:r>
+            <a:r>
+              <a:rPr lang="en-US" dirty="0" err="1" smtClean="0"/>
+              <a:t>Exokernel</a:t>
+            </a:r>
+            <a:r>
+              <a:rPr lang="en-US" dirty="0" smtClean="0"/>
+              <a:t> Mechanisms</a:t>
+            </a:r>
+            <a:endParaRPr lang="en-US" dirty="0"/>
+          </a:p>
+        </p:txBody>
+      </p:sp>
+      <p:sp>
+        <p:nvSpPr>
+          <p:cNvPr id="3" name="Content Placeholder 2"/>
+          <p:cNvSpPr>
+            <a:spLocks noGrp="1"/>
+          </p:cNvSpPr>
+          <p:nvPr>
+            <p:ph sz="half" idx="1"/>
+          </p:nvPr>
+        </p:nvSpPr>
+        <p:spPr>
+          <a:xfrm>
+            <a:off x="838200" y="1825625"/>
+            <a:ext cx="5181600" cy="2060575"/>
+          </a:xfrm>
+        </p:spPr>
+        <p:txBody>
+          <a:bodyPr/>
+          <a:lstStyle/>
+          <a:p>
+            <a:r>
+              <a:rPr lang="en-US" dirty="0" smtClean="0"/>
+              <a:t>Secure Bindings</a:t>
+            </a:r>
+          </a:p>
+          <a:p>
+            <a:pPr lvl="1"/>
+            <a:r>
+              <a:rPr lang="en-US" dirty="0" smtClean="0"/>
+              <a:t>Hardware.</a:t>
+            </a:r>
+          </a:p>
+          <a:p>
+            <a:pPr lvl="1"/>
+            <a:r>
+              <a:rPr lang="en-US" dirty="0" smtClean="0"/>
+              <a:t>Software.</a:t>
+            </a:r>
+          </a:p>
+          <a:p>
+            <a:pPr lvl="1"/>
+            <a:r>
+              <a:rPr lang="en-US" dirty="0" smtClean="0"/>
+              <a:t>Code Download.</a:t>
+            </a:r>
+          </a:p>
+          <a:p>
+            <a:pPr lvl="1"/>
+            <a:endParaRPr lang="en-US" dirty="0"/>
+          </a:p>
+          <a:p>
+            <a:endParaRPr lang="en-US" dirty="0"/>
+          </a:p>
+        </p:txBody>
+      </p:sp>
+      <p:sp>
+        <p:nvSpPr>
+          <p:cNvPr id="6" name="Content Placeholder 5"/>
+          <p:cNvSpPr>
+            <a:spLocks noGrp="1"/>
+          </p:cNvSpPr>
+          <p:nvPr>
+            <p:ph sz="half" idx="2"/>
+          </p:nvPr>
+        </p:nvSpPr>
+        <p:spPr>
+          <a:xfrm>
+            <a:off x="6172200" y="1825625"/>
+            <a:ext cx="5181600" cy="1683385"/>
+          </a:xfrm>
+        </p:spPr>
+        <p:txBody>
+          <a:bodyPr/>
+          <a:lstStyle/>
+          <a:p>
+            <a:r>
+              <a:rPr lang="en-US" dirty="0"/>
+              <a:t>Access time checks</a:t>
+            </a:r>
+          </a:p>
+          <a:p>
+            <a:endParaRPr lang="en-US" dirty="0"/>
+          </a:p>
+          <a:p>
+            <a:r>
+              <a:rPr lang="en-US" dirty="0"/>
+              <a:t>Revocation </a:t>
+            </a:r>
+            <a:r>
+              <a:rPr lang="en-US" dirty="0" smtClean="0"/>
+              <a:t>protocol</a:t>
+            </a:r>
+            <a:endParaRPr lang="en-US" dirty="0"/>
+          </a:p>
+        </p:txBody>
+      </p:sp>
+      <p:pic>
+        <p:nvPicPr>
+          <p:cNvPr id="5" name="Picture 4"/>
+          <p:cNvPicPr>
+            <a:picLocks noChangeAspect="1"/>
+          </p:cNvPicPr>
+          <p:nvPr/>
+        </p:nvPicPr>
+        <p:blipFill>
+          <a:blip r:embed="rId2">
+            <a:extLst>
+              <a:ext uri="{28A0092B-C50C-407E-A947-70E740481C1C}">
+                <a14:useLocalDpi xmlns:a14="http://schemas.microsoft.com/office/drawing/2010/main" val="0"/>
+              </a:ext>
+            </a:extLst>
+          </a:blip>
+          <a:stretch>
+            <a:fillRect/>
+          </a:stretch>
+        </p:blipFill>
+        <p:spPr>
+          <a:xfrm>
+            <a:off x="1192530" y="3794761"/>
+            <a:ext cx="8749426" cy="2403120"/>
+          </a:xfrm>
+          <a:prstGeom prst="rect">
+            <a:avLst/>
+          </a:prstGeom>
+        </p:spPr>
+      </p:pic>
+    </p:spTree>
+    <p:extLst>
+      <p:ext uri="{BB962C8B-B14F-4D97-AF65-F5344CB8AC3E}">
+        <p14:creationId xmlns:p14="http://schemas.microsoft.com/office/powerpoint/2010/main" val="973012335"/>
+      </p:ext>
+    </p:extLst>
+  </p:cSld>
+  <p:clrMapOvr>
+    <a:masterClrMapping/>
+  </p:clrMapOvr>
+  <p:timing>
+    <p:tnLst>
+      <p:par>
+        <p:cTn id="1" dur="indefinite" restart="never" nodeType="tmRoot"/>
+      </p:par>
+    </p:tnLst>
+  </p:timing>
+</p:sld>
+</file>
+
+<file path=ppt/slides/slide12.xml><?xml version="1.0" encoding="utf-8"?>
+<p:sld xmlns:a="http://schemas.openxmlformats.org/drawingml/2006/main" xmlns:r="http://schemas.openxmlformats.org/officeDocument/2006/relationships" xmlns:p="http://schemas.openxmlformats.org/presentationml/2006/main">
+  <p:cSld>
+    <p:spTree>
+      <p:nvGrpSpPr>
+        <p:cNvPr id="1" name=""/>
+        <p:cNvGrpSpPr/>
+        <p:nvPr/>
+      </p:nvGrpSpPr>
+      <p:grpSpPr>
+        <a:xfrm>
+          <a:off x="0" y="0"/>
+          <a:ext cx="0" cy="0"/>
+          <a:chOff x="0" y="0"/>
+          <a:chExt cx="0" cy="0"/>
+        </a:xfrm>
+      </p:grpSpPr>
+      <p:sp>
+        <p:nvSpPr>
+          <p:cNvPr id="2" name="Title 1"/>
+          <p:cNvSpPr>
+            <a:spLocks noGrp="1"/>
+          </p:cNvSpPr>
+          <p:nvPr>
+            <p:ph type="title"/>
+          </p:nvPr>
+        </p:nvSpPr>
+        <p:spPr/>
+        <p:txBody>
+          <a:bodyPr/>
+          <a:lstStyle/>
+          <a:p>
+            <a:r>
+              <a:rPr lang="en-US" dirty="0" smtClean="0"/>
+              <a:t>	</a:t>
+            </a:r>
+            <a:r>
+              <a:rPr lang="en-US" dirty="0" err="1" smtClean="0"/>
+              <a:t>Exokernel</a:t>
+            </a:r>
+            <a:r>
+              <a:rPr lang="en-US" dirty="0" smtClean="0"/>
+              <a:t> Performance</a:t>
+            </a:r>
+            <a:endParaRPr lang="en-US" dirty="0"/>
+          </a:p>
+        </p:txBody>
+      </p:sp>
+      <p:sp>
+        <p:nvSpPr>
+          <p:cNvPr id="3" name="Content Placeholder 2"/>
+          <p:cNvSpPr>
+            <a:spLocks noGrp="1"/>
+          </p:cNvSpPr>
+          <p:nvPr>
+            <p:ph idx="1"/>
+          </p:nvPr>
+        </p:nvSpPr>
+        <p:spPr/>
+        <p:txBody>
+          <a:bodyPr/>
+          <a:lstStyle/>
+          <a:p>
+            <a:endParaRPr lang="en-US"/>
+          </a:p>
+        </p:txBody>
+      </p:sp>
+    </p:spTree>
+    <p:extLst>
+      <p:ext uri="{BB962C8B-B14F-4D97-AF65-F5344CB8AC3E}">
+        <p14:creationId xmlns:p14="http://schemas.microsoft.com/office/powerpoint/2010/main" val="1999685181"/>
+      </p:ext>
+    </p:extLst>
+  </p:cSld>
+  <p:clrMapOvr>
+    <a:masterClrMapping/>
+  </p:clrMapOvr>
+  <p:timing>
+    <p:tnLst>
+      <p:par>
+        <p:cTn id="1" dur="indefinite" restart="never" nodeType="tmRoot"/>
+      </p:par>
+    </p:tnLst>
+  </p:timing>
+</p:sld>
+</file>
+
+<file path=ppt/slides/slide13.xml><?xml version="1.0" encoding="utf-8"?>
+<p:sld xmlns:a="http://schemas.openxmlformats.org/drawingml/2006/main" xmlns:r="http://schemas.openxmlformats.org/officeDocument/2006/relationships" xmlns:p="http://schemas.openxmlformats.org/presentationml/2006/main">
+  <p:cSld>
+    <p:spTree>
+      <p:nvGrpSpPr>
+        <p:cNvPr id="1" name=""/>
+        <p:cNvGrpSpPr/>
+        <p:nvPr/>
+      </p:nvGrpSpPr>
+      <p:grpSpPr>
+        <a:xfrm>
+          <a:off x="0" y="0"/>
+          <a:ext cx="0" cy="0"/>
+          <a:chOff x="0" y="0"/>
+          <a:chExt cx="0" cy="0"/>
+        </a:xfrm>
+      </p:grpSpPr>
+      <p:sp>
+        <p:nvSpPr>
+          <p:cNvPr id="2" name="Title 1"/>
+          <p:cNvSpPr>
+            <a:spLocks noGrp="1"/>
+          </p:cNvSpPr>
+          <p:nvPr>
+            <p:ph type="title"/>
+          </p:nvPr>
+        </p:nvSpPr>
+        <p:spPr/>
+        <p:txBody>
+          <a:bodyPr/>
+          <a:lstStyle/>
+          <a:p>
+            <a:r>
+              <a:rPr lang="en-US" dirty="0" smtClean="0"/>
+              <a:t>	Haven &amp; Intel SGX</a:t>
+            </a:r>
+            <a:endParaRPr lang="en-US" dirty="0"/>
+          </a:p>
+        </p:txBody>
+      </p:sp>
+      <p:sp>
+        <p:nvSpPr>
+          <p:cNvPr id="3" name="Content Placeholder 2"/>
+          <p:cNvSpPr>
+            <a:spLocks noGrp="1"/>
+          </p:cNvSpPr>
+          <p:nvPr>
+            <p:ph idx="1"/>
+          </p:nvPr>
+        </p:nvSpPr>
+        <p:spPr>
+          <a:xfrm>
+            <a:off x="838200" y="1654175"/>
+            <a:ext cx="10515600" cy="4351338"/>
+          </a:xfrm>
+        </p:spPr>
+        <p:txBody>
+          <a:bodyPr/>
+          <a:lstStyle/>
+          <a:p>
+            <a:pPr marL="0" marR="0" lvl="0" indent="0" defTabSz="914400" eaLnBrk="1" fontAlgn="auto" latinLnBrk="0" hangingPunct="1">
+              <a:lnSpc>
+                <a:spcPct val="100000"/>
+              </a:lnSpc>
+              <a:spcBef>
+                <a:spcPts val="0"/>
+              </a:spcBef>
+              <a:spcAft>
+                <a:spcPts val="0"/>
+              </a:spcAft>
+              <a:buClrTx/>
+              <a:buSzTx/>
+              <a:buFontTx/>
+              <a:buNone/>
+              <a:tabLst/>
+              <a:defRPr/>
+            </a:pPr>
+            <a:r>
+              <a:rPr lang="en-US" i="1" dirty="0" smtClean="0"/>
+              <a:t>Why do people use Cloud services: IaaS, SaaS, PaaS, </a:t>
+            </a:r>
+            <a:r>
+              <a:rPr lang="en-US" i="1" dirty="0" err="1" smtClean="0"/>
+              <a:t>WaaS</a:t>
+            </a:r>
+            <a:r>
+              <a:rPr lang="en-US" i="1" dirty="0" smtClean="0"/>
+              <a:t> </a:t>
+            </a:r>
+            <a:r>
+              <a:rPr lang="en-US" i="1" dirty="0" err="1" smtClean="0"/>
+              <a:t>AaaP</a:t>
+            </a:r>
+            <a:r>
+              <a:rPr lang="en-US" i="1" dirty="0" smtClean="0"/>
+              <a:t>*?</a:t>
+            </a:r>
+            <a:endParaRPr lang="en-US" dirty="0" smtClean="0"/>
+          </a:p>
+          <a:p>
+            <a:pPr>
+              <a:lnSpc>
+                <a:spcPct val="100000"/>
+              </a:lnSpc>
+              <a:spcBef>
+                <a:spcPts val="0"/>
+              </a:spcBef>
+            </a:pPr>
+            <a:endParaRPr lang="en-US" dirty="0" smtClean="0"/>
+          </a:p>
+          <a:p>
+            <a:pPr>
+              <a:lnSpc>
+                <a:spcPct val="100000"/>
+              </a:lnSpc>
+              <a:spcBef>
+                <a:spcPts val="0"/>
+              </a:spcBef>
+            </a:pPr>
+            <a:r>
+              <a:rPr lang="en-US" dirty="0" smtClean="0"/>
+              <a:t>Fast deployment</a:t>
+            </a:r>
+          </a:p>
+          <a:p>
+            <a:pPr>
+              <a:lnSpc>
+                <a:spcPct val="100000"/>
+              </a:lnSpc>
+              <a:spcBef>
+                <a:spcPts val="0"/>
+              </a:spcBef>
+            </a:pPr>
+            <a:r>
+              <a:rPr lang="en-US" dirty="0" smtClean="0"/>
+              <a:t>Low start-up cost</a:t>
+            </a:r>
+          </a:p>
+          <a:p>
+            <a:pPr>
+              <a:lnSpc>
+                <a:spcPct val="100000"/>
+              </a:lnSpc>
+              <a:spcBef>
+                <a:spcPts val="0"/>
+              </a:spcBef>
+            </a:pPr>
+            <a:r>
+              <a:rPr lang="en-US" dirty="0" smtClean="0"/>
+              <a:t>Pay-per-use</a:t>
+            </a:r>
+          </a:p>
+          <a:p>
+            <a:pPr>
+              <a:lnSpc>
+                <a:spcPct val="100000"/>
+              </a:lnSpc>
+              <a:spcBef>
+                <a:spcPts val="0"/>
+              </a:spcBef>
+            </a:pPr>
+            <a:r>
+              <a:rPr lang="en-US" dirty="0" smtClean="0"/>
+              <a:t>Adapt resources to load</a:t>
+            </a:r>
+          </a:p>
+          <a:p>
+            <a:pPr>
+              <a:lnSpc>
+                <a:spcPct val="100000"/>
+              </a:lnSpc>
+              <a:spcBef>
+                <a:spcPts val="0"/>
+              </a:spcBef>
+            </a:pPr>
+            <a:r>
+              <a:rPr lang="en-US" dirty="0" smtClean="0"/>
+              <a:t>Sounds fancy (like Big data, Machine learning, </a:t>
+            </a:r>
+            <a:r>
+              <a:rPr lang="en-US" dirty="0" err="1" smtClean="0"/>
+              <a:t>IoT</a:t>
+            </a:r>
+            <a:r>
+              <a:rPr lang="en-US" dirty="0" smtClean="0"/>
+              <a:t>, etc.)</a:t>
+            </a:r>
+            <a:endParaRPr lang="en-US" dirty="0"/>
+          </a:p>
+        </p:txBody>
+      </p:sp>
+      <p:sp>
+        <p:nvSpPr>
+          <p:cNvPr id="4" name="TextBox 3"/>
+          <p:cNvSpPr txBox="1"/>
+          <p:nvPr/>
+        </p:nvSpPr>
+        <p:spPr>
+          <a:xfrm>
+            <a:off x="857250" y="6355080"/>
+            <a:ext cx="2240280" cy="369332"/>
+          </a:xfrm>
+          <a:prstGeom prst="rect">
+            <a:avLst/>
+          </a:prstGeom>
+          <a:noFill/>
+        </p:spPr>
+        <p:txBody>
+          <a:bodyPr wrap="square" rtlCol="0">
+            <a:spAutoFit/>
+          </a:bodyPr>
+          <a:lstStyle/>
+          <a:p>
+            <a:r>
+              <a:rPr lang="en-US" dirty="0" smtClean="0"/>
+              <a:t>*This one is made up.</a:t>
+            </a:r>
+            <a:endParaRPr lang="en-US" dirty="0"/>
+          </a:p>
+        </p:txBody>
+      </p:sp>
+    </p:spTree>
+    <p:extLst>
+      <p:ext uri="{BB962C8B-B14F-4D97-AF65-F5344CB8AC3E}">
+        <p14:creationId xmlns:p14="http://schemas.microsoft.com/office/powerpoint/2010/main" val="1676130107"/>
+      </p:ext>
+    </p:extLst>
+  </p:cSld>
+  <p:clrMapOvr>
+    <a:masterClrMapping/>
+  </p:clrMapOvr>
+  <p:timing>
+    <p:tnLst>
+      <p:par>
+        <p:cTn id="1" dur="indefinite" restart="never" nodeType="tmRoot"/>
+      </p:par>
+    </p:tnLst>
+  </p:timing>
+</p:sld>
+</file>
+
+<file path=ppt/slides/slide14.xml><?xml version="1.0" encoding="utf-8"?>
+<p:sld xmlns:a="http://schemas.openxmlformats.org/drawingml/2006/main" xmlns:r="http://schemas.openxmlformats.org/officeDocument/2006/relationships" xmlns:p="http://schemas.openxmlformats.org/presentationml/2006/main">
+  <p:cSld>
+    <p:spTree>
+      <p:nvGrpSpPr>
+        <p:cNvPr id="1" name=""/>
+        <p:cNvGrpSpPr/>
+        <p:nvPr/>
+      </p:nvGrpSpPr>
+      <p:grpSpPr>
+        <a:xfrm>
+          <a:off x="0" y="0"/>
+          <a:ext cx="0" cy="0"/>
+          <a:chOff x="0" y="0"/>
+          <a:chExt cx="0" cy="0"/>
+        </a:xfrm>
+      </p:grpSpPr>
+      <p:sp>
+        <p:nvSpPr>
+          <p:cNvPr id="2" name="Title 1"/>
+          <p:cNvSpPr>
+            <a:spLocks noGrp="1"/>
+          </p:cNvSpPr>
+          <p:nvPr>
+            <p:ph type="title"/>
+          </p:nvPr>
+        </p:nvSpPr>
+        <p:spPr/>
+        <p:txBody>
+          <a:bodyPr/>
+          <a:lstStyle/>
+          <a:p>
+            <a:r>
+              <a:rPr lang="en-US" dirty="0" smtClean="0"/>
+              <a:t>	How it works</a:t>
+            </a:r>
+            <a:endParaRPr lang="en-US" dirty="0"/>
+          </a:p>
+        </p:txBody>
+      </p:sp>
+      <p:sp>
+        <p:nvSpPr>
+          <p:cNvPr id="3" name="Content Placeholder 2"/>
+          <p:cNvSpPr>
+            <a:spLocks noGrp="1"/>
+          </p:cNvSpPr>
+          <p:nvPr>
+            <p:ph sz="half" idx="1"/>
+          </p:nvPr>
+        </p:nvSpPr>
+        <p:spPr/>
+        <p:txBody>
+          <a:bodyPr/>
+          <a:lstStyle/>
+          <a:p>
+            <a:r>
+              <a:rPr lang="en-US" i="1" dirty="0" smtClean="0"/>
+              <a:t>“You have to share!”</a:t>
+            </a:r>
+          </a:p>
+          <a:p>
+            <a:pPr lvl="1"/>
+            <a:r>
+              <a:rPr lang="en-US" dirty="0" smtClean="0"/>
+              <a:t>Co-locating Apps.</a:t>
+            </a:r>
+          </a:p>
+          <a:p>
+            <a:pPr lvl="1"/>
+            <a:endParaRPr lang="en-US" dirty="0"/>
+          </a:p>
+          <a:p>
+            <a:r>
+              <a:rPr lang="en-US" dirty="0" smtClean="0"/>
+              <a:t>“</a:t>
+            </a:r>
+            <a:r>
+              <a:rPr lang="en-US" i="1" dirty="0" smtClean="0"/>
+              <a:t>Wrap it!</a:t>
+            </a:r>
+            <a:r>
+              <a:rPr lang="en-US" dirty="0" smtClean="0"/>
+              <a:t>”</a:t>
+            </a:r>
+          </a:p>
+          <a:p>
+            <a:pPr lvl="1"/>
+            <a:r>
+              <a:rPr lang="en-US" dirty="0" smtClean="0"/>
+              <a:t>Containers, VMs, etc.</a:t>
+            </a:r>
+          </a:p>
+          <a:p>
+            <a:pPr lvl="1"/>
+            <a:endParaRPr lang="en-US" dirty="0"/>
+          </a:p>
+          <a:p>
+            <a:r>
+              <a:rPr lang="en-US" dirty="0" smtClean="0"/>
+              <a:t>“</a:t>
+            </a:r>
+            <a:r>
+              <a:rPr lang="en-US" i="1" dirty="0"/>
+              <a:t>I won’t look</a:t>
+            </a:r>
+            <a:r>
+              <a:rPr lang="mr-IN" i="1" dirty="0"/>
+              <a:t>…</a:t>
+            </a:r>
+            <a:r>
+              <a:rPr lang="fr-CH" i="1" dirty="0"/>
+              <a:t> I </a:t>
+            </a:r>
+            <a:r>
+              <a:rPr lang="fr-CH" i="1" dirty="0" smtClean="0"/>
+              <a:t>promise</a:t>
+            </a:r>
+            <a:r>
+              <a:rPr lang="en-US" dirty="0" smtClean="0"/>
+              <a:t>”</a:t>
+            </a:r>
+          </a:p>
+          <a:p>
+            <a:pPr lvl="1"/>
+            <a:r>
+              <a:rPr lang="en-US" dirty="0" smtClean="0"/>
+              <a:t>CSP is privileged</a:t>
+            </a:r>
+            <a:endParaRPr lang="en-US" dirty="0"/>
+          </a:p>
+        </p:txBody>
+      </p:sp>
+      <p:sp>
+        <p:nvSpPr>
+          <p:cNvPr id="4" name="Content Placeholder 3"/>
+          <p:cNvSpPr>
+            <a:spLocks noGrp="1"/>
+          </p:cNvSpPr>
+          <p:nvPr>
+            <p:ph sz="half" idx="2"/>
+          </p:nvPr>
+        </p:nvSpPr>
+        <p:spPr/>
+        <p:txBody>
+          <a:bodyPr/>
+          <a:lstStyle/>
+          <a:p>
+            <a:r>
+              <a:rPr lang="en-US" dirty="0" smtClean="0">
+                <a:solidFill>
+                  <a:schemeClr val="accent2"/>
+                </a:solidFill>
+              </a:rPr>
+              <a:t>Corrupted/malevolent host</a:t>
+            </a:r>
+          </a:p>
+          <a:p>
+            <a:endParaRPr lang="en-US" dirty="0"/>
+          </a:p>
+          <a:p>
+            <a:r>
+              <a:rPr lang="en-US" i="1" dirty="0" smtClean="0">
+                <a:solidFill>
+                  <a:schemeClr val="accent2"/>
+                </a:solidFill>
+              </a:rPr>
+              <a:t>“Solve the rebus”</a:t>
+            </a:r>
+            <a:endParaRPr lang="en-US" i="1" dirty="0">
+              <a:solidFill>
+                <a:schemeClr val="accent2"/>
+              </a:solidFill>
+            </a:endParaRPr>
+          </a:p>
+        </p:txBody>
+      </p:sp>
+      <p:pic>
+        <p:nvPicPr>
+          <p:cNvPr id="8" name="Picture 7"/>
+          <p:cNvPicPr>
+            <a:picLocks noChangeAspect="1"/>
+          </p:cNvPicPr>
+          <p:nvPr/>
+        </p:nvPicPr>
+        <p:blipFill>
+          <a:blip r:embed="rId2">
+            <a:extLst>
+              <a:ext uri="{28A0092B-C50C-407E-A947-70E740481C1C}">
+                <a14:useLocalDpi xmlns:a14="http://schemas.microsoft.com/office/drawing/2010/main" val="0"/>
+              </a:ext>
+            </a:extLst>
+          </a:blip>
+          <a:stretch>
+            <a:fillRect/>
+          </a:stretch>
+        </p:blipFill>
+        <p:spPr>
+          <a:xfrm>
+            <a:off x="6172200" y="3863340"/>
+            <a:ext cx="1319472" cy="1319472"/>
+          </a:xfrm>
+          <a:prstGeom prst="rect">
+            <a:avLst/>
+          </a:prstGeom>
+        </p:spPr>
+      </p:pic>
+      <p:pic>
+        <p:nvPicPr>
+          <p:cNvPr id="9" name="Picture 8"/>
+          <p:cNvPicPr>
+            <a:picLocks noChangeAspect="1"/>
+          </p:cNvPicPr>
+          <p:nvPr/>
+        </p:nvPicPr>
+        <p:blipFill>
+          <a:blip r:embed="rId3">
+            <a:extLst>
+              <a:ext uri="{28A0092B-C50C-407E-A947-70E740481C1C}">
+                <a14:useLocalDpi xmlns:a14="http://schemas.microsoft.com/office/drawing/2010/main" val="0"/>
+              </a:ext>
+            </a:extLst>
+          </a:blip>
+          <a:stretch>
+            <a:fillRect/>
+          </a:stretch>
+        </p:blipFill>
+        <p:spPr>
+          <a:xfrm>
+            <a:off x="7491672" y="3998090"/>
+            <a:ext cx="1111388" cy="1111388"/>
+          </a:xfrm>
+          <a:prstGeom prst="rect">
+            <a:avLst/>
+          </a:prstGeom>
+        </p:spPr>
+      </p:pic>
+      <p:pic>
+        <p:nvPicPr>
+          <p:cNvPr id="10" name="Picture 9"/>
+          <p:cNvPicPr>
+            <a:picLocks noChangeAspect="1"/>
+          </p:cNvPicPr>
+          <p:nvPr/>
+        </p:nvPicPr>
+        <p:blipFill>
+          <a:blip r:embed="rId4">
+            <a:extLst>
+              <a:ext uri="{28A0092B-C50C-407E-A947-70E740481C1C}">
+                <a14:useLocalDpi xmlns:a14="http://schemas.microsoft.com/office/drawing/2010/main" val="0"/>
+              </a:ext>
+            </a:extLst>
+          </a:blip>
+          <a:stretch>
+            <a:fillRect/>
+          </a:stretch>
+        </p:blipFill>
+        <p:spPr>
+          <a:xfrm>
+            <a:off x="8603060" y="4069190"/>
+            <a:ext cx="994767" cy="907772"/>
+          </a:xfrm>
+          <a:prstGeom prst="rect">
+            <a:avLst/>
+          </a:prstGeom>
+        </p:spPr>
+      </p:pic>
+    </p:spTree>
+    <p:extLst>
+      <p:ext uri="{BB962C8B-B14F-4D97-AF65-F5344CB8AC3E}">
+        <p14:creationId xmlns:p14="http://schemas.microsoft.com/office/powerpoint/2010/main" val="744257271"/>
+      </p:ext>
+    </p:extLst>
+  </p:cSld>
+  <p:clrMapOvr>
+    <a:masterClrMapping/>
+  </p:clrMapOvr>
+  <p:timing>
+    <p:tnLst>
+      <p:par>
+        <p:cTn id="1" dur="indefinite" restart="never" nodeType="tmRoot">
+          <p:childTnLst>
+            <p:seq concurrent="1" nextAc="seek">
+              <p:cTn id="2" dur="indefinite" nodeType="mainSeq">
+                <p:childTnLst>
+                  <p:par>
+                    <p:cTn id="3" fill="hold">
+                      <p:stCondLst>
+                        <p:cond delay="indefinite"/>
+                      </p:stCondLst>
+                      <p:childTnLst>
+                        <p:par>
+                          <p:cTn id="4" fill="hold">
+                            <p:stCondLst>
+                              <p:cond delay="0"/>
+                            </p:stCondLst>
+                            <p:childTnLst>
+                              <p:par>
+                                <p:cTn id="5" presetID="1" presetClass="entr" presetSubtype="0" fill="hold" grpId="0" nodeType="clickEffect">
+                                  <p:stCondLst>
+                                    <p:cond delay="0"/>
+                                  </p:stCondLst>
+                                  <p:childTnLst>
+                                    <p:set>
+                                      <p:cBhvr>
+                                        <p:cTn id="6" dur="1" fill="hold">
+                                          <p:stCondLst>
+                                            <p:cond delay="0"/>
+                                          </p:stCondLst>
+                                        </p:cTn>
+                                        <p:tgtEl>
+                                          <p:spTgt spid="4">
+                                            <p:txEl>
+                                              <p:pRg st="0" end="0"/>
+                                            </p:txEl>
+                                          </p:spTgt>
+                                        </p:tgtEl>
+                                        <p:attrNameLst>
+                                          <p:attrName>style.visibility</p:attrName>
+                                        </p:attrNameLst>
+                                      </p:cBhvr>
+                                      <p:to>
+                                        <p:strVal val="visible"/>
+                                      </p:to>
+                                    </p:set>
+                                  </p:childTnLst>
+                                </p:cTn>
+                              </p:par>
+                            </p:childTnLst>
+                          </p:cTn>
+                        </p:par>
+                      </p:childTnLst>
+                    </p:cTn>
+                  </p:par>
+                  <p:par>
+                    <p:cTn id="7" fill="hold">
+                      <p:stCondLst>
+                        <p:cond delay="indefinite"/>
+                      </p:stCondLst>
+                      <p:childTnLst>
+                        <p:par>
+                          <p:cTn id="8" fill="hold">
+                            <p:stCondLst>
+                              <p:cond delay="0"/>
+                            </p:stCondLst>
+                            <p:childTnLst>
+                              <p:par>
+                                <p:cTn id="9" presetID="1" presetClass="entr" presetSubtype="0" fill="hold" grpId="0" nodeType="clickEffect">
+                                  <p:stCondLst>
+                                    <p:cond delay="0"/>
+                                  </p:stCondLst>
+                                  <p:childTnLst>
+                                    <p:set>
+                                      <p:cBhvr>
+                                        <p:cTn id="10" dur="1" fill="hold">
+                                          <p:stCondLst>
+                                            <p:cond delay="0"/>
+                                          </p:stCondLst>
+                                        </p:cTn>
+                                        <p:tgtEl>
+                                          <p:spTgt spid="4">
+                                            <p:txEl>
+                                              <p:pRg st="2" end="2"/>
+                                            </p:txEl>
+                                          </p:spTgt>
+                                        </p:tgtEl>
+                                        <p:attrNameLst>
+                                          <p:attrName>style.visibility</p:attrName>
+                                        </p:attrNameLst>
+                                      </p:cBhvr>
+                                      <p:to>
+                                        <p:strVal val="visible"/>
+                                      </p:to>
+                                    </p:set>
+                                  </p:childTnLst>
+                                </p:cTn>
+                              </p:par>
+                              <p:par>
+                                <p:cTn id="11" presetID="1" presetClass="entr" presetSubtype="0" fill="hold" nodeType="withEffect">
+                                  <p:stCondLst>
+                                    <p:cond delay="0"/>
+                                  </p:stCondLst>
+                                  <p:childTnLst>
+                                    <p:set>
+                                      <p:cBhvr>
+                                        <p:cTn id="12" dur="1" fill="hold">
+                                          <p:stCondLst>
+                                            <p:cond delay="0"/>
+                                          </p:stCondLst>
+                                        </p:cTn>
+                                        <p:tgtEl>
+                                          <p:spTgt spid="8"/>
+                                        </p:tgtEl>
+                                        <p:attrNameLst>
+                                          <p:attrName>style.visibility</p:attrName>
+                                        </p:attrNameLst>
+                                      </p:cBhvr>
+                                      <p:to>
+                                        <p:strVal val="visible"/>
+                                      </p:to>
+                                    </p:set>
+                                  </p:childTnLst>
+                                </p:cTn>
+                              </p:par>
+                              <p:par>
+                                <p:cTn id="13" presetID="1" presetClass="entr" presetSubtype="0" fill="hold" nodeType="withEffect">
+                                  <p:stCondLst>
+                                    <p:cond delay="0"/>
+                                  </p:stCondLst>
+                                  <p:childTnLst>
+                                    <p:set>
+                                      <p:cBhvr>
+                                        <p:cTn id="14" dur="1" fill="hold">
+                                          <p:stCondLst>
+                                            <p:cond delay="0"/>
+                                          </p:stCondLst>
+                                        </p:cTn>
+                                        <p:tgtEl>
+                                          <p:spTgt spid="9"/>
+                                        </p:tgtEl>
+                                        <p:attrNameLst>
+                                          <p:attrName>style.visibility</p:attrName>
+                                        </p:attrNameLst>
+                                      </p:cBhvr>
+                                      <p:to>
+                                        <p:strVal val="visible"/>
+                                      </p:to>
+                                    </p:set>
+                                  </p:childTnLst>
+                                </p:cTn>
+                              </p:par>
+                              <p:par>
+                                <p:cTn id="15" presetID="1" presetClass="entr" presetSubtype="0" fill="hold" nodeType="withEffect">
+                                  <p:stCondLst>
+                                    <p:cond delay="0"/>
+                                  </p:stCondLst>
+                                  <p:childTnLst>
+                                    <p:set>
+                                      <p:cBhvr>
+                                        <p:cTn id="16" dur="1" fill="hold">
+                                          <p:stCondLst>
+                                            <p:cond delay="0"/>
+                                          </p:stCondLst>
+                                        </p:cTn>
+                                        <p:tgtEl>
+                                          <p:spTgt spid="10"/>
+                                        </p:tgtEl>
+                                        <p:attrNameLst>
+                                          <p:attrName>style.visibility</p:attrName>
+                                        </p:attrNameLst>
+                                      </p:cBhvr>
+                                      <p:to>
+                                        <p:strVal val="visible"/>
+                                      </p:to>
+                                    </p:set>
+                                  </p:childTnLst>
+                                </p:cTn>
+                              </p:par>
+                            </p:childTnLst>
+                          </p:cTn>
+                        </p:par>
+                      </p:childTnLst>
+                    </p:cTn>
+                  </p:par>
+                </p:childTnLst>
+              </p:cTn>
+              <p:prevCondLst>
+                <p:cond evt="onPrev" delay="0">
+                  <p:tgtEl>
+                    <p:sldTgt/>
+                  </p:tgtEl>
+                </p:cond>
+              </p:prevCondLst>
+              <p:nextCondLst>
+                <p:cond evt="onNext" delay="0">
+                  <p:tgtEl>
+                    <p:sldTgt/>
+                  </p:tgtEl>
+                </p:cond>
+              </p:nextCondLst>
+            </p:seq>
+          </p:childTnLst>
+        </p:cTn>
+      </p:par>
+    </p:tnLst>
+    <p:bldLst>
+      <p:bldP spid="4" grpId="0" build="p"/>
+    </p:bldLst>
+  </p:timing>
+</p:sld>
+</file>
+
+<file path=ppt/slides/slide15.xml><?xml version="1.0" encoding="utf-8"?>
+<p:sld xmlns:a="http://schemas.openxmlformats.org/drawingml/2006/main" xmlns:r="http://schemas.openxmlformats.org/officeDocument/2006/relationships" xmlns:p="http://schemas.openxmlformats.org/presentationml/2006/main">
+  <p:cSld>
+    <p:spTree>
+      <p:nvGrpSpPr>
+        <p:cNvPr id="1" name=""/>
+        <p:cNvGrpSpPr/>
+        <p:nvPr/>
+      </p:nvGrpSpPr>
+      <p:grpSpPr>
+        <a:xfrm>
+          <a:off x="0" y="0"/>
+          <a:ext cx="0" cy="0"/>
+          <a:chOff x="0" y="0"/>
+          <a:chExt cx="0" cy="0"/>
+        </a:xfrm>
+      </p:grpSpPr>
+      <p:sp>
+        <p:nvSpPr>
+          <p:cNvPr id="2" name="Title 1"/>
+          <p:cNvSpPr>
+            <a:spLocks noGrp="1"/>
+          </p:cNvSpPr>
+          <p:nvPr>
+            <p:ph type="title"/>
+          </p:nvPr>
+        </p:nvSpPr>
+        <p:spPr/>
+        <p:txBody>
+          <a:bodyPr/>
+          <a:lstStyle/>
+          <a:p>
+            <a:r>
+              <a:rPr lang="en-US" dirty="0" smtClean="0"/>
+              <a:t>	Haven </a:t>
+            </a:r>
+            <a:r>
+              <a:rPr lang="en-US" sz="2400" dirty="0" smtClean="0"/>
+              <a:t>- Thanks Microsoft.</a:t>
+            </a:r>
+            <a:endParaRPr lang="en-US" dirty="0"/>
+          </a:p>
+        </p:txBody>
+      </p:sp>
+      <p:sp>
+        <p:nvSpPr>
+          <p:cNvPr id="3" name="Content Placeholder 2"/>
+          <p:cNvSpPr>
+            <a:spLocks noGrp="1"/>
+          </p:cNvSpPr>
+          <p:nvPr>
+            <p:ph idx="1"/>
+          </p:nvPr>
+        </p:nvSpPr>
+        <p:spPr/>
+        <p:txBody>
+          <a:bodyPr/>
+          <a:lstStyle/>
+          <a:p>
+            <a:r>
+              <a:rPr lang="en-US" dirty="0" smtClean="0"/>
+              <a:t>Unmodified legacy applications</a:t>
+            </a:r>
+          </a:p>
+          <a:p>
+            <a:endParaRPr lang="en-US" dirty="0"/>
+          </a:p>
+          <a:p>
+            <a:r>
+              <a:rPr lang="en-US" dirty="0" smtClean="0"/>
+              <a:t>Shielded execution</a:t>
+            </a:r>
+          </a:p>
+          <a:p>
+            <a:pPr lvl="1"/>
+            <a:r>
+              <a:rPr lang="en-US" dirty="0" smtClean="0"/>
+              <a:t>Confidentiality</a:t>
+            </a:r>
+          </a:p>
+          <a:p>
+            <a:pPr lvl="1"/>
+            <a:r>
+              <a:rPr lang="en-US" dirty="0" smtClean="0"/>
+              <a:t>Integrity</a:t>
+            </a:r>
+          </a:p>
+          <a:p>
+            <a:pPr lvl="1"/>
+            <a:endParaRPr lang="en-US" dirty="0"/>
+          </a:p>
+          <a:p>
+            <a:r>
+              <a:rPr lang="en-US" dirty="0" smtClean="0"/>
+              <a:t>Leverages Intel SGX</a:t>
+            </a:r>
+          </a:p>
+          <a:p>
+            <a:pPr lvl="1"/>
+            <a:r>
+              <a:rPr lang="en-US" dirty="0" smtClean="0"/>
+              <a:t>Provides feedback.</a:t>
+            </a:r>
+            <a:endParaRPr lang="en-US" dirty="0"/>
+          </a:p>
+        </p:txBody>
+      </p:sp>
+      <p:pic>
+        <p:nvPicPr>
+          <p:cNvPr id="4" name="Picture 3"/>
+          <p:cNvPicPr>
+            <a:picLocks noChangeAspect="1"/>
+          </p:cNvPicPr>
+          <p:nvPr/>
+        </p:nvPicPr>
+        <p:blipFill>
+          <a:blip r:embed="rId2">
+            <a:extLst>
+              <a:ext uri="{28A0092B-C50C-407E-A947-70E740481C1C}">
+                <a14:useLocalDpi xmlns:a14="http://schemas.microsoft.com/office/drawing/2010/main" val="0"/>
+              </a:ext>
+            </a:extLst>
+          </a:blip>
+          <a:stretch>
+            <a:fillRect/>
+          </a:stretch>
+        </p:blipFill>
+        <p:spPr>
+          <a:xfrm>
+            <a:off x="6625039" y="1342800"/>
+            <a:ext cx="5254395" cy="5254395"/>
+          </a:xfrm>
+          <a:prstGeom prst="rect">
+            <a:avLst/>
+          </a:prstGeom>
+        </p:spPr>
+      </p:pic>
+      <p:pic>
+        <p:nvPicPr>
+          <p:cNvPr id="5" name="Picture 4"/>
+          <p:cNvPicPr>
+            <a:picLocks noChangeAspect="1"/>
+          </p:cNvPicPr>
+          <p:nvPr/>
+        </p:nvPicPr>
+        <p:blipFill>
+          <a:blip r:embed="rId3">
+            <a:extLst>
+              <a:ext uri="{28A0092B-C50C-407E-A947-70E740481C1C}">
+                <a14:useLocalDpi xmlns:a14="http://schemas.microsoft.com/office/drawing/2010/main" val="0"/>
+              </a:ext>
+            </a:extLst>
+          </a:blip>
+          <a:stretch>
+            <a:fillRect/>
+          </a:stretch>
+        </p:blipFill>
+        <p:spPr>
+          <a:xfrm>
+            <a:off x="7663819" y="2797797"/>
+            <a:ext cx="3176833" cy="1172200"/>
+          </a:xfrm>
+          <a:prstGeom prst="rect">
+            <a:avLst/>
+          </a:prstGeom>
+        </p:spPr>
+      </p:pic>
+    </p:spTree>
+    <p:extLst>
+      <p:ext uri="{BB962C8B-B14F-4D97-AF65-F5344CB8AC3E}">
+        <p14:creationId xmlns:p14="http://schemas.microsoft.com/office/powerpoint/2010/main" val="2087482652"/>
+      </p:ext>
+    </p:extLst>
+  </p:cSld>
+  <p:clrMapOvr>
+    <a:masterClrMapping/>
+  </p:clrMapOvr>
+  <p:timing>
+    <p:tnLst>
+      <p:par>
+        <p:cTn id="1" dur="indefinite" restart="never" nodeType="tmRoot"/>
+      </p:par>
+    </p:tnLst>
+  </p:timing>
+</p:sld>
+</file>
+
+<file path=ppt/slides/slide16.xml><?xml version="1.0" encoding="utf-8"?>
+<p:sld xmlns:a="http://schemas.openxmlformats.org/drawingml/2006/main" xmlns:r="http://schemas.openxmlformats.org/officeDocument/2006/relationships" xmlns:p="http://schemas.openxmlformats.org/presentationml/2006/main">
+  <p:cSld>
+    <p:spTree>
+      <p:nvGrpSpPr>
+        <p:cNvPr id="1" name=""/>
+        <p:cNvGrpSpPr/>
+        <p:nvPr/>
+      </p:nvGrpSpPr>
+      <p:grpSpPr>
+        <a:xfrm>
+          <a:off x="0" y="0"/>
+          <a:ext cx="0" cy="0"/>
+          <a:chOff x="0" y="0"/>
+          <a:chExt cx="0" cy="0"/>
+        </a:xfrm>
+      </p:grpSpPr>
+      <p:sp>
+        <p:nvSpPr>
+          <p:cNvPr id="2" name="Title 1"/>
+          <p:cNvSpPr>
+            <a:spLocks noGrp="1"/>
+          </p:cNvSpPr>
+          <p:nvPr>
+            <p:ph type="title"/>
+          </p:nvPr>
+        </p:nvSpPr>
+        <p:spPr/>
+        <p:txBody>
+          <a:bodyPr/>
+          <a:lstStyle/>
+          <a:p>
+            <a:r>
+              <a:rPr lang="en-US" smtClean="0"/>
+              <a:t>	Intel Software Guard Extension (SGX)</a:t>
+            </a:r>
+            <a:endParaRPr lang="en-US"/>
+          </a:p>
+        </p:txBody>
+      </p:sp>
+      <p:sp>
+        <p:nvSpPr>
+          <p:cNvPr id="3" name="Content Placeholder 2"/>
+          <p:cNvSpPr>
+            <a:spLocks noGrp="1"/>
+          </p:cNvSpPr>
+          <p:nvPr>
+            <p:ph sz="half" idx="1"/>
+          </p:nvPr>
+        </p:nvSpPr>
+        <p:spPr>
+          <a:xfrm>
+            <a:off x="838200" y="1825624"/>
+            <a:ext cx="5181600" cy="4678045"/>
+          </a:xfrm>
+        </p:spPr>
+        <p:txBody>
+          <a:bodyPr>
+            <a:normAutofit/>
+          </a:bodyPr>
+          <a:lstStyle/>
+          <a:p>
+            <a:r>
+              <a:rPr lang="en-US" dirty="0" smtClean="0"/>
+              <a:t>Enclaves</a:t>
+            </a:r>
+          </a:p>
+          <a:p>
+            <a:pPr lvl="1"/>
+            <a:r>
+              <a:rPr lang="en-US" dirty="0" smtClean="0"/>
+              <a:t>Portion of user address space.</a:t>
+            </a:r>
+          </a:p>
+          <a:p>
+            <a:pPr lvl="1"/>
+            <a:r>
+              <a:rPr lang="en-US" dirty="0" smtClean="0"/>
+              <a:t>Protected against modification…</a:t>
+            </a:r>
+          </a:p>
+          <a:p>
+            <a:pPr lvl="1"/>
+            <a:r>
+              <a:rPr lang="en-US" dirty="0" smtClean="0"/>
+              <a:t>… even from privileged code!</a:t>
+            </a:r>
+          </a:p>
+          <a:p>
+            <a:pPr lvl="1"/>
+            <a:endParaRPr lang="en-US" dirty="0"/>
+          </a:p>
+          <a:p>
+            <a:r>
+              <a:rPr lang="en-US" dirty="0" smtClean="0"/>
+              <a:t>CPU in enclave mode</a:t>
+            </a:r>
+          </a:p>
+          <a:p>
+            <a:pPr lvl="1"/>
+            <a:r>
+              <a:rPr lang="en-US" dirty="0" smtClean="0"/>
+              <a:t>EPC.</a:t>
+            </a:r>
+          </a:p>
+          <a:p>
+            <a:pPr lvl="1"/>
+            <a:r>
+              <a:rPr lang="en-US" dirty="0" smtClean="0"/>
+              <a:t>Encrypted traffic to DRAM.</a:t>
+            </a:r>
+          </a:p>
+          <a:p>
+            <a:endParaRPr lang="en-US" dirty="0"/>
+          </a:p>
+          <a:p>
+            <a:r>
+              <a:rPr lang="en-US" dirty="0" smtClean="0"/>
+              <a:t>Attestation mechanism</a:t>
+            </a:r>
+            <a:endParaRPr lang="en-US" dirty="0"/>
+          </a:p>
+        </p:txBody>
+      </p:sp>
+      <p:sp>
+        <p:nvSpPr>
+          <p:cNvPr id="4" name="Content Placeholder 3"/>
+          <p:cNvSpPr>
+            <a:spLocks noGrp="1"/>
+          </p:cNvSpPr>
+          <p:nvPr>
+            <p:ph sz="half" idx="2"/>
+          </p:nvPr>
+        </p:nvSpPr>
+        <p:spPr/>
+        <p:txBody>
+          <a:bodyPr>
+            <a:normAutofit/>
+          </a:bodyPr>
+          <a:lstStyle/>
+          <a:p>
+            <a:r>
+              <a:rPr lang="en-US" dirty="0" smtClean="0">
+                <a:solidFill>
+                  <a:schemeClr val="accent2"/>
+                </a:solidFill>
+              </a:rPr>
+              <a:t>App must know about SGX</a:t>
+            </a:r>
+          </a:p>
+          <a:p>
+            <a:endParaRPr lang="en-US" dirty="0">
+              <a:solidFill>
+                <a:schemeClr val="accent2"/>
+              </a:solidFill>
+            </a:endParaRPr>
+          </a:p>
+          <a:p>
+            <a:r>
+              <a:rPr lang="en-US" dirty="0" smtClean="0">
+                <a:solidFill>
+                  <a:schemeClr val="accent2"/>
+                </a:solidFill>
+              </a:rPr>
+              <a:t>Before loading nothing </a:t>
+            </a:r>
+            <a:r>
+              <a:rPr lang="en-US" smtClean="0">
+                <a:solidFill>
+                  <a:schemeClr val="accent2"/>
+                </a:solidFill>
+              </a:rPr>
+              <a:t>is safe</a:t>
+            </a:r>
+            <a:endParaRPr lang="en-US" dirty="0" smtClean="0">
+              <a:solidFill>
+                <a:schemeClr val="accent2"/>
+              </a:solidFill>
+            </a:endParaRPr>
+          </a:p>
+          <a:p>
+            <a:endParaRPr lang="en-US" dirty="0">
+              <a:solidFill>
+                <a:schemeClr val="accent2"/>
+              </a:solidFill>
+            </a:endParaRPr>
+          </a:p>
+          <a:p>
+            <a:r>
+              <a:rPr lang="en-US" smtClean="0">
+                <a:solidFill>
+                  <a:schemeClr val="accent2"/>
+                </a:solidFill>
+              </a:rPr>
+              <a:t>Iago attacks</a:t>
+            </a:r>
+            <a:endParaRPr lang="en-US" dirty="0" smtClean="0">
+              <a:solidFill>
+                <a:schemeClr val="accent2"/>
+              </a:solidFill>
+            </a:endParaRPr>
+          </a:p>
+          <a:p>
+            <a:endParaRPr lang="en-US" dirty="0">
+              <a:solidFill>
+                <a:schemeClr val="accent2"/>
+              </a:solidFill>
+            </a:endParaRPr>
+          </a:p>
+          <a:p>
+            <a:r>
+              <a:rPr lang="en-US" dirty="0" err="1" smtClean="0">
+                <a:solidFill>
+                  <a:schemeClr val="accent2"/>
+                </a:solidFill>
+              </a:rPr>
+              <a:t>DoS</a:t>
+            </a:r>
+            <a:endParaRPr lang="en-US" dirty="0">
+              <a:solidFill>
+                <a:schemeClr val="accent2"/>
+              </a:solidFill>
+            </a:endParaRPr>
+          </a:p>
+        </p:txBody>
+      </p:sp>
+    </p:spTree>
+    <p:extLst>
+      <p:ext uri="{BB962C8B-B14F-4D97-AF65-F5344CB8AC3E}">
+        <p14:creationId xmlns:p14="http://schemas.microsoft.com/office/powerpoint/2010/main" val="609785440"/>
+      </p:ext>
+    </p:extLst>
+  </p:cSld>
+  <p:clrMapOvr>
+    <a:masterClrMapping/>
+  </p:clrMapOvr>
+  <p:timing>
+    <p:tnLst>
+      <p:par>
+        <p:cTn id="1" dur="indefinite" restart="never" nodeType="tmRoot">
+          <p:childTnLst>
+            <p:seq concurrent="1" nextAc="seek">
+              <p:cTn id="2" dur="indefinite" nodeType="mainSeq">
+                <p:childTnLst>
+                  <p:par>
+                    <p:cTn id="3" fill="hold">
+                      <p:stCondLst>
+                        <p:cond delay="indefinite"/>
+                      </p:stCondLst>
+                      <p:childTnLst>
+                        <p:par>
+                          <p:cTn id="4" fill="hold">
+                            <p:stCondLst>
+                              <p:cond delay="0"/>
+                            </p:stCondLst>
+                            <p:childTnLst>
+                              <p:par>
+                                <p:cTn id="5" presetID="1" presetClass="entr" presetSubtype="0" fill="hold" grpId="0" nodeType="clickEffect">
+                                  <p:stCondLst>
+                                    <p:cond delay="0"/>
+                                  </p:stCondLst>
+                                  <p:childTnLst>
+                                    <p:set>
+                                      <p:cBhvr>
+                                        <p:cTn id="6" dur="1" fill="hold">
+                                          <p:stCondLst>
+                                            <p:cond delay="0"/>
+                                          </p:stCondLst>
+                                        </p:cTn>
+                                        <p:tgtEl>
+                                          <p:spTgt spid="4">
+                                            <p:txEl>
+                                              <p:pRg st="0" end="0"/>
+                                            </p:txEl>
+                                          </p:spTgt>
+                                        </p:tgtEl>
+                                        <p:attrNameLst>
+                                          <p:attrName>style.visibility</p:attrName>
+                                        </p:attrNameLst>
+                                      </p:cBhvr>
+                                      <p:to>
+                                        <p:strVal val="visible"/>
+                                      </p:to>
+                                    </p:set>
+                                  </p:childTnLst>
+                                </p:cTn>
+                              </p:par>
+                              <p:par>
+                                <p:cTn id="7" presetID="1" presetClass="entr" presetSubtype="0" fill="hold" grpId="0" nodeType="withEffect">
+                                  <p:stCondLst>
+                                    <p:cond delay="0"/>
+                                  </p:stCondLst>
+                                  <p:childTnLst>
+                                    <p:set>
+                                      <p:cBhvr>
+                                        <p:cTn id="8" dur="1" fill="hold">
+                                          <p:stCondLst>
+                                            <p:cond delay="0"/>
+                                          </p:stCondLst>
+                                        </p:cTn>
+                                        <p:tgtEl>
+                                          <p:spTgt spid="4">
+                                            <p:txEl>
+                                              <p:pRg st="2" end="2"/>
+                                            </p:txEl>
+                                          </p:spTgt>
+                                        </p:tgtEl>
+                                        <p:attrNameLst>
+                                          <p:attrName>style.visibility</p:attrName>
+                                        </p:attrNameLst>
+                                      </p:cBhvr>
+                                      <p:to>
+                                        <p:strVal val="visible"/>
+                                      </p:to>
+                                    </p:set>
+                                  </p:childTnLst>
+                                </p:cTn>
+                              </p:par>
+                              <p:par>
+                                <p:cTn id="9" presetID="1" presetClass="entr" presetSubtype="0" fill="hold" grpId="0" nodeType="withEffect">
+                                  <p:stCondLst>
+                                    <p:cond delay="0"/>
+                                  </p:stCondLst>
+                                  <p:childTnLst>
+                                    <p:set>
+                                      <p:cBhvr>
+                                        <p:cTn id="10" dur="1" fill="hold">
+                                          <p:stCondLst>
+                                            <p:cond delay="0"/>
+                                          </p:stCondLst>
+                                        </p:cTn>
+                                        <p:tgtEl>
+                                          <p:spTgt spid="4">
+                                            <p:txEl>
+                                              <p:pRg st="4" end="4"/>
+                                            </p:txEl>
+                                          </p:spTgt>
+                                        </p:tgtEl>
+                                        <p:attrNameLst>
+                                          <p:attrName>style.visibility</p:attrName>
+                                        </p:attrNameLst>
+                                      </p:cBhvr>
+                                      <p:to>
+                                        <p:strVal val="visible"/>
+                                      </p:to>
+                                    </p:set>
+                                  </p:childTnLst>
+                                </p:cTn>
+                              </p:par>
+                              <p:par>
+                                <p:cTn id="11" presetID="1" presetClass="entr" presetSubtype="0" fill="hold" grpId="0" nodeType="withEffect">
+                                  <p:stCondLst>
+                                    <p:cond delay="0"/>
+                                  </p:stCondLst>
+                                  <p:childTnLst>
+                                    <p:set>
+                                      <p:cBhvr>
+                                        <p:cTn id="12" dur="1" fill="hold">
+                                          <p:stCondLst>
+                                            <p:cond delay="0"/>
+                                          </p:stCondLst>
+                                        </p:cTn>
+                                        <p:tgtEl>
+                                          <p:spTgt spid="4">
+                                            <p:txEl>
+                                              <p:pRg st="6" end="6"/>
+                                            </p:txEl>
+                                          </p:spTgt>
+                                        </p:tgtEl>
+                                        <p:attrNameLst>
+                                          <p:attrName>style.visibility</p:attrName>
+                                        </p:attrNameLst>
+                                      </p:cBhvr>
+                                      <p:to>
+                                        <p:strVal val="visible"/>
+                                      </p:to>
+                                    </p:set>
+                                  </p:childTnLst>
+                                </p:cTn>
+                              </p:par>
+                            </p:childTnLst>
+                          </p:cTn>
+                        </p:par>
+                      </p:childTnLst>
+                    </p:cTn>
+                  </p:par>
+                </p:childTnLst>
+              </p:cTn>
+              <p:prevCondLst>
+                <p:cond evt="onPrev" delay="0">
+                  <p:tgtEl>
+                    <p:sldTgt/>
+                  </p:tgtEl>
+                </p:cond>
+              </p:prevCondLst>
+              <p:nextCondLst>
+                <p:cond evt="onNext" delay="0">
+                  <p:tgtEl>
+                    <p:sldTgt/>
+                  </p:tgtEl>
+                </p:cond>
+              </p:nextCondLst>
+            </p:seq>
+          </p:childTnLst>
+        </p:cTn>
+      </p:par>
+    </p:tnLst>
+    <p:bldLst>
+      <p:bldP spid="4" grpId="0" uiExpand="1" build="p"/>
+    </p:bldLst>
   </p:timing>
 </p:sld>
 </file>
@@ -3765,13 +5638,6 @@
             </a:r>
           </a:p>
           <a:p>
-            <a:pPr lvl="1"/>
-            <a:r>
-              <a:rPr lang="en-US" i="1" dirty="0" smtClean="0"/>
-              <a:t>“What’s wrong with the world today?”</a:t>
-            </a:r>
-          </a:p>
-          <a:p>
             <a:r>
               <a:rPr lang="en-US" dirty="0" smtClean="0"/>
               <a:t>Challenges</a:t>
@@ -3779,43 +5645,22 @@
           </a:p>
           <a:p>
             <a:r>
+              <a:rPr lang="en-US" dirty="0" err="1" smtClean="0"/>
+              <a:t>Exokernel</a:t>
+            </a:r>
+            <a:endParaRPr lang="en-US" dirty="0"/>
+          </a:p>
+          <a:p>
+            <a:r>
+              <a:rPr lang="en-US" dirty="0" err="1" smtClean="0"/>
+              <a:t>Unikernel</a:t>
+            </a:r>
+            <a:endParaRPr lang="en-US" dirty="0" smtClean="0"/>
+          </a:p>
+          <a:p>
+            <a:r>
               <a:rPr lang="en-US" dirty="0" smtClean="0"/>
               <a:t>Haven</a:t>
-            </a:r>
-          </a:p>
-          <a:p>
-            <a:pPr lvl="1"/>
-            <a:r>
-              <a:rPr lang="en-US" dirty="0" smtClean="0"/>
-              <a:t>confidentiality in the Cloud</a:t>
-            </a:r>
-          </a:p>
-          <a:p>
-            <a:r>
-              <a:rPr lang="en-US" dirty="0" err="1" smtClean="0"/>
-              <a:t>Exokernel</a:t>
-            </a:r>
-            <a:endParaRPr lang="en-US" dirty="0"/>
-          </a:p>
-          <a:p>
-            <a:pPr lvl="1"/>
-            <a:r>
-              <a:rPr lang="en-US" dirty="0" smtClean="0"/>
-              <a:t>performance</a:t>
-            </a:r>
-          </a:p>
-          <a:p>
-            <a:r>
-              <a:rPr lang="en-US" dirty="0" err="1" smtClean="0"/>
-              <a:t>Unikernel</a:t>
-            </a:r>
-            <a:endParaRPr lang="en-US" dirty="0" smtClean="0"/>
-          </a:p>
-          <a:p>
-            <a:pPr lvl="1"/>
-            <a:r>
-              <a:rPr lang="en-US" dirty="0" smtClean="0"/>
-              <a:t>modern tools and deployment</a:t>
             </a:r>
           </a:p>
           <a:p>
@@ -6307,15 +8152,7 @@
           <a:p>
             <a:r>
               <a:rPr lang="en-US" dirty="0" smtClean="0"/>
-              <a:t>	Apps &amp; Kernels: </a:t>
-            </a:r>
-            <a:r>
-              <a:rPr lang="en-US" dirty="0" smtClean="0"/>
-              <a:t>A </a:t>
-            </a:r>
-            <a:r>
-              <a:rPr lang="en-US" dirty="0" smtClean="0"/>
-              <a:t>divorce</a:t>
+              <a:t>	Apps &amp; OS: A Divorce</a:t>
             </a:r>
             <a:endParaRPr lang="en-US" dirty="0"/>
           </a:p>
@@ -6352,14 +8189,14 @@
             <a:pPr lvl="1"/>
             <a:r>
               <a:rPr lang="en-US" dirty="0" smtClean="0"/>
-              <a:t>Frameworks</a:t>
+              <a:t>Frameworks.</a:t>
             </a:r>
           </a:p>
           <a:p>
             <a:pPr lvl="1"/>
             <a:r>
               <a:rPr lang="en-US" dirty="0" smtClean="0"/>
-              <a:t>User-level (re-)implementations</a:t>
+              <a:t>User-level (re-)implementations.</a:t>
             </a:r>
           </a:p>
           <a:p>
@@ -6376,7 +8213,7 @@
             <a:pPr lvl="1"/>
             <a:r>
               <a:rPr lang="en-US" dirty="0" smtClean="0"/>
-              <a:t>Kernel bypasses</a:t>
+              <a:t>Kernel bypasses.</a:t>
             </a:r>
           </a:p>
           <a:p>
@@ -6399,21 +8236,12 @@
               <a:rPr lang="en-US" i="1" dirty="0" smtClean="0"/>
               <a:t>!”</a:t>
             </a:r>
-            <a:endParaRPr lang="en-US" i="1" dirty="0" smtClean="0"/>
           </a:p>
           <a:p>
             <a:pPr lvl="1"/>
             <a:r>
               <a:rPr lang="en-US" i="1" dirty="0" smtClean="0"/>
-              <a:t>“</a:t>
-            </a:r>
-            <a:r>
-              <a:rPr lang="en-US" i="1" dirty="0" smtClean="0"/>
-              <a:t>Don’t trust the </a:t>
-            </a:r>
-            <a:r>
-              <a:rPr lang="en-US" i="1" dirty="0" smtClean="0"/>
-              <a:t>Cloud</a:t>
+              <a:t>“Don’t trust the Cloud</a:t>
             </a:r>
             <a:r>
               <a:rPr lang="mr-IN" i="1" dirty="0" smtClean="0"/>
@@ -6427,7 +8255,6 @@
               <a:rPr lang="en-US" i="1" dirty="0" smtClean="0"/>
               <a:t>!”</a:t>
             </a:r>
-            <a:endParaRPr lang="en-US" i="1" dirty="0" smtClean="0"/>
           </a:p>
           <a:p>
             <a:pPr lvl="1"/>
@@ -6544,124 +8371,155 @@
           <a:bodyPr/>
           <a:lstStyle/>
           <a:p>
-            <a:pPr>
+            <a:pPr marL="514350" marR="0" lvl="0" indent="-514350" defTabSz="914400" eaLnBrk="1" fontAlgn="auto" latinLnBrk="0" hangingPunct="1">
               <a:lnSpc>
                 <a:spcPct val="100000"/>
               </a:lnSpc>
               <a:spcBef>
                 <a:spcPts val="0"/>
               </a:spcBef>
+              <a:spcAft>
+                <a:spcPts val="0"/>
+              </a:spcAft>
+              <a:buClrTx/>
+              <a:buSzTx/>
+              <a:buFont typeface="+mj-lt"/>
+              <a:buNone/>
+              <a:tabLst/>
+              <a:defRPr/>
             </a:pPr>
             <a:r>
-              <a:rPr lang="en-US" dirty="0" smtClean="0"/>
-              <a:t>Performance</a:t>
-            </a:r>
-          </a:p>
-          <a:p>
-            <a:pPr lvl="1">
+              <a:rPr lang="en-US" i="1" dirty="0" smtClean="0"/>
+              <a:t>What do we really want from a modern kernel?</a:t>
+            </a:r>
+          </a:p>
+          <a:p>
+            <a:pPr marL="514350" marR="0" lvl="0" indent="-514350" defTabSz="914400" eaLnBrk="1" fontAlgn="auto" latinLnBrk="0" hangingPunct="1">
               <a:lnSpc>
                 <a:spcPct val="100000"/>
               </a:lnSpc>
               <a:spcBef>
                 <a:spcPts val="0"/>
               </a:spcBef>
+              <a:spcAft>
+                <a:spcPts val="0"/>
+              </a:spcAft>
+              <a:buClrTx/>
+              <a:buSzTx/>
+              <a:buFont typeface="+mj-lt"/>
+              <a:buNone/>
+              <a:tabLst/>
+              <a:defRPr/>
             </a:pPr>
-            <a:r>
-              <a:rPr lang="en-US" dirty="0" smtClean="0"/>
-              <a:t>For heterogeneous application requirements.</a:t>
-            </a:r>
-          </a:p>
-          <a:p>
-            <a:pPr lvl="1">
+            <a:endParaRPr lang="en-US" i="1" dirty="0" smtClean="0"/>
+          </a:p>
+          <a:p>
+            <a:pPr marL="514350" marR="0" lvl="0" indent="-514350" defTabSz="914400" eaLnBrk="1" fontAlgn="auto" latinLnBrk="0" hangingPunct="1">
               <a:lnSpc>
                 <a:spcPct val="100000"/>
               </a:lnSpc>
               <a:spcBef>
                 <a:spcPts val="0"/>
               </a:spcBef>
+              <a:spcAft>
+                <a:spcPts val="0"/>
+              </a:spcAft>
+              <a:buClrTx/>
+              <a:buSzTx/>
+              <a:buFont typeface="+mj-lt"/>
+              <a:buAutoNum type="arabicPeriod"/>
+              <a:tabLst/>
+              <a:defRPr/>
             </a:pPr>
             <a:r>
               <a:rPr lang="en-US" dirty="0" smtClean="0"/>
-              <a:t>For large number of external devices.</a:t>
-            </a:r>
-          </a:p>
-          <a:p>
-            <a:pPr lvl="1">
+              <a:t>Performance for heterogeneous applications.</a:t>
+            </a:r>
+          </a:p>
+          <a:p>
+            <a:pPr marL="514350" marR="0" lvl="0" indent="-514350" defTabSz="914400" eaLnBrk="1" fontAlgn="auto" latinLnBrk="0" hangingPunct="1">
               <a:lnSpc>
                 <a:spcPct val="100000"/>
               </a:lnSpc>
               <a:spcBef>
                 <a:spcPts val="0"/>
               </a:spcBef>
+              <a:spcAft>
+                <a:spcPts val="0"/>
+              </a:spcAft>
+              <a:buClrTx/>
+              <a:buSzTx/>
+              <a:buFont typeface="+mj-lt"/>
+              <a:buAutoNum type="arabicPeriod"/>
+              <a:tabLst/>
+              <a:defRPr/>
             </a:pPr>
-            <a:endParaRPr lang="en-US" dirty="0"/>
-          </a:p>
-          <a:p>
-            <a:pPr>
+            <a:endParaRPr lang="en-US" dirty="0" smtClean="0"/>
+          </a:p>
+          <a:p>
+            <a:pPr marL="514350" marR="0" lvl="0" indent="-514350" defTabSz="914400" eaLnBrk="1" fontAlgn="auto" latinLnBrk="0" hangingPunct="1">
               <a:lnSpc>
                 <a:spcPct val="100000"/>
               </a:lnSpc>
               <a:spcBef>
                 <a:spcPts val="0"/>
               </a:spcBef>
+              <a:spcAft>
+                <a:spcPts val="0"/>
+              </a:spcAft>
+              <a:buClrTx/>
+              <a:buSzTx/>
+              <a:buFont typeface="+mj-lt"/>
+              <a:buAutoNum type="arabicPeriod"/>
+              <a:tabLst/>
+              <a:defRPr/>
             </a:pPr>
             <a:r>
               <a:rPr lang="en-US" dirty="0" smtClean="0"/>
-              <a:t>Security</a:t>
-            </a:r>
-          </a:p>
-          <a:p>
-            <a:pPr lvl="1">
+              <a:t>Ease of deployment, e.g., for Cloud platforms.</a:t>
+            </a:r>
+          </a:p>
+          <a:p>
+            <a:pPr marL="514350" marR="0" lvl="0" indent="-514350" defTabSz="914400" eaLnBrk="1" fontAlgn="auto" latinLnBrk="0" hangingPunct="1">
               <a:lnSpc>
                 <a:spcPct val="100000"/>
               </a:lnSpc>
               <a:spcBef>
                 <a:spcPts val="0"/>
               </a:spcBef>
+              <a:spcAft>
+                <a:spcPts val="0"/>
+              </a:spcAft>
+              <a:buClrTx/>
+              <a:buSzTx/>
+              <a:buFont typeface="+mj-lt"/>
+              <a:buAutoNum type="arabicPeriod"/>
+              <a:tabLst/>
+              <a:defRPr/>
             </a:pPr>
-            <a:r>
-              <a:rPr lang="en-US" dirty="0" smtClean="0"/>
-              <a:t>Confidentiality and Integrity.</a:t>
-            </a:r>
-          </a:p>
-          <a:p>
-            <a:pPr lvl="1">
+            <a:endParaRPr lang="en-US" dirty="0" smtClean="0"/>
+          </a:p>
+          <a:p>
+            <a:pPr marL="514350" marR="0" lvl="0" indent="-514350" defTabSz="914400" eaLnBrk="1" fontAlgn="auto" latinLnBrk="0" hangingPunct="1">
               <a:lnSpc>
                 <a:spcPct val="100000"/>
               </a:lnSpc>
               <a:spcBef>
                 <a:spcPts val="0"/>
               </a:spcBef>
+              <a:spcAft>
+                <a:spcPts val="0"/>
+              </a:spcAft>
+              <a:buClrTx/>
+              <a:buSzTx/>
+              <a:buFont typeface="+mj-lt"/>
+              <a:buAutoNum type="arabicPeriod"/>
+              <a:tabLst/>
+              <a:defRPr/>
             </a:pPr>
             <a:r>
               <a:rPr lang="en-US" dirty="0" smtClean="0"/>
-              <a:t>Bi-directional mistrust between host/guest.</a:t>
-            </a:r>
-          </a:p>
-          <a:p>
-            <a:pPr lvl="1">
-              <a:lnSpc>
-                <a:spcPct val="100000"/>
-              </a:lnSpc>
-              <a:spcBef>
-                <a:spcPts val="0"/>
-              </a:spcBef>
-            </a:pPr>
-            <a:endParaRPr lang="en-US" dirty="0"/>
-          </a:p>
-          <a:p>
-            <a:pPr marL="0" indent="0">
-              <a:lnSpc>
-                <a:spcPct val="100000"/>
-              </a:lnSpc>
-              <a:spcBef>
-                <a:spcPts val="0"/>
-              </a:spcBef>
-              <a:buNone/>
-            </a:pPr>
-            <a:r>
-              <a:rPr lang="en-US" i="1" dirty="0" smtClean="0"/>
-              <a:t>Re-define respective roles of kernels and applications.</a:t>
+              <a:t>Support modern security model, e.g., bi-directional isolation.</a:t>
             </a:r>
           </a:p>
         </p:txBody>
@@ -6719,159 +8577,121 @@
           <a:lstStyle/>
           <a:p>
             <a:r>
+              <a:rPr lang="en-US" dirty="0"/>
+              <a:t>	How can we achieve this?</a:t>
+            </a:r>
+          </a:p>
+        </p:txBody>
+      </p:sp>
+      <p:sp>
+        <p:nvSpPr>
+          <p:cNvPr id="3" name="Content Placeholder 2"/>
+          <p:cNvSpPr>
+            <a:spLocks noGrp="1"/>
+          </p:cNvSpPr>
+          <p:nvPr>
+            <p:ph sz="half" idx="1"/>
+          </p:nvPr>
+        </p:nvSpPr>
+        <p:spPr>
+          <a:xfrm>
+            <a:off x="838200" y="2948939"/>
+            <a:ext cx="5181600" cy="3228023"/>
+          </a:xfrm>
+        </p:spPr>
+        <p:txBody>
+          <a:bodyPr/>
+          <a:lstStyle/>
+          <a:p>
+            <a:pPr marL="514350" indent="-514350">
+              <a:buFont typeface="+mj-lt"/>
+              <a:buAutoNum type="arabicPeriod"/>
+            </a:pPr>
+            <a:r>
               <a:rPr lang="en-US" dirty="0" smtClean="0"/>
-              <a:t>	Haven &amp; Intel SGX</a:t>
-            </a:r>
+              <a:t>Performance</a:t>
+            </a:r>
+          </a:p>
+          <a:p>
+            <a:pPr marL="514350" indent="-514350">
+              <a:buFont typeface="+mj-lt"/>
+              <a:buAutoNum type="arabicPeriod"/>
+            </a:pPr>
             <a:endParaRPr lang="en-US" dirty="0"/>
           </a:p>
-        </p:txBody>
-      </p:sp>
-      <p:sp>
-        <p:nvSpPr>
-          <p:cNvPr id="3" name="Content Placeholder 2"/>
-          <p:cNvSpPr>
-            <a:spLocks noGrp="1"/>
-          </p:cNvSpPr>
-          <p:nvPr>
-            <p:ph idx="1"/>
+          <a:p>
+            <a:pPr marL="514350" indent="-514350">
+              <a:buFont typeface="+mj-lt"/>
+              <a:buAutoNum type="arabicPeriod"/>
+            </a:pPr>
+            <a:r>
+              <a:rPr lang="en-US" dirty="0" smtClean="0"/>
+              <a:t>Deployment</a:t>
+            </a:r>
+          </a:p>
+          <a:p>
+            <a:pPr marL="514350" indent="-514350">
+              <a:buFont typeface="+mj-lt"/>
+              <a:buAutoNum type="arabicPeriod"/>
+            </a:pPr>
+            <a:endParaRPr lang="en-US" dirty="0"/>
+          </a:p>
+          <a:p>
+            <a:pPr marL="514350" indent="-514350">
+              <a:buFont typeface="+mj-lt"/>
+              <a:buAutoNum type="arabicPeriod"/>
+            </a:pPr>
+            <a:r>
+              <a:rPr lang="en-US" dirty="0" smtClean="0"/>
+              <a:t>Security</a:t>
+            </a:r>
+            <a:endParaRPr lang="en-US" dirty="0"/>
+          </a:p>
+        </p:txBody>
+      </p:sp>
+      <p:sp>
+        <p:nvSpPr>
+          <p:cNvPr id="4" name="Content Placeholder 3"/>
+          <p:cNvSpPr>
+            <a:spLocks noGrp="1"/>
+          </p:cNvSpPr>
+          <p:nvPr>
+            <p:ph sz="half" idx="2"/>
           </p:nvPr>
         </p:nvSpPr>
         <p:spPr>
           <a:xfrm>
-            <a:off x="838200" y="1654175"/>
-            <a:ext cx="10515600" cy="4351338"/>
+            <a:off x="6172200" y="2948939"/>
+            <a:ext cx="5181600" cy="3228024"/>
           </a:xfrm>
         </p:spPr>
         <p:txBody>
           <a:bodyPr/>
           <a:lstStyle/>
           <a:p>
-            <a:pPr marL="0" marR="0" lvl="0" indent="0" defTabSz="914400" eaLnBrk="1" fontAlgn="auto" latinLnBrk="0" hangingPunct="1">
-              <a:lnSpc>
-                <a:spcPct val="100000"/>
-              </a:lnSpc>
-              <a:spcBef>
-                <a:spcPts val="0"/>
-              </a:spcBef>
-              <a:spcAft>
-                <a:spcPts val="0"/>
-              </a:spcAft>
-              <a:buClrTx/>
-              <a:buSzTx/>
-              <a:buFontTx/>
-              <a:buNone/>
-              <a:tabLst/>
-              <a:defRPr/>
-            </a:pPr>
-            <a:r>
-              <a:rPr lang="en-US" i="1" dirty="0" smtClean="0"/>
-              <a:t>Why do people use Cloud services: IaaS, SaaS, PaaS, </a:t>
-            </a:r>
-            <a:r>
-              <a:rPr lang="en-US" i="1" dirty="0" err="1" smtClean="0"/>
-              <a:t>WaaS</a:t>
-            </a:r>
-            <a:r>
-              <a:rPr lang="en-US" i="1" dirty="0" smtClean="0"/>
-              <a:t> </a:t>
-            </a:r>
-            <a:r>
-              <a:rPr lang="en-US" i="1" dirty="0" err="1" smtClean="0"/>
-              <a:t>AaaP</a:t>
-            </a:r>
-            <a:r>
-              <a:rPr lang="en-US" i="1" dirty="0" smtClean="0"/>
-              <a:t>*?</a:t>
+            <a:r>
+              <a:rPr lang="en-US" dirty="0" err="1" smtClean="0"/>
+              <a:t>Exokernel</a:t>
             </a:r>
             <a:endParaRPr lang="en-US" dirty="0" smtClean="0"/>
           </a:p>
           <a:p>
-            <a:pPr>
-              <a:lnSpc>
-                <a:spcPct val="100000"/>
-              </a:lnSpc>
-              <a:spcBef>
-                <a:spcPts val="0"/>
-              </a:spcBef>
-            </a:pPr>
+            <a:endParaRPr lang="en-US" dirty="0"/>
+          </a:p>
+          <a:p>
+            <a:r>
+              <a:rPr lang="en-US" dirty="0" err="1" smtClean="0"/>
+              <a:t>Unikernel</a:t>
+            </a:r>
             <a:endParaRPr lang="en-US" dirty="0" smtClean="0"/>
           </a:p>
           <a:p>
-            <a:pPr>
-              <a:lnSpc>
-                <a:spcPct val="100000"/>
-              </a:lnSpc>
-              <a:spcBef>
-                <a:spcPts val="0"/>
-              </a:spcBef>
-            </a:pPr>
+            <a:endParaRPr lang="en-US" dirty="0"/>
+          </a:p>
+          <a:p>
             <a:r>
               <a:rPr lang="en-US" dirty="0" smtClean="0"/>
-              <a:t>Fast deployment</a:t>
-            </a:r>
-          </a:p>
-          <a:p>
-            <a:pPr>
-              <a:lnSpc>
-                <a:spcPct val="100000"/>
-              </a:lnSpc>
-              <a:spcBef>
-                <a:spcPts val="0"/>
-              </a:spcBef>
-            </a:pPr>
-            <a:r>
-              <a:rPr lang="en-US" dirty="0" smtClean="0"/>
-              <a:t>Low start-up cost</a:t>
-            </a:r>
-          </a:p>
-          <a:p>
-            <a:pPr>
-              <a:lnSpc>
-                <a:spcPct val="100000"/>
-              </a:lnSpc>
-              <a:spcBef>
-                <a:spcPts val="0"/>
-              </a:spcBef>
-            </a:pPr>
-            <a:r>
-              <a:rPr lang="en-US" dirty="0" smtClean="0"/>
-              <a:t>Pay-per-use</a:t>
-            </a:r>
-          </a:p>
-          <a:p>
-            <a:pPr>
-              <a:lnSpc>
-                <a:spcPct val="100000"/>
-              </a:lnSpc>
-              <a:spcBef>
-                <a:spcPts val="0"/>
-              </a:spcBef>
-            </a:pPr>
-            <a:r>
-              <a:rPr lang="en-US" dirty="0" smtClean="0"/>
-              <a:t>Adapt resources to load</a:t>
-            </a:r>
-          </a:p>
-          <a:p>
-            <a:pPr>
-              <a:lnSpc>
-                <a:spcPct val="100000"/>
-              </a:lnSpc>
-              <a:spcBef>
-                <a:spcPts val="0"/>
-              </a:spcBef>
-            </a:pPr>
-            <a:r>
-              <a:rPr lang="en-US" dirty="0" smtClean="0"/>
-              <a:t>Sounds fancy (like Big data, Machine learning, </a:t>
-            </a:r>
-            <a:r>
-              <a:rPr lang="en-US" dirty="0" err="1" smtClean="0"/>
-              <a:t>IoT</a:t>
-            </a:r>
-            <a:r>
-              <a:rPr lang="en-US" dirty="0" smtClean="0"/>
-              <a:t>, etc.)</a:t>
+              <a:t>Haven</a:t>
             </a:r>
             <a:endParaRPr lang="en-US" dirty="0"/>
           </a:p>
@@ -6879,14 +8699,14 @@
       </p:sp>
       <p:sp>
         <p:nvSpPr>
-          <p:cNvPr id="4" name="TextBox 3"/>
+          <p:cNvPr id="5" name="TextBox 4"/>
           <p:cNvSpPr txBox="1"/>
           <p:nvPr/>
         </p:nvSpPr>
         <p:spPr>
           <a:xfrm>
-            <a:off x="857250" y="6355080"/>
-            <a:ext cx="2240280" cy="369332"/>
+            <a:off x="937260" y="1520190"/>
+            <a:ext cx="10416540" cy="954107"/>
           </a:xfrm>
           <a:prstGeom prst="rect">
             <a:avLst/>
@@ -6900,303 +8720,49 @@
           <a:lstStyle/>
           <a:p>
             <a:r>
-              <a:rPr lang="en-US" dirty="0" smtClean="0"/>
-              <a:t>*This one is made up.</a:t>
-            </a:r>
-            <a:endParaRPr lang="en-US" dirty="0"/>
+              <a:rPr lang="en-US" sz="2800" u="sng" dirty="0" smtClean="0">
+                <a:solidFill>
+                  <a:schemeClr val="accent3">
+                    <a:lumMod val="75000"/>
+                  </a:schemeClr>
+                </a:solidFill>
+              </a:rPr>
+              <a:t>Claim:</a:t>
+            </a:r>
+            <a:r>
+              <a:rPr lang="en-US" sz="2800" dirty="0" smtClean="0">
+                <a:solidFill>
+                  <a:schemeClr val="accent3">
+                    <a:lumMod val="75000"/>
+                  </a:schemeClr>
+                </a:solidFill>
+              </a:rPr>
+              <a:t> </a:t>
+            </a:r>
+            <a:r>
+              <a:rPr lang="en-US" sz="2800" i="1" dirty="0" smtClean="0">
+                <a:solidFill>
+                  <a:schemeClr val="accent3">
+                    <a:lumMod val="75000"/>
+                  </a:schemeClr>
+                </a:solidFill>
+              </a:rPr>
+              <a:t>All three requirements can be satisfied with a common set of design principles!</a:t>
+            </a:r>
+            <a:endParaRPr lang="en-US" sz="2800" dirty="0">
+              <a:solidFill>
+                <a:schemeClr val="accent3">
+                  <a:lumMod val="75000"/>
+                </a:schemeClr>
+              </a:solidFill>
+            </a:endParaRPr>
           </a:p>
         </p:txBody>
       </p:sp>
     </p:spTree>
     <p:extLst>
       <p:ext uri="{BB962C8B-B14F-4D97-AF65-F5344CB8AC3E}">
-        <p14:creationId xmlns:p14="http://schemas.microsoft.com/office/powerpoint/2010/main" val="1676130107"/>
-      </p:ext>
-    </p:extLst>
-  </p:cSld>
-  <p:clrMapOvr>
-    <a:masterClrMapping/>
-  </p:clrMapOvr>
-  <p:timing>
-    <p:tnLst>
-      <p:par>
-        <p:cTn id="1" dur="indefinite" restart="never" nodeType="tmRoot"/>
-      </p:par>
-    </p:tnLst>
-  </p:timing>
-</p:sld>
-</file>
-
-<file path=ppt/slides/slide7.xml><?xml version="1.0" encoding="utf-8"?>
-<p:sld xmlns:a="http://schemas.openxmlformats.org/drawingml/2006/main" xmlns:r="http://schemas.openxmlformats.org/officeDocument/2006/relationships" xmlns:p="http://schemas.openxmlformats.org/presentationml/2006/main">
-  <p:cSld>
-    <p:spTree>
-      <p:nvGrpSpPr>
-        <p:cNvPr id="1" name=""/>
-        <p:cNvGrpSpPr/>
-        <p:nvPr/>
-      </p:nvGrpSpPr>
-      <p:grpSpPr>
-        <a:xfrm>
-          <a:off x="0" y="0"/>
-          <a:ext cx="0" cy="0"/>
-          <a:chOff x="0" y="0"/>
-          <a:chExt cx="0" cy="0"/>
-        </a:xfrm>
-      </p:grpSpPr>
-      <p:sp>
-        <p:nvSpPr>
-          <p:cNvPr id="2" name="Title 1"/>
-          <p:cNvSpPr>
-            <a:spLocks noGrp="1"/>
-          </p:cNvSpPr>
-          <p:nvPr>
-            <p:ph type="title"/>
-          </p:nvPr>
-        </p:nvSpPr>
-        <p:spPr/>
-        <p:txBody>
-          <a:bodyPr/>
-          <a:lstStyle/>
-          <a:p>
-            <a:r>
-              <a:rPr lang="en-US" dirty="0" smtClean="0"/>
-              <a:t>	How it works</a:t>
-            </a:r>
-            <a:endParaRPr lang="en-US" dirty="0"/>
-          </a:p>
-        </p:txBody>
-      </p:sp>
-      <p:sp>
-        <p:nvSpPr>
-          <p:cNvPr id="3" name="Content Placeholder 2"/>
-          <p:cNvSpPr>
-            <a:spLocks noGrp="1"/>
-          </p:cNvSpPr>
-          <p:nvPr>
-            <p:ph sz="half" idx="1"/>
-          </p:nvPr>
-        </p:nvSpPr>
-        <p:spPr/>
-        <p:txBody>
-          <a:bodyPr/>
-          <a:lstStyle/>
-          <a:p>
-            <a:r>
-              <a:rPr lang="en-US" i="1" dirty="0" smtClean="0"/>
-              <a:t>“You have to share!”</a:t>
-            </a:r>
-          </a:p>
-          <a:p>
-            <a:pPr lvl="1"/>
-            <a:r>
-              <a:rPr lang="en-US" dirty="0" smtClean="0"/>
-              <a:t>Co-locating Apps.</a:t>
-            </a:r>
-          </a:p>
-          <a:p>
-            <a:pPr lvl="1"/>
-            <a:endParaRPr lang="en-US" dirty="0"/>
-          </a:p>
-          <a:p>
-            <a:r>
-              <a:rPr lang="en-US" dirty="0" smtClean="0"/>
-              <a:t>“</a:t>
-            </a:r>
-            <a:r>
-              <a:rPr lang="en-US" i="1" dirty="0" smtClean="0"/>
-              <a:t>Wrap it!</a:t>
-            </a:r>
-            <a:r>
-              <a:rPr lang="en-US" dirty="0" smtClean="0"/>
-              <a:t>”</a:t>
-            </a:r>
-          </a:p>
-          <a:p>
-            <a:pPr lvl="1"/>
-            <a:r>
-              <a:rPr lang="en-US" dirty="0" smtClean="0"/>
-              <a:t>Containers, VMs, etc.</a:t>
-            </a:r>
-          </a:p>
-          <a:p>
-            <a:pPr lvl="1"/>
-            <a:endParaRPr lang="en-US" dirty="0"/>
-          </a:p>
-          <a:p>
-            <a:r>
-              <a:rPr lang="en-US" dirty="0" smtClean="0"/>
-              <a:t>“</a:t>
-            </a:r>
-            <a:r>
-              <a:rPr lang="en-US" i="1" dirty="0"/>
-              <a:t>I won’t look</a:t>
-            </a:r>
-            <a:r>
-              <a:rPr lang="mr-IN" i="1" dirty="0"/>
-              <a:t>…</a:t>
-            </a:r>
-            <a:r>
-              <a:rPr lang="fr-CH" i="1" dirty="0"/>
-              <a:t> I </a:t>
-            </a:r>
-            <a:r>
-              <a:rPr lang="fr-CH" i="1" dirty="0" smtClean="0"/>
-              <a:t>promise</a:t>
-            </a:r>
-            <a:r>
-              <a:rPr lang="en-US" dirty="0" smtClean="0"/>
-              <a:t>”</a:t>
-            </a:r>
-          </a:p>
-          <a:p>
-            <a:pPr lvl="1"/>
-            <a:r>
-              <a:rPr lang="en-US" dirty="0" smtClean="0"/>
-              <a:t>CSP is privileged</a:t>
-            </a:r>
-            <a:endParaRPr lang="en-US" dirty="0"/>
-          </a:p>
-        </p:txBody>
-      </p:sp>
-      <p:sp>
-        <p:nvSpPr>
-          <p:cNvPr id="4" name="Content Placeholder 3"/>
-          <p:cNvSpPr>
-            <a:spLocks noGrp="1"/>
-          </p:cNvSpPr>
-          <p:nvPr>
-            <p:ph sz="half" idx="2"/>
-          </p:nvPr>
-        </p:nvSpPr>
-        <p:spPr/>
-        <p:txBody>
-          <a:bodyPr/>
-          <a:lstStyle/>
-          <a:p>
-            <a:r>
-              <a:rPr lang="en-US" dirty="0" smtClean="0">
-                <a:solidFill>
-                  <a:schemeClr val="accent2"/>
-                </a:solidFill>
-              </a:rPr>
-              <a:t>Corrupted/malevolent host</a:t>
-            </a:r>
-          </a:p>
-          <a:p>
-            <a:endParaRPr lang="en-US" dirty="0"/>
-          </a:p>
-          <a:p>
-            <a:r>
-              <a:rPr lang="en-US" i="1" dirty="0" smtClean="0">
-                <a:solidFill>
-                  <a:schemeClr val="accent2"/>
-                </a:solidFill>
-              </a:rPr>
-              <a:t>“Solve the rebus”</a:t>
-            </a:r>
-            <a:endParaRPr lang="en-US" i="1" dirty="0">
-              <a:solidFill>
-                <a:schemeClr val="accent2"/>
-              </a:solidFill>
-            </a:endParaRPr>
-          </a:p>
-        </p:txBody>
-      </p:sp>
-      <p:pic>
-        <p:nvPicPr>
-          <p:cNvPr id="8" name="Picture 7"/>
-          <p:cNvPicPr>
-            <a:picLocks noChangeAspect="1"/>
-          </p:cNvPicPr>
-          <p:nvPr/>
-        </p:nvPicPr>
-        <p:blipFill>
-          <a:blip r:embed="rId2">
-            <a:extLst>
-              <a:ext uri="{28A0092B-C50C-407E-A947-70E740481C1C}">
-                <a14:useLocalDpi xmlns:a14="http://schemas.microsoft.com/office/drawing/2010/main" val="0"/>
-              </a:ext>
-            </a:extLst>
-          </a:blip>
-          <a:stretch>
-            <a:fillRect/>
-          </a:stretch>
-        </p:blipFill>
-        <p:spPr>
-          <a:xfrm>
-            <a:off x="6172200" y="3863340"/>
-            <a:ext cx="1319472" cy="1319472"/>
-          </a:xfrm>
-          <a:prstGeom prst="rect">
-            <a:avLst/>
-          </a:prstGeom>
-        </p:spPr>
-      </p:pic>
-      <p:pic>
-        <p:nvPicPr>
-          <p:cNvPr id="9" name="Picture 8"/>
-          <p:cNvPicPr>
-            <a:picLocks noChangeAspect="1"/>
-          </p:cNvPicPr>
-          <p:nvPr/>
-        </p:nvPicPr>
-        <p:blipFill>
-          <a:blip r:embed="rId3">
-            <a:extLst>
-              <a:ext uri="{28A0092B-C50C-407E-A947-70E740481C1C}">
-                <a14:useLocalDpi xmlns:a14="http://schemas.microsoft.com/office/drawing/2010/main" val="0"/>
-              </a:ext>
-            </a:extLst>
-          </a:blip>
-          <a:stretch>
-            <a:fillRect/>
-          </a:stretch>
-        </p:blipFill>
-        <p:spPr>
-          <a:xfrm>
-            <a:off x="7491672" y="3998090"/>
-            <a:ext cx="1111388" cy="1111388"/>
-          </a:xfrm>
-          <a:prstGeom prst="rect">
-            <a:avLst/>
-          </a:prstGeom>
-        </p:spPr>
-      </p:pic>
-      <p:pic>
-        <p:nvPicPr>
-          <p:cNvPr id="10" name="Picture 9"/>
-          <p:cNvPicPr>
-            <a:picLocks noChangeAspect="1"/>
-          </p:cNvPicPr>
-          <p:nvPr/>
-        </p:nvPicPr>
-        <p:blipFill>
-          <a:blip r:embed="rId4">
-            <a:extLst>
-              <a:ext uri="{28A0092B-C50C-407E-A947-70E740481C1C}">
-                <a14:useLocalDpi xmlns:a14="http://schemas.microsoft.com/office/drawing/2010/main" val="0"/>
-              </a:ext>
-            </a:extLst>
-          </a:blip>
-          <a:stretch>
-            <a:fillRect/>
-          </a:stretch>
-        </p:blipFill>
-        <p:spPr>
-          <a:xfrm>
-            <a:off x="8603060" y="4069190"/>
-            <a:ext cx="994767" cy="907772"/>
-          </a:xfrm>
-          <a:prstGeom prst="rect">
-            <a:avLst/>
-          </a:prstGeom>
-        </p:spPr>
-      </p:pic>
-    </p:spTree>
-    <p:extLst>
-      <p:ext uri="{BB962C8B-B14F-4D97-AF65-F5344CB8AC3E}">
-        <p14:creationId xmlns:p14="http://schemas.microsoft.com/office/powerpoint/2010/main" val="744257271"/>
+        <p14:creationId xmlns:p14="http://schemas.microsoft.com/office/powerpoint/2010/main" val="1319390853"/>
       </p:ext>
     </p:extLst>
   </p:cSld>
@@ -7303,35 +8869,26 @@
                                   </p:childTnLst>
                                 </p:cTn>
                               </p:par>
+                            </p:childTnLst>
+                          </p:cTn>
+                        </p:par>
+                      </p:childTnLst>
+                    </p:cTn>
+                  </p:par>
+                  <p:par>
+                    <p:cTn id="11" fill="hold">
+                      <p:stCondLst>
+                        <p:cond delay="indefinite"/>
+                      </p:stCondLst>
+                      <p:childTnLst>
+                        <p:par>
+                          <p:cTn id="12" fill="hold">
+                            <p:stCondLst>
+                              <p:cond delay="0"/>
+                            </p:stCondLst>
+                            <p:childTnLst>
                               <p:par>
-                                <p:cTn id="11" presetID="1" presetClass="entr" presetSubtype="0" fill="hold" nodeType="withEffect">
-                                  <p:stCondLst>
-                                    <p:cond delay="0"/>
-                                  </p:stCondLst>
-                                  <p:childTnLst>
-                                    <p:set>
-                                      <p:cBhvr>
-                                        <p:cTn id="12" dur="1" fill="hold">
-                                          <p:stCondLst>
-                                            <p:cond delay="0"/>
-                                          </p:stCondLst>
-                                        </p:cTn>
-                                        <p:tgtEl>
-                                          <p:spTgt spid="8"/>
-                                        </p:tgtEl>
-                                        <p:attrNameLst>
-                                          <p:attrName>style.visibility</p:attrName>
-                                        </p:attrNameLst>
-                                      </p:cBhvr>
-                                      <p:to>
-                                        <p:strVal val="visible"/>
-                                      </p:to>
-                                    </p:set>
-                                  </p:childTnLst>
-                                </p:cTn>
-                              </p:par>
-                              <p:par>
-                                <p:cTn id="13" presetID="1" presetClass="entr" presetSubtype="0" fill="hold" nodeType="withEffect">
+                                <p:cTn id="13" presetID="1" presetClass="entr" presetSubtype="0" fill="hold" grpId="0" nodeType="clickEffect">
                                   <p:stCondLst>
                                     <p:cond delay="0"/>
                                   </p:stCondLst>
@@ -7344,34 +8901,11 @@
                                           </p:stCondLst>
                                         </p:cTn>
                                         <p:tgtEl>
-                                          <p:spTgt spid="9"/>
-                                        </p:tgtEl>
-                                        <p:attrNameLst>
-                                          <p:attrName>style.visibility</p:attrName>
-                                        </p:attrNameLst>
-                                      </p:cBhvr>
-                                      <p:to>
-                                        <p:strVal val="visible"/>
-                                      </p:to>
-                                    </p:set>
-                                  </p:childTnLst>
-                                </p:cTn>
-                              </p:par>
-                              <p:par>
-                                <p:cTn id="15" presetID="1" presetClass="entr" presetSubtype="0" fill="hold" nodeType="withEffect">
-                                  <p:stCondLst>
-                                    <p:cond delay="0"/>
-                                  </p:stCondLst>
-                                  <p:childTnLst>
-                                    <p:set>
-                                      <p:cBhvr>
-                                        <p:cTn id="16" dur="1" fill="hold">
-                                          <p:stCondLst>
-                                            <p:cond delay="0"/>
-                                          </p:stCondLst>
-                                        </p:cTn>
-                                        <p:tgtEl>
-                                          <p:spTgt spid="10"/>
+                                          <p:spTgt spid="4">
+                                            <p:txEl>
+                                              <p:pRg st="4" end="4"/>
+                                            </p:txEl>
+                                          </p:spTgt>
                                         </p:tgtEl>
                                         <p:attrNameLst>
                                           <p:attrName>style.visibility</p:attrName>
@@ -7412,8 +8946,97 @@
       </p:par>
     </p:tnLst>
     <p:bldLst>
-      <p:bldP spid="4" grpId="0" build="p"/>
+      <p:bldP spid="4" grpId="0" uiExpand="1" build="p"/>
     </p:bldLst>
+  </p:timing>
+</p:sld>
+</file>
+
+<file path=ppt/slides/slide7.xml><?xml version="1.0" encoding="utf-8"?>
+<p:sld xmlns:a="http://schemas.openxmlformats.org/drawingml/2006/main" xmlns:r="http://schemas.openxmlformats.org/officeDocument/2006/relationships" xmlns:p="http://schemas.openxmlformats.org/presentationml/2006/main">
+  <p:cSld>
+    <p:spTree>
+      <p:nvGrpSpPr>
+        <p:cNvPr id="1" name=""/>
+        <p:cNvGrpSpPr/>
+        <p:nvPr/>
+      </p:nvGrpSpPr>
+      <p:grpSpPr>
+        <a:xfrm>
+          <a:off x="0" y="0"/>
+          <a:ext cx="0" cy="0"/>
+          <a:chOff x="0" y="0"/>
+          <a:chExt cx="0" cy="0"/>
+        </a:xfrm>
+      </p:grpSpPr>
+      <p:sp>
+        <p:nvSpPr>
+          <p:cNvPr id="2" name="Title 1"/>
+          <p:cNvSpPr>
+            <a:spLocks noGrp="1"/>
+          </p:cNvSpPr>
+          <p:nvPr>
+            <p:ph type="title"/>
+          </p:nvPr>
+        </p:nvSpPr>
+        <p:spPr/>
+        <p:txBody>
+          <a:bodyPr/>
+          <a:lstStyle/>
+          <a:p>
+            <a:pPr algn="ctr"/>
+            <a:r>
+              <a:rPr lang="en-US" dirty="0" err="1" smtClean="0"/>
+              <a:t>Exokernel</a:t>
+            </a:r>
+            <a:r>
+              <a:rPr lang="en-US" dirty="0" smtClean="0"/>
+              <a:t> &amp; Performance</a:t>
+            </a:r>
+            <a:endParaRPr lang="en-US" dirty="0"/>
+          </a:p>
+        </p:txBody>
+      </p:sp>
+      <p:sp>
+        <p:nvSpPr>
+          <p:cNvPr id="3" name="Text Placeholder 2"/>
+          <p:cNvSpPr>
+            <a:spLocks noGrp="1"/>
+          </p:cNvSpPr>
+          <p:nvPr>
+            <p:ph type="body" idx="1"/>
+          </p:nvPr>
+        </p:nvSpPr>
+        <p:spPr/>
+        <p:txBody>
+          <a:bodyPr/>
+          <a:lstStyle/>
+          <a:p>
+            <a:pPr algn="ctr"/>
+            <a:r>
+              <a:rPr lang="en-US" i="1" dirty="0" smtClean="0"/>
+              <a:t>End-to-End, Separation of protection &amp; mechanisms</a:t>
+            </a:r>
+            <a:endParaRPr lang="en-US" i="1" dirty="0"/>
+          </a:p>
+        </p:txBody>
+      </p:sp>
+    </p:spTree>
+    <p:extLst>
+      <p:ext uri="{BB962C8B-B14F-4D97-AF65-F5344CB8AC3E}">
+        <p14:creationId xmlns:p14="http://schemas.microsoft.com/office/powerpoint/2010/main" val="498387115"/>
+      </p:ext>
+    </p:extLst>
+  </p:cSld>
+  <p:clrMapOvr>
+    <a:masterClrMapping/>
+  </p:clrMapOvr>
+  <p:timing>
+    <p:tnLst>
+      <p:par>
+        <p:cTn id="1" dur="indefinite" restart="never" nodeType="tmRoot"/>
+      </p:par>
+    </p:tnLst>
   </p:timing>
 </p:sld>
 </file>
@@ -7435,96 +9058,6 @@
           <a:chExt cx="0" cy="0"/>
         </a:xfrm>
       </p:grpSpPr>
-      <p:sp>
-        <p:nvSpPr>
-          <p:cNvPr id="2" name="Title 1"/>
-          <p:cNvSpPr>
-            <a:spLocks noGrp="1"/>
-          </p:cNvSpPr>
-          <p:nvPr>
-            <p:ph type="title"/>
-          </p:nvPr>
-        </p:nvSpPr>
-        <p:spPr/>
-        <p:txBody>
-          <a:bodyPr/>
-          <a:lstStyle/>
-          <a:p>
-            <a:r>
-              <a:rPr lang="en-US" dirty="0" smtClean="0"/>
-              <a:t>	Haven </a:t>
-            </a:r>
-            <a:r>
-              <a:rPr lang="en-US" sz="2400" dirty="0" smtClean="0"/>
-              <a:t>- Thanks Microsoft.</a:t>
-            </a:r>
-            <a:endParaRPr lang="en-US" dirty="0"/>
-          </a:p>
-        </p:txBody>
-      </p:sp>
-      <p:sp>
-        <p:nvSpPr>
-          <p:cNvPr id="3" name="Content Placeholder 2"/>
-          <p:cNvSpPr>
-            <a:spLocks noGrp="1"/>
-          </p:cNvSpPr>
-          <p:nvPr>
-            <p:ph idx="1"/>
-          </p:nvPr>
-        </p:nvSpPr>
-        <p:spPr/>
-        <p:txBody>
-          <a:bodyPr/>
-          <a:lstStyle/>
-          <a:p>
-            <a:r>
-              <a:rPr lang="en-US" dirty="0" smtClean="0"/>
-              <a:t>Unmodified legacy applications</a:t>
-            </a:r>
-          </a:p>
-          <a:p>
-            <a:endParaRPr lang="en-US" dirty="0"/>
-          </a:p>
-          <a:p>
-            <a:r>
-              <a:rPr lang="en-US" dirty="0" smtClean="0"/>
-              <a:t>Shielded execution</a:t>
-            </a:r>
-          </a:p>
-          <a:p>
-            <a:pPr lvl="1"/>
-            <a:r>
-              <a:rPr lang="en-US" dirty="0" smtClean="0"/>
-              <a:t>Confidentiality</a:t>
-            </a:r>
-          </a:p>
-          <a:p>
-            <a:pPr lvl="1"/>
-            <a:r>
-              <a:rPr lang="en-US" dirty="0" smtClean="0"/>
-              <a:t>Integrity</a:t>
-            </a:r>
-          </a:p>
-          <a:p>
-            <a:pPr lvl="1"/>
-            <a:endParaRPr lang="en-US" dirty="0"/>
-          </a:p>
-          <a:p>
-            <a:r>
-              <a:rPr lang="en-US" dirty="0" smtClean="0"/>
-              <a:t>Leverages Intel SGX</a:t>
-            </a:r>
-          </a:p>
-          <a:p>
-            <a:pPr lvl="1"/>
-            <a:r>
-              <a:rPr lang="en-US" dirty="0" smtClean="0"/>
-              <a:t>Provides feedback.</a:t>
-            </a:r>
-            <a:endParaRPr lang="en-US" dirty="0"/>
-          </a:p>
-        </p:txBody>
-      </p:sp>
       <p:pic>
         <p:nvPicPr>
           <p:cNvPr id="4" name="Picture 3"/>
@@ -7547,8 +9080,8 @@
         </p:blipFill>
         <p:spPr>
           <a:xfrm>
-            <a:off x="6625039" y="1342800"/>
-            <a:ext cx="5254395" cy="5254395"/>
+            <a:off x="7607300" y="3509804"/>
+            <a:ext cx="3765550" cy="2824163"/>
           </a:xfrm>
           <a:prstGeom prst="rect">
             <a:avLst/>
@@ -7577,18 +9110,199 @@
         </p:blipFill>
         <p:spPr>
           <a:xfrm>
-            <a:off x="7663819" y="2797797"/>
-            <a:ext cx="3176833" cy="1172200"/>
+            <a:off x="6929754" y="5379628"/>
+            <a:ext cx="5120642" cy="1280160"/>
           </a:xfrm>
           <a:prstGeom prst="rect">
             <a:avLst/>
           </a:prstGeom>
         </p:spPr>
       </p:pic>
+      <p:sp>
+        <p:nvSpPr>
+          <p:cNvPr id="2" name="Title 1"/>
+          <p:cNvSpPr>
+            <a:spLocks noGrp="1"/>
+          </p:cNvSpPr>
+          <p:nvPr>
+            <p:ph type="title"/>
+          </p:nvPr>
+        </p:nvSpPr>
+        <p:spPr/>
+        <p:txBody>
+          <a:bodyPr/>
+          <a:lstStyle/>
+          <a:p>
+            <a:r>
+              <a:rPr lang="en-US" dirty="0" smtClean="0"/>
+              <a:t>	Motivation</a:t>
+            </a:r>
+            <a:endParaRPr lang="en-US" dirty="0"/>
+          </a:p>
+        </p:txBody>
+      </p:sp>
+      <p:sp>
+        <p:nvSpPr>
+          <p:cNvPr id="3" name="Content Placeholder 2"/>
+          <p:cNvSpPr>
+            <a:spLocks noGrp="1"/>
+          </p:cNvSpPr>
+          <p:nvPr>
+            <p:ph idx="1"/>
+          </p:nvPr>
+        </p:nvSpPr>
+        <p:spPr/>
+        <p:txBody>
+          <a:bodyPr/>
+          <a:lstStyle/>
+          <a:p>
+            <a:pPr marL="0" marR="0" lvl="0" indent="0" defTabSz="914400" eaLnBrk="1" fontAlgn="auto" latinLnBrk="0" hangingPunct="1">
+              <a:lnSpc>
+                <a:spcPct val="100000"/>
+              </a:lnSpc>
+              <a:spcBef>
+                <a:spcPts val="0"/>
+              </a:spcBef>
+              <a:spcAft>
+                <a:spcPts val="0"/>
+              </a:spcAft>
+              <a:buClrTx/>
+              <a:buSzTx/>
+              <a:buFontTx/>
+              <a:buNone/>
+              <a:tabLst/>
+              <a:defRPr/>
+            </a:pPr>
+            <a:r>
+              <a:rPr lang="en-US" u="sng" dirty="0" smtClean="0"/>
+              <a:t>Problem</a:t>
+            </a:r>
+            <a:r>
+              <a:rPr lang="en-US" dirty="0" smtClean="0"/>
+              <a:t>: </a:t>
+            </a:r>
+            <a:r>
+              <a:rPr lang="en-US" i="1" dirty="0" smtClean="0"/>
+              <a:t>No single, fixed, implementation for high-level abstractions can provide best performance for ALL applications.</a:t>
+            </a:r>
+          </a:p>
+          <a:p>
+            <a:pPr marL="0" marR="0" lvl="0" indent="0" defTabSz="914400" eaLnBrk="1" fontAlgn="auto" latinLnBrk="0" hangingPunct="1">
+              <a:lnSpc>
+                <a:spcPct val="100000"/>
+              </a:lnSpc>
+              <a:spcBef>
+                <a:spcPts val="0"/>
+              </a:spcBef>
+              <a:spcAft>
+                <a:spcPts val="0"/>
+              </a:spcAft>
+              <a:buClrTx/>
+              <a:buSzTx/>
+              <a:buFontTx/>
+              <a:buNone/>
+              <a:tabLst/>
+              <a:defRPr/>
+            </a:pPr>
+            <a:endParaRPr lang="en-US" i="1" u="sng" dirty="0"/>
+          </a:p>
+          <a:p>
+            <a:pPr marL="0" marR="0" lvl="0" indent="0" algn="ctr" defTabSz="914400" eaLnBrk="1" fontAlgn="auto" latinLnBrk="0" hangingPunct="1">
+              <a:lnSpc>
+                <a:spcPct val="100000"/>
+              </a:lnSpc>
+              <a:spcBef>
+                <a:spcPts val="0"/>
+              </a:spcBef>
+              <a:spcAft>
+                <a:spcPts val="0"/>
+              </a:spcAft>
+              <a:buClrTx/>
+              <a:buSzTx/>
+              <a:buFontTx/>
+              <a:buNone/>
+              <a:tabLst/>
+              <a:defRPr/>
+            </a:pPr>
+            <a:r>
+              <a:rPr lang="en-US" sz="4400" dirty="0" smtClean="0"/>
+              <a:t>So, what can we do now?</a:t>
+            </a:r>
+          </a:p>
+          <a:p>
+            <a:pPr marL="0" marR="0" lvl="0" indent="0" defTabSz="914400" eaLnBrk="1" fontAlgn="auto" latinLnBrk="0" hangingPunct="1">
+              <a:lnSpc>
+                <a:spcPct val="100000"/>
+              </a:lnSpc>
+              <a:spcBef>
+                <a:spcPts val="0"/>
+              </a:spcBef>
+              <a:spcAft>
+                <a:spcPts val="0"/>
+              </a:spcAft>
+              <a:buClrTx/>
+              <a:buSzTx/>
+              <a:buFontTx/>
+              <a:buNone/>
+              <a:tabLst/>
+              <a:defRPr/>
+            </a:pPr>
+            <a:endParaRPr lang="en-US" u="sng" dirty="0" smtClean="0"/>
+          </a:p>
+          <a:p>
+            <a:pPr marL="0" marR="0" lvl="0" indent="0" defTabSz="914400" eaLnBrk="1" fontAlgn="auto" latinLnBrk="0" hangingPunct="1">
+              <a:lnSpc>
+                <a:spcPct val="100000"/>
+              </a:lnSpc>
+              <a:spcBef>
+                <a:spcPts val="0"/>
+              </a:spcBef>
+              <a:spcAft>
+                <a:spcPts val="0"/>
+              </a:spcAft>
+              <a:buClrTx/>
+              <a:buSzTx/>
+              <a:buFontTx/>
+              <a:buNone/>
+              <a:tabLst/>
+              <a:defRPr/>
+            </a:pPr>
+            <a:endParaRPr lang="en-US" u="sng" dirty="0" smtClean="0"/>
+          </a:p>
+          <a:p>
+            <a:pPr marL="0" marR="0" lvl="0" indent="0" defTabSz="914400" eaLnBrk="1" fontAlgn="auto" latinLnBrk="0" hangingPunct="1">
+              <a:lnSpc>
+                <a:spcPct val="100000"/>
+              </a:lnSpc>
+              <a:spcBef>
+                <a:spcPts val="0"/>
+              </a:spcBef>
+              <a:spcAft>
+                <a:spcPts val="0"/>
+              </a:spcAft>
+              <a:buClrTx/>
+              <a:buSzTx/>
+              <a:buFontTx/>
+              <a:buNone/>
+              <a:tabLst/>
+              <a:defRPr/>
+            </a:pPr>
+            <a:r>
+              <a:rPr lang="en-US" u="sng" dirty="0" smtClean="0"/>
+              <a:t>Answer</a:t>
+            </a:r>
+            <a:r>
+              <a:rPr lang="en-US" dirty="0" smtClean="0"/>
+              <a:t>: Surrender! Just don’t try to do it!</a:t>
+            </a:r>
+            <a:endParaRPr lang="en-US" u="sng" dirty="0"/>
+          </a:p>
+        </p:txBody>
+      </p:sp>
     </p:spTree>
     <p:extLst>
       <p:ext uri="{BB962C8B-B14F-4D97-AF65-F5344CB8AC3E}">
-        <p14:creationId xmlns:p14="http://schemas.microsoft.com/office/powerpoint/2010/main" val="2087482652"/>
+        <p14:creationId xmlns:p14="http://schemas.microsoft.com/office/powerpoint/2010/main" val="1773656462"/>
       </p:ext>
     </p:extLst>
   </p:cSld>
@@ -7598,7 +9312,333 @@
   <p:timing>
     <p:tnLst>
       <p:par>
-        <p:cTn id="1" dur="indefinite" restart="never" nodeType="tmRoot"/>
+        <p:cTn id="1" dur="indefinite" restart="never" nodeType="tmRoot">
+          <p:childTnLst>
+            <p:seq concurrent="1" nextAc="seek">
+              <p:cTn id="2" dur="indefinite" nodeType="mainSeq">
+                <p:childTnLst>
+                  <p:par>
+                    <p:cTn id="3" fill="hold">
+                      <p:stCondLst>
+                        <p:cond delay="indefinite"/>
+                      </p:stCondLst>
+                      <p:childTnLst>
+                        <p:par>
+                          <p:cTn id="4" fill="hold">
+                            <p:stCondLst>
+                              <p:cond delay="0"/>
+                            </p:stCondLst>
+                            <p:childTnLst>
+                              <p:par>
+                                <p:cTn id="5" presetID="1" presetClass="entr" presetSubtype="0" fill="hold" nodeType="clickEffect">
+                                  <p:stCondLst>
+                                    <p:cond delay="0"/>
+                                  </p:stCondLst>
+                                  <p:childTnLst>
+                                    <p:set>
+                                      <p:cBhvr>
+                                        <p:cTn id="6" dur="1" fill="hold">
+                                          <p:stCondLst>
+                                            <p:cond delay="0"/>
+                                          </p:stCondLst>
+                                        </p:cTn>
+                                        <p:tgtEl>
+                                          <p:spTgt spid="4"/>
+                                        </p:tgtEl>
+                                        <p:attrNameLst>
+                                          <p:attrName>style.visibility</p:attrName>
+                                        </p:attrNameLst>
+                                      </p:cBhvr>
+                                      <p:to>
+                                        <p:strVal val="visible"/>
+                                      </p:to>
+                                    </p:set>
+                                  </p:childTnLst>
+                                </p:cTn>
+                              </p:par>
+                              <p:par>
+                                <p:cTn id="7" presetID="1" presetClass="entr" presetSubtype="0" fill="hold" nodeType="withEffect">
+                                  <p:stCondLst>
+                                    <p:cond delay="0"/>
+                                  </p:stCondLst>
+                                  <p:childTnLst>
+                                    <p:set>
+                                      <p:cBhvr>
+                                        <p:cTn id="8" dur="1" fill="hold">
+                                          <p:stCondLst>
+                                            <p:cond delay="0"/>
+                                          </p:stCondLst>
+                                        </p:cTn>
+                                        <p:tgtEl>
+                                          <p:spTgt spid="3">
+                                            <p:txEl>
+                                              <p:pRg st="5" end="5"/>
+                                            </p:txEl>
+                                          </p:spTgt>
+                                        </p:tgtEl>
+                                        <p:attrNameLst>
+                                          <p:attrName>style.visibility</p:attrName>
+                                        </p:attrNameLst>
+                                      </p:cBhvr>
+                                      <p:to>
+                                        <p:strVal val="visible"/>
+                                      </p:to>
+                                    </p:set>
+                                  </p:childTnLst>
+                                </p:cTn>
+                              </p:par>
+                              <p:par>
+                                <p:cTn id="9" presetID="1" presetClass="entr" presetSubtype="0" fill="hold" nodeType="withEffect">
+                                  <p:stCondLst>
+                                    <p:cond delay="0"/>
+                                  </p:stCondLst>
+                                  <p:childTnLst>
+                                    <p:set>
+                                      <p:cBhvr>
+                                        <p:cTn id="10" dur="1" fill="hold">
+                                          <p:stCondLst>
+                                            <p:cond delay="0"/>
+                                          </p:stCondLst>
+                                        </p:cTn>
+                                        <p:tgtEl>
+                                          <p:spTgt spid="5"/>
+                                        </p:tgtEl>
+                                        <p:attrNameLst>
+                                          <p:attrName>style.visibility</p:attrName>
+                                        </p:attrNameLst>
+                                      </p:cBhvr>
+                                      <p:to>
+                                        <p:strVal val="visible"/>
+                                      </p:to>
+                                    </p:set>
+                                  </p:childTnLst>
+                                </p:cTn>
+                              </p:par>
+                            </p:childTnLst>
+                          </p:cTn>
+                        </p:par>
+                      </p:childTnLst>
+                    </p:cTn>
+                  </p:par>
+                </p:childTnLst>
+              </p:cTn>
+              <p:prevCondLst>
+                <p:cond evt="onPrev" delay="0">
+                  <p:tgtEl>
+                    <p:sldTgt/>
+                  </p:tgtEl>
+                </p:cond>
+              </p:prevCondLst>
+              <p:nextCondLst>
+                <p:cond evt="onNext" delay="0">
+                  <p:tgtEl>
+                    <p:sldTgt/>
+                  </p:tgtEl>
+                </p:cond>
+              </p:nextCondLst>
+            </p:seq>
+          </p:childTnLst>
+        </p:cTn>
+      </p:par>
+    </p:tnLst>
+  </p:timing>
+</p:sld>
+</file>
+
+<file path=ppt/slides/slide9.xml><?xml version="1.0" encoding="utf-8"?>
+<p:sld xmlns:a="http://schemas.openxmlformats.org/drawingml/2006/main" xmlns:r="http://schemas.openxmlformats.org/officeDocument/2006/relationships" xmlns:p="http://schemas.openxmlformats.org/presentationml/2006/main">
+  <p:cSld>
+    <p:spTree>
+      <p:nvGrpSpPr>
+        <p:cNvPr id="1" name=""/>
+        <p:cNvGrpSpPr/>
+        <p:nvPr/>
+      </p:nvGrpSpPr>
+      <p:grpSpPr>
+        <a:xfrm>
+          <a:off x="0" y="0"/>
+          <a:ext cx="0" cy="0"/>
+          <a:chOff x="0" y="0"/>
+          <a:chExt cx="0" cy="0"/>
+        </a:xfrm>
+      </p:grpSpPr>
+      <p:sp>
+        <p:nvSpPr>
+          <p:cNvPr id="2" name="Title 1"/>
+          <p:cNvSpPr>
+            <a:spLocks noGrp="1"/>
+          </p:cNvSpPr>
+          <p:nvPr>
+            <p:ph type="title"/>
+          </p:nvPr>
+        </p:nvSpPr>
+        <p:spPr/>
+        <p:txBody>
+          <a:bodyPr/>
+          <a:lstStyle/>
+          <a:p>
+            <a:r>
+              <a:rPr lang="en-US" dirty="0" smtClean="0"/>
+              <a:t>	</a:t>
+            </a:r>
+            <a:r>
+              <a:rPr lang="en-US" dirty="0" err="1" smtClean="0"/>
+              <a:t>Exokernel</a:t>
+            </a:r>
+            <a:r>
+              <a:rPr lang="en-US" dirty="0"/>
+              <a:t> </a:t>
+            </a:r>
+            <a:r>
+              <a:rPr lang="en-US" dirty="0" smtClean="0"/>
+              <a:t>Architecture</a:t>
+            </a:r>
+            <a:endParaRPr lang="en-US" dirty="0"/>
+          </a:p>
+        </p:txBody>
+      </p:sp>
+      <p:pic>
+        <p:nvPicPr>
+          <p:cNvPr id="5" name="Picture 4"/>
+          <p:cNvPicPr>
+            <a:picLocks noChangeAspect="1"/>
+          </p:cNvPicPr>
+          <p:nvPr/>
+        </p:nvPicPr>
+        <p:blipFill>
+          <a:blip r:embed="rId2">
+            <a:extLst>
+              <a:ext uri="{28A0092B-C50C-407E-A947-70E740481C1C}">
+                <a14:useLocalDpi xmlns:a14="http://schemas.microsoft.com/office/drawing/2010/main" val="0"/>
+              </a:ext>
+            </a:extLst>
+          </a:blip>
+          <a:stretch>
+            <a:fillRect/>
+          </a:stretch>
+        </p:blipFill>
+        <p:spPr>
+          <a:xfrm>
+            <a:off x="1008380" y="1610360"/>
+            <a:ext cx="3432048" cy="5035296"/>
+          </a:xfrm>
+          <a:prstGeom prst="rect">
+            <a:avLst/>
+          </a:prstGeom>
+        </p:spPr>
+      </p:pic>
+      <p:pic>
+        <p:nvPicPr>
+          <p:cNvPr id="6" name="Picture 5"/>
+          <p:cNvPicPr>
+            <a:picLocks noChangeAspect="1"/>
+          </p:cNvPicPr>
+          <p:nvPr/>
+        </p:nvPicPr>
+        <p:blipFill>
+          <a:blip r:embed="rId3">
+            <a:extLst>
+              <a:ext uri="{28A0092B-C50C-407E-A947-70E740481C1C}">
+                <a14:useLocalDpi xmlns:a14="http://schemas.microsoft.com/office/drawing/2010/main" val="0"/>
+              </a:ext>
+            </a:extLst>
+          </a:blip>
+          <a:stretch>
+            <a:fillRect/>
+          </a:stretch>
+        </p:blipFill>
+        <p:spPr>
+          <a:xfrm>
+            <a:off x="6342380" y="1610360"/>
+            <a:ext cx="3529584" cy="5035296"/>
+          </a:xfrm>
+          <a:prstGeom prst="rect">
+            <a:avLst/>
+          </a:prstGeom>
+        </p:spPr>
+      </p:pic>
+    </p:spTree>
+    <p:extLst>
+      <p:ext uri="{BB962C8B-B14F-4D97-AF65-F5344CB8AC3E}">
+        <p14:creationId xmlns:p14="http://schemas.microsoft.com/office/powerpoint/2010/main" val="697650945"/>
+      </p:ext>
+    </p:extLst>
+  </p:cSld>
+  <p:clrMapOvr>
+    <a:masterClrMapping/>
+  </p:clrMapOvr>
+  <p:timing>
+    <p:tnLst>
+      <p:par>
+        <p:cTn id="1" dur="indefinite" restart="never" nodeType="tmRoot">
+          <p:childTnLst>
+            <p:seq concurrent="1" nextAc="seek">
+              <p:cTn id="2" dur="indefinite" nodeType="mainSeq">
+                <p:childTnLst>
+                  <p:par>
+                    <p:cTn id="3" fill="hold">
+                      <p:stCondLst>
+                        <p:cond delay="indefinite"/>
+                      </p:stCondLst>
+                      <p:childTnLst>
+                        <p:par>
+                          <p:cTn id="4" fill="hold">
+                            <p:stCondLst>
+                              <p:cond delay="0"/>
+                            </p:stCondLst>
+                            <p:childTnLst>
+                              <p:par>
+                                <p:cTn id="5" presetID="1" presetClass="entr" presetSubtype="0" fill="hold" nodeType="clickEffect">
+                                  <p:stCondLst>
+                                    <p:cond delay="0"/>
+                                  </p:stCondLst>
+                                  <p:childTnLst>
+                                    <p:set>
+                                      <p:cBhvr>
+                                        <p:cTn id="6" dur="1" fill="hold">
+                                          <p:stCondLst>
+                                            <p:cond delay="0"/>
+                                          </p:stCondLst>
+                                        </p:cTn>
+                                        <p:tgtEl>
+                                          <p:spTgt spid="6"/>
+                                        </p:tgtEl>
+                                        <p:attrNameLst>
+                                          <p:attrName>style.visibility</p:attrName>
+                                        </p:attrNameLst>
+                                      </p:cBhvr>
+                                      <p:to>
+                                        <p:strVal val="visible"/>
+                                      </p:to>
+                                    </p:set>
+                                  </p:childTnLst>
+                                </p:cTn>
+                              </p:par>
+                            </p:childTnLst>
+                          </p:cTn>
+                        </p:par>
+                      </p:childTnLst>
+                    </p:cTn>
+                  </p:par>
+                </p:childTnLst>
+              </p:cTn>
+              <p:prevCondLst>
+                <p:cond evt="onPrev" delay="0">
+                  <p:tgtEl>
+                    <p:sldTgt/>
+                  </p:tgtEl>
+                </p:cond>
+              </p:prevCondLst>
+              <p:nextCondLst>
+                <p:cond evt="onNext" delay="0">
+                  <p:tgtEl>
+                    <p:sldTgt/>
+                  </p:tgtEl>
+                </p:cond>
+              </p:nextCondLst>
+            </p:seq>
+          </p:childTnLst>
+        </p:cTn>
       </p:par>
     </p:tnLst>
   </p:timing>

</xml_diff>

<commit_message>
Modifying the figure for unikernel
</commit_message>
<xml_diff>
--- a/CE_presentation.pptx
+++ b/CE_presentation.pptx
@@ -3435,11 +3435,7 @@
             </a:r>
             <a:r>
               <a:rPr lang="en-US" baseline="0" dirty="0" smtClean="0"/>
-              <a:t>performance might be impacted by this </a:t>
-            </a:r>
-            <a:r>
-              <a:rPr lang="en-US" baseline="0" smtClean="0"/>
-              <a:t>policy choice. </a:t>
+              <a:t>performance might be impacted by this policy choice. </a:t>
             </a:r>
             <a:endParaRPr lang="en-US" baseline="0" dirty="0" smtClean="0"/>
           </a:p>
@@ -7457,7 +7453,7 @@
       </p:pic>
       <p:pic>
         <p:nvPicPr>
-          <p:cNvPr id="4" name="Picture 3"/>
+          <p:cNvPr id="5" name="Picture 4"/>
           <p:cNvPicPr>
             <a:picLocks noChangeAspect="1"/>
           </p:cNvPicPr>
@@ -7477,8 +7473,8 @@
         </p:blipFill>
         <p:spPr>
           <a:xfrm>
-            <a:off x="6282003" y="3515836"/>
-            <a:ext cx="3239731" cy="2606746"/>
+            <a:off x="6321861" y="3439655"/>
+            <a:ext cx="3160016" cy="2682927"/>
           </a:xfrm>
           <a:prstGeom prst="rect">
             <a:avLst/>

</xml_diff>

<commit_message>
Changing the haven figure
</commit_message>
<xml_diff>
--- a/CE_presentation.pptx
+++ b/CE_presentation.pptx
@@ -2864,21 +2864,13 @@
           <a:p>
             <a:r>
               <a:rPr lang="en-US" baseline="0" dirty="0" smtClean="0"/>
-              <a:t>While attractive, such services raise important challenges</a:t>
-            </a:r>
+              <a:t>While attractive, such services raise important challenges.</a:t>
+            </a:r>
+          </a:p>
+          <a:p>
             <a:r>
               <a:rPr lang="en-US" baseline="0" dirty="0" smtClean="0"/>
-              <a:t>.</a:t>
-            </a:r>
-          </a:p>
-          <a:p>
-            <a:r>
-              <a:rPr lang="en-US" baseline="0" dirty="0" smtClean="0"/>
-              <a:t>Resources </a:t>
-            </a:r>
-            <a:r>
-              <a:rPr lang="en-US" baseline="0" dirty="0" smtClean="0"/>
-              <a:t>are rented. As a tenant, you therefore want to optimize your expenses.</a:t>
+              <a:t>Resources are rented. As a tenant, you therefore want to optimize your expenses.</a:t>
             </a:r>
           </a:p>
           <a:p>
@@ -2890,32 +2882,16 @@
           <a:p>
             <a:r>
               <a:rPr lang="en-US" baseline="0" dirty="0" smtClean="0"/>
-              <a:t>Second, </a:t>
-            </a:r>
+              <a:t>Second, we do not want the deployment environment to impede the application’s performance.</a:t>
+            </a:r>
+          </a:p>
+          <a:p>
+            <a:endParaRPr lang="en-US" baseline="0" dirty="0" smtClean="0"/>
+          </a:p>
+          <a:p>
             <a:r>
               <a:rPr lang="en-US" baseline="0" dirty="0" smtClean="0"/>
-              <a:t>we do not want the </a:t>
-            </a:r>
-            <a:r>
-              <a:rPr lang="en-US" baseline="0" dirty="0" smtClean="0"/>
-              <a:t>deployment environment to </a:t>
-            </a:r>
-            <a:r>
-              <a:rPr lang="en-US" baseline="0" dirty="0" smtClean="0"/>
-              <a:t>impede the application’s performance.</a:t>
-            </a:r>
-          </a:p>
-          <a:p>
-            <a:endParaRPr lang="en-US" baseline="0" dirty="0" smtClean="0"/>
-          </a:p>
-          <a:p>
-            <a:r>
-              <a:rPr lang="en-US" baseline="0" dirty="0" smtClean="0"/>
-              <a:t>Third, </a:t>
-            </a:r>
-            <a:r>
-              <a:rPr lang="en-US" baseline="0" dirty="0" smtClean="0"/>
-              <a:t>tenants have to think about security when deploying their applications on cloud services.</a:t>
+              <a:t>Third, tenants have to think about security when deploying their applications on cloud services.</a:t>
             </a:r>
           </a:p>
           <a:p>
@@ -3402,22 +3378,13 @@
           <a:p>
             <a:r>
               <a:rPr lang="en-US" baseline="0" dirty="0" smtClean="0"/>
-              <a:t>They both run on top of a monolithic OS, that fixes the implementation of OS </a:t>
-            </a:r>
+              <a:t>They both run on top of a monolithic OS, that fixes the implementation of OS abstractions, and more specifically the virtual memory abstraction.</a:t>
+            </a:r>
+          </a:p>
+          <a:p>
             <a:r>
               <a:rPr lang="en-US" baseline="0" dirty="0" smtClean="0"/>
-              <a:t>abstractions, and more specifically the virtual memory abstraction.</a:t>
-            </a:r>
-            <a:endParaRPr lang="en-US" baseline="0" dirty="0" smtClean="0"/>
-          </a:p>
-          <a:p>
-            <a:r>
-              <a:rPr lang="en-US" baseline="0" dirty="0" smtClean="0"/>
-              <a:t>The OS implements a LRU paging policy that cannot be modified by any of the applications</a:t>
-            </a:r>
-            <a:r>
-              <a:rPr lang="en-US" baseline="0" dirty="0" smtClean="0"/>
-              <a:t>.</a:t>
+              <a:t>The OS implements a LRU paging policy that cannot be modified by any of the applications.</a:t>
             </a:r>
           </a:p>
           <a:p>
@@ -3427,17 +3394,8 @@
             </a:r>
             <a:r>
               <a:rPr lang="en-US" baseline="0" dirty="0" smtClean="0"/>
-              <a:t> at the time was a real concern, and it is not a problem for the Hello World program , </a:t>
-            </a:r>
-            <a:r>
-              <a:rPr lang="en-US" baseline="0" dirty="0" smtClean="0"/>
-              <a:t>the GC </a:t>
-            </a:r>
-            <a:r>
-              <a:rPr lang="en-US" baseline="0" dirty="0" smtClean="0"/>
-              <a:t>performance might be impacted by this policy choice. </a:t>
-            </a:r>
-            <a:endParaRPr lang="en-US" baseline="0" dirty="0" smtClean="0"/>
+              <a:t> at the time was a real concern, and it is not a problem for the Hello World program , the GC performance might be impacted by this policy choice. </a:t>
+            </a:r>
           </a:p>
           <a:p>
             <a:r>
@@ -3592,19 +3550,11 @@
             </a:r>
             <a:r>
               <a:rPr lang="en-US" dirty="0" smtClean="0"/>
-              <a:t> adopts a radical </a:t>
-            </a:r>
-            <a:r>
-              <a:rPr lang="en-US" dirty="0" smtClean="0"/>
-              <a:t>approach, that proved to be efficient but </a:t>
+              <a:t> adopts a radical approach, that proved to be efficient but </a:t>
             </a:r>
             <a:r>
               <a:rPr lang="en-US" baseline="0" dirty="0" smtClean="0"/>
-              <a:t>is </a:t>
-            </a:r>
-            <a:r>
-              <a:rPr lang="en-US" baseline="0" dirty="0" smtClean="0"/>
-              <a:t>actually hard to implement in the way described by the authors.</a:t>
+              <a:t>is actually hard to implement in the way described by the authors.</a:t>
             </a:r>
           </a:p>
           <a:p>
@@ -7494,7 +7444,75 @@
   <p:timing>
     <p:tnLst>
       <p:par>
-        <p:cTn id="1" dur="indefinite" restart="never" nodeType="tmRoot"/>
+        <p:cTn id="1" dur="indefinite" restart="never" nodeType="tmRoot">
+          <p:childTnLst>
+            <p:seq concurrent="1" nextAc="seek">
+              <p:cTn id="2" dur="indefinite" nodeType="mainSeq">
+                <p:childTnLst>
+                  <p:par>
+                    <p:cTn id="3" fill="hold">
+                      <p:stCondLst>
+                        <p:cond delay="indefinite"/>
+                      </p:stCondLst>
+                      <p:childTnLst>
+                        <p:par>
+                          <p:cTn id="4" fill="hold">
+                            <p:stCondLst>
+                              <p:cond delay="0"/>
+                            </p:stCondLst>
+                            <p:childTnLst>
+                              <p:par>
+                                <p:cTn id="5" presetID="1" presetClass="entr" presetSubtype="0" fill="hold" nodeType="clickEffect">
+                                  <p:stCondLst>
+                                    <p:cond delay="0"/>
+                                  </p:stCondLst>
+                                  <p:childTnLst>
+                                    <p:set>
+                                      <p:cBhvr>
+                                        <p:cTn id="6" dur="1" fill="hold">
+                                          <p:stCondLst>
+                                            <p:cond delay="0"/>
+                                          </p:stCondLst>
+                                        </p:cTn>
+                                        <p:tgtEl>
+                                          <p:spTgt spid="5"/>
+                                        </p:tgtEl>
+                                        <p:attrNameLst>
+                                          <p:attrName>style.visibility</p:attrName>
+                                        </p:attrNameLst>
+                                      </p:cBhvr>
+                                      <p:to>
+                                        <p:strVal val="visible"/>
+                                      </p:to>
+                                    </p:set>
+                                  </p:childTnLst>
+                                </p:cTn>
+                              </p:par>
+                            </p:childTnLst>
+                          </p:cTn>
+                        </p:par>
+                      </p:childTnLst>
+                    </p:cTn>
+                  </p:par>
+                </p:childTnLst>
+              </p:cTn>
+              <p:prevCondLst>
+                <p:cond evt="onPrev" delay="0">
+                  <p:tgtEl>
+                    <p:sldTgt/>
+                  </p:tgtEl>
+                </p:cond>
+              </p:prevCondLst>
+              <p:nextCondLst>
+                <p:cond evt="onNext" delay="0">
+                  <p:tgtEl>
+                    <p:sldTgt/>
+                  </p:tgtEl>
+                </p:cond>
+              </p:nextCondLst>
+            </p:seq>
+          </p:childTnLst>
+        </p:cTn>
       </p:par>
     </p:tnLst>
   </p:timing>
@@ -9420,9 +9438,69 @@
           </a:prstGeom>
         </p:spPr>
       </p:pic>
+      <p:sp>
+        <p:nvSpPr>
+          <p:cNvPr id="8" name="TextBox 7"/>
+          <p:cNvSpPr txBox="1"/>
+          <p:nvPr/>
+        </p:nvSpPr>
+        <p:spPr>
+          <a:xfrm>
+            <a:off x="2564894" y="6011196"/>
+            <a:ext cx="1496564" cy="523220"/>
+          </a:xfrm>
+          <a:prstGeom prst="rect">
+            <a:avLst/>
+          </a:prstGeom>
+          <a:noFill/>
+        </p:spPr>
+        <p:txBody>
+          <a:bodyPr wrap="none" rtlCol="0">
+            <a:spAutoFit/>
+          </a:bodyPr>
+          <a:lstStyle/>
+          <a:p>
+            <a:r>
+              <a:rPr lang="en-US" sz="2800" dirty="0" smtClean="0"/>
+              <a:t>Standard</a:t>
+            </a:r>
+            <a:endParaRPr lang="en-US" sz="2800" dirty="0"/>
+          </a:p>
+        </p:txBody>
+      </p:sp>
+      <p:sp>
+        <p:nvSpPr>
+          <p:cNvPr id="9" name="TextBox 8"/>
+          <p:cNvSpPr txBox="1"/>
+          <p:nvPr/>
+        </p:nvSpPr>
+        <p:spPr>
+          <a:xfrm>
+            <a:off x="8060289" y="6011196"/>
+            <a:ext cx="1100622" cy="523220"/>
+          </a:xfrm>
+          <a:prstGeom prst="rect">
+            <a:avLst/>
+          </a:prstGeom>
+          <a:noFill/>
+        </p:spPr>
+        <p:txBody>
+          <a:bodyPr wrap="none" rtlCol="0">
+            <a:spAutoFit/>
+          </a:bodyPr>
+          <a:lstStyle/>
+          <a:p>
+            <a:r>
+              <a:rPr lang="en-US" sz="2800" smtClean="0"/>
+              <a:t>Haven</a:t>
+            </a:r>
+            <a:endParaRPr lang="en-US" sz="2800" dirty="0"/>
+          </a:p>
+        </p:txBody>
+      </p:sp>
       <p:pic>
         <p:nvPicPr>
-          <p:cNvPr id="7" name="Picture 6"/>
+          <p:cNvPr id="10" name="Picture 9"/>
           <p:cNvPicPr>
             <a:picLocks noChangeAspect="1"/>
           </p:cNvPicPr>
@@ -9442,74 +9520,14 @@
         </p:blipFill>
         <p:spPr>
           <a:xfrm>
-            <a:off x="7086600" y="1171210"/>
-            <a:ext cx="3048000" cy="4839986"/>
+            <a:off x="7070231" y="1120985"/>
+            <a:ext cx="3080737" cy="4891970"/>
           </a:xfrm>
           <a:prstGeom prst="rect">
             <a:avLst/>
           </a:prstGeom>
         </p:spPr>
       </p:pic>
-      <p:sp>
-        <p:nvSpPr>
-          <p:cNvPr id="8" name="TextBox 7"/>
-          <p:cNvSpPr txBox="1"/>
-          <p:nvPr/>
-        </p:nvSpPr>
-        <p:spPr>
-          <a:xfrm>
-            <a:off x="2564894" y="6011196"/>
-            <a:ext cx="1496564" cy="523220"/>
-          </a:xfrm>
-          <a:prstGeom prst="rect">
-            <a:avLst/>
-          </a:prstGeom>
-          <a:noFill/>
-        </p:spPr>
-        <p:txBody>
-          <a:bodyPr wrap="none" rtlCol="0">
-            <a:spAutoFit/>
-          </a:bodyPr>
-          <a:lstStyle/>
-          <a:p>
-            <a:r>
-              <a:rPr lang="en-US" sz="2800" dirty="0" smtClean="0"/>
-              <a:t>Standard</a:t>
-            </a:r>
-            <a:endParaRPr lang="en-US" sz="2800" dirty="0"/>
-          </a:p>
-        </p:txBody>
-      </p:sp>
-      <p:sp>
-        <p:nvSpPr>
-          <p:cNvPr id="9" name="TextBox 8"/>
-          <p:cNvSpPr txBox="1"/>
-          <p:nvPr/>
-        </p:nvSpPr>
-        <p:spPr>
-          <a:xfrm>
-            <a:off x="8060289" y="6011196"/>
-            <a:ext cx="1100622" cy="523220"/>
-          </a:xfrm>
-          <a:prstGeom prst="rect">
-            <a:avLst/>
-          </a:prstGeom>
-          <a:noFill/>
-        </p:spPr>
-        <p:txBody>
-          <a:bodyPr wrap="none" rtlCol="0">
-            <a:spAutoFit/>
-          </a:bodyPr>
-          <a:lstStyle/>
-          <a:p>
-            <a:r>
-              <a:rPr lang="en-US" sz="2800" smtClean="0"/>
-              <a:t>Haven</a:t>
-            </a:r>
-            <a:endParaRPr lang="en-US" sz="2800" dirty="0"/>
-          </a:p>
-        </p:txBody>
-      </p:sp>
     </p:spTree>
     <p:extLst>
       <p:ext uri="{BB962C8B-B14F-4D97-AF65-F5344CB8AC3E}">
@@ -9523,7 +9541,75 @@
   <p:timing>
     <p:tnLst>
       <p:par>
-        <p:cTn id="1" dur="indefinite" restart="never" nodeType="tmRoot"/>
+        <p:cTn id="1" dur="indefinite" restart="never" nodeType="tmRoot">
+          <p:childTnLst>
+            <p:seq concurrent="1" nextAc="seek">
+              <p:cTn id="2" dur="indefinite" nodeType="mainSeq">
+                <p:childTnLst>
+                  <p:par>
+                    <p:cTn id="3" fill="hold">
+                      <p:stCondLst>
+                        <p:cond delay="indefinite"/>
+                      </p:stCondLst>
+                      <p:childTnLst>
+                        <p:par>
+                          <p:cTn id="4" fill="hold">
+                            <p:stCondLst>
+                              <p:cond delay="0"/>
+                            </p:stCondLst>
+                            <p:childTnLst>
+                              <p:par>
+                                <p:cTn id="5" presetID="1" presetClass="entr" presetSubtype="0" fill="hold" nodeType="clickEffect">
+                                  <p:stCondLst>
+                                    <p:cond delay="0"/>
+                                  </p:stCondLst>
+                                  <p:childTnLst>
+                                    <p:set>
+                                      <p:cBhvr>
+                                        <p:cTn id="6" dur="1" fill="hold">
+                                          <p:stCondLst>
+                                            <p:cond delay="0"/>
+                                          </p:stCondLst>
+                                        </p:cTn>
+                                        <p:tgtEl>
+                                          <p:spTgt spid="10"/>
+                                        </p:tgtEl>
+                                        <p:attrNameLst>
+                                          <p:attrName>style.visibility</p:attrName>
+                                        </p:attrNameLst>
+                                      </p:cBhvr>
+                                      <p:to>
+                                        <p:strVal val="visible"/>
+                                      </p:to>
+                                    </p:set>
+                                  </p:childTnLst>
+                                </p:cTn>
+                              </p:par>
+                            </p:childTnLst>
+                          </p:cTn>
+                        </p:par>
+                      </p:childTnLst>
+                    </p:cTn>
+                  </p:par>
+                </p:childTnLst>
+              </p:cTn>
+              <p:prevCondLst>
+                <p:cond evt="onPrev" delay="0">
+                  <p:tgtEl>
+                    <p:sldTgt/>
+                  </p:tgtEl>
+                </p:cond>
+              </p:prevCondLst>
+              <p:nextCondLst>
+                <p:cond evt="onNext" delay="0">
+                  <p:tgtEl>
+                    <p:sldTgt/>
+                  </p:tgtEl>
+                </p:cond>
+              </p:nextCondLst>
+            </p:seq>
+          </p:childTnLst>
+        </p:cTn>
       </p:par>
     </p:tnLst>
   </p:timing>
@@ -11823,6 +11909,13 @@
   <p:clrMapOvr>
     <a:masterClrMapping/>
   </p:clrMapOvr>
+  <p:timing>
+    <p:tnLst>
+      <p:par>
+        <p:cTn id="1" dur="indefinite" restart="never" nodeType="tmRoot"/>
+      </p:par>
+    </p:tnLst>
+  </p:timing>
 </p:sld>
 </file>
 
@@ -14765,7 +14858,75 @@
   <p:timing>
     <p:tnLst>
       <p:par>
-        <p:cTn id="1" dur="indefinite" restart="never" nodeType="tmRoot"/>
+        <p:cTn id="1" dur="indefinite" restart="never" nodeType="tmRoot">
+          <p:childTnLst>
+            <p:seq concurrent="1" nextAc="seek">
+              <p:cTn id="2" dur="indefinite" nodeType="mainSeq">
+                <p:childTnLst>
+                  <p:par>
+                    <p:cTn id="3" fill="hold">
+                      <p:stCondLst>
+                        <p:cond delay="indefinite"/>
+                      </p:stCondLst>
+                      <p:childTnLst>
+                        <p:par>
+                          <p:cTn id="4" fill="hold">
+                            <p:stCondLst>
+                              <p:cond delay="0"/>
+                            </p:stCondLst>
+                            <p:childTnLst>
+                              <p:par>
+                                <p:cTn id="5" presetID="1" presetClass="entr" presetSubtype="0" fill="hold" nodeType="clickEffect">
+                                  <p:stCondLst>
+                                    <p:cond delay="0"/>
+                                  </p:stCondLst>
+                                  <p:childTnLst>
+                                    <p:set>
+                                      <p:cBhvr>
+                                        <p:cTn id="6" dur="1" fill="hold">
+                                          <p:stCondLst>
+                                            <p:cond delay="0"/>
+                                          </p:stCondLst>
+                                        </p:cTn>
+                                        <p:tgtEl>
+                                          <p:spTgt spid="8"/>
+                                        </p:tgtEl>
+                                        <p:attrNameLst>
+                                          <p:attrName>style.visibility</p:attrName>
+                                        </p:attrNameLst>
+                                      </p:cBhvr>
+                                      <p:to>
+                                        <p:strVal val="visible"/>
+                                      </p:to>
+                                    </p:set>
+                                  </p:childTnLst>
+                                </p:cTn>
+                              </p:par>
+                            </p:childTnLst>
+                          </p:cTn>
+                        </p:par>
+                      </p:childTnLst>
+                    </p:cTn>
+                  </p:par>
+                </p:childTnLst>
+              </p:cTn>
+              <p:prevCondLst>
+                <p:cond evt="onPrev" delay="0">
+                  <p:tgtEl>
+                    <p:sldTgt/>
+                  </p:tgtEl>
+                </p:cond>
+              </p:prevCondLst>
+              <p:nextCondLst>
+                <p:cond evt="onNext" delay="0">
+                  <p:tgtEl>
+                    <p:sldTgt/>
+                  </p:tgtEl>
+                </p:cond>
+              </p:nextCondLst>
+            </p:seq>
+          </p:childTnLst>
+        </p:cTn>
       </p:par>
     </p:tnLst>
   </p:timing>

</xml_diff>